<commit_message>
add other method real data
</commit_message>
<xml_diff>
--- a/screenshots/heatmap.pptx
+++ b/screenshots/heatmap.pptx
@@ -5,14 +5,14 @@
     <p:sldMasterId id="2147483648" r:id="rId1"/>
   </p:sldMasterIdLst>
   <p:sldIdLst>
-    <p:sldId id="256" r:id="rId3"/>
-    <p:sldId id="257" r:id="rId4"/>
-    <p:sldId id="258" r:id="rId5"/>
+    <p:sldId id="256" r:id="rId2"/>
+    <p:sldId id="257" r:id="rId3"/>
+    <p:sldId id="258" r:id="rId4"/>
   </p:sldIdLst>
-  <p:sldSz cx="6792595" cy="6858000"/>
+  <p:sldSz cx="6792913" cy="6858000"/>
   <p:notesSz cx="6858000" cy="9144000"/>
   <p:custDataLst>
-    <p:tags r:id="rId9"/>
+    <p:tags r:id="rId5"/>
   </p:custDataLst>
   <p:defaultTextStyle>
     <a:defPPr>
@@ -124,6 +124,9 @@
         </p15:guide>
       </p15:sldGuideLst>
     </p:ext>
+    <p:ext uri="{2D200454-40CA-4A62-9FC3-DE9A4176ACB9}">
+      <p15:notesGuideLst xmlns:p15="http://schemas.microsoft.com/office/powerpoint/2012/main"/>
+    </p:ext>
   </p:extLst>
 </p:presentation>
 </file>
@@ -154,7 +157,7 @@
           <p:nvPr>
             <p:ph type="ctrTitle"/>
             <p:custDataLst>
-              <p:tags r:id="rId2"/>
+              <p:tags r:id="rId1"/>
             </p:custDataLst>
           </p:nvPr>
         </p:nvSpPr>
@@ -178,7 +181,6 @@
               <a:rPr lang="zh-CN" altLang="en-US" dirty="0"/>
               <a:t>单击此处编辑母版标题样式</a:t>
             </a:r>
-            <a:endParaRPr lang="zh-CN" altLang="en-US" dirty="0"/>
           </a:p>
         </p:txBody>
       </p:sp>
@@ -191,7 +193,7 @@
           <p:nvPr>
             <p:ph type="subTitle" idx="1"/>
             <p:custDataLst>
-              <p:tags r:id="rId3"/>
+              <p:tags r:id="rId2"/>
             </p:custDataLst>
           </p:nvPr>
         </p:nvSpPr>
@@ -251,7 +253,6 @@
               <a:rPr lang="zh-CN" altLang="en-US" dirty="0"/>
               <a:t>单击此处编辑母版副标题样式</a:t>
             </a:r>
-            <a:endParaRPr lang="zh-CN" altLang="en-US" dirty="0"/>
           </a:p>
         </p:txBody>
       </p:sp>
@@ -264,7 +265,7 @@
           <p:nvPr>
             <p:ph type="dt" sz="half" idx="10"/>
             <p:custDataLst>
-              <p:tags r:id="rId4"/>
+              <p:tags r:id="rId3"/>
             </p:custDataLst>
           </p:nvPr>
         </p:nvSpPr>
@@ -275,6 +276,7 @@
           <a:p>
             <a:fld id="{760FBDFE-C587-4B4C-A407-44438C67B59E}" type="datetimeFigureOut">
               <a:rPr lang="zh-CN" altLang="en-US" smtClean="0"/>
+              <a:t>2024/3/28</a:t>
             </a:fld>
             <a:endParaRPr lang="zh-CN" altLang="en-US"/>
           </a:p>
@@ -289,29 +291,29 @@
           <p:nvPr>
             <p:ph type="ftr" sz="quarter" idx="11"/>
             <p:custDataLst>
+              <p:tags r:id="rId4"/>
+            </p:custDataLst>
+          </p:nvPr>
+        </p:nvSpPr>
+        <p:spPr/>
+        <p:txBody>
+          <a:bodyPr/>
+          <a:lstStyle/>
+          <a:p>
+            <a:endParaRPr lang="zh-CN" altLang="en-US" dirty="0"/>
+          </a:p>
+        </p:txBody>
+      </p:sp>
+      <p:sp>
+        <p:nvSpPr>
+          <p:cNvPr id="18" name="灯片编号占位符 17"/>
+          <p:cNvSpPr>
+            <a:spLocks noGrp="1"/>
+          </p:cNvSpPr>
+          <p:nvPr>
+            <p:ph type="sldNum" sz="quarter" idx="12"/>
+            <p:custDataLst>
               <p:tags r:id="rId5"/>
-            </p:custDataLst>
-          </p:nvPr>
-        </p:nvSpPr>
-        <p:spPr/>
-        <p:txBody>
-          <a:bodyPr/>
-          <a:lstStyle/>
-          <a:p>
-            <a:endParaRPr lang="zh-CN" altLang="en-US" dirty="0"/>
-          </a:p>
-        </p:txBody>
-      </p:sp>
-      <p:sp>
-        <p:nvSpPr>
-          <p:cNvPr id="18" name="灯片编号占位符 17"/>
-          <p:cNvSpPr>
-            <a:spLocks noGrp="1"/>
-          </p:cNvSpPr>
-          <p:nvPr>
-            <p:ph type="sldNum" sz="quarter" idx="12"/>
-            <p:custDataLst>
-              <p:tags r:id="rId6"/>
             </p:custDataLst>
           </p:nvPr>
         </p:nvSpPr>
@@ -322,6 +324,7 @@
           <a:p>
             <a:fld id="{49AE70B2-8BF9-45C0-BB95-33D1B9D3A854}" type="slidenum">
               <a:rPr lang="zh-CN" altLang="en-US" smtClean="0"/>
+              <a:t>‹#›</a:t>
             </a:fld>
             <a:endParaRPr lang="zh-CN" altLang="en-US" dirty="0"/>
           </a:p>
@@ -361,7 +364,7 @@
           <p:nvPr>
             <p:ph type="dt" sz="half" idx="10"/>
             <p:custDataLst>
-              <p:tags r:id="rId2"/>
+              <p:tags r:id="rId1"/>
             </p:custDataLst>
           </p:nvPr>
         </p:nvSpPr>
@@ -372,6 +375,7 @@
           <a:p>
             <a:fld id="{760FBDFE-C587-4B4C-A407-44438C67B59E}" type="datetimeFigureOut">
               <a:rPr lang="zh-CN" altLang="en-US" smtClean="0"/>
+              <a:t>2024/3/28</a:t>
             </a:fld>
             <a:endParaRPr lang="zh-CN" altLang="en-US"/>
           </a:p>
@@ -386,29 +390,29 @@
           <p:nvPr>
             <p:ph type="ftr" sz="quarter" idx="11"/>
             <p:custDataLst>
+              <p:tags r:id="rId2"/>
+            </p:custDataLst>
+          </p:nvPr>
+        </p:nvSpPr>
+        <p:spPr/>
+        <p:txBody>
+          <a:bodyPr/>
+          <a:lstStyle/>
+          <a:p>
+            <a:endParaRPr lang="zh-CN" altLang="en-US"/>
+          </a:p>
+        </p:txBody>
+      </p:sp>
+      <p:sp>
+        <p:nvSpPr>
+          <p:cNvPr id="5" name="灯片编号占位符 4"/>
+          <p:cNvSpPr>
+            <a:spLocks noGrp="1"/>
+          </p:cNvSpPr>
+          <p:nvPr>
+            <p:ph type="sldNum" sz="quarter" idx="12"/>
+            <p:custDataLst>
               <p:tags r:id="rId3"/>
-            </p:custDataLst>
-          </p:nvPr>
-        </p:nvSpPr>
-        <p:spPr/>
-        <p:txBody>
-          <a:bodyPr/>
-          <a:lstStyle/>
-          <a:p>
-            <a:endParaRPr lang="zh-CN" altLang="en-US"/>
-          </a:p>
-        </p:txBody>
-      </p:sp>
-      <p:sp>
-        <p:nvSpPr>
-          <p:cNvPr id="5" name="灯片编号占位符 4"/>
-          <p:cNvSpPr>
-            <a:spLocks noGrp="1"/>
-          </p:cNvSpPr>
-          <p:nvPr>
-            <p:ph type="sldNum" sz="quarter" idx="12"/>
-            <p:custDataLst>
-              <p:tags r:id="rId4"/>
             </p:custDataLst>
           </p:nvPr>
         </p:nvSpPr>
@@ -419,6 +423,7 @@
           <a:p>
             <a:fld id="{49AE70B2-8BF9-45C0-BB95-33D1B9D3A854}" type="slidenum">
               <a:rPr lang="zh-CN" altLang="en-US" smtClean="0"/>
+              <a:t>‹#›</a:t>
             </a:fld>
             <a:endParaRPr lang="zh-CN" altLang="en-US"/>
           </a:p>
@@ -433,7 +438,7 @@
           <p:nvPr>
             <p:ph sz="quarter" idx="13"/>
             <p:custDataLst>
-              <p:tags r:id="rId5"/>
+              <p:tags r:id="rId4"/>
             </p:custDataLst>
           </p:nvPr>
         </p:nvSpPr>
@@ -452,7 +457,6 @@
               <a:rPr lang="zh-CN" altLang="en-US" dirty="0"/>
               <a:t>单击此处编辑母版文本样式</a:t>
             </a:r>
-            <a:endParaRPr lang="zh-CN" altLang="en-US" dirty="0"/>
           </a:p>
           <a:p>
             <a:pPr lvl="1"/>
@@ -460,7 +464,6 @@
               <a:rPr lang="zh-CN" altLang="en-US" dirty="0"/>
               <a:t>第二级</a:t>
             </a:r>
-            <a:endParaRPr lang="zh-CN" altLang="en-US" dirty="0"/>
           </a:p>
           <a:p>
             <a:pPr lvl="2"/>
@@ -468,7 +471,6 @@
               <a:rPr lang="zh-CN" altLang="en-US" dirty="0"/>
               <a:t>第三级</a:t>
             </a:r>
-            <a:endParaRPr lang="zh-CN" altLang="en-US" dirty="0"/>
           </a:p>
           <a:p>
             <a:pPr lvl="3"/>
@@ -476,7 +478,6 @@
               <a:rPr lang="zh-CN" altLang="en-US" dirty="0"/>
               <a:t>第四级</a:t>
             </a:r>
-            <a:endParaRPr lang="zh-CN" altLang="en-US" dirty="0"/>
           </a:p>
           <a:p>
             <a:pPr lvl="4"/>
@@ -484,7 +485,6 @@
               <a:rPr lang="zh-CN" altLang="en-US" dirty="0"/>
               <a:t>第五级</a:t>
             </a:r>
-            <a:endParaRPr lang="zh-CN" altLang="en-US" dirty="0"/>
           </a:p>
         </p:txBody>
       </p:sp>
@@ -522,7 +522,7 @@
           <p:nvPr>
             <p:ph type="dt" sz="half" idx="10"/>
             <p:custDataLst>
-              <p:tags r:id="rId2"/>
+              <p:tags r:id="rId1"/>
             </p:custDataLst>
           </p:nvPr>
         </p:nvSpPr>
@@ -533,6 +533,7 @@
           <a:p>
             <a:fld id="{760FBDFE-C587-4B4C-A407-44438C67B59E}" type="datetimeFigureOut">
               <a:rPr lang="zh-CN" altLang="en-US" smtClean="0"/>
+              <a:t>2024/3/28</a:t>
             </a:fld>
             <a:endParaRPr lang="zh-CN" altLang="en-US"/>
           </a:p>
@@ -547,29 +548,29 @@
           <p:nvPr>
             <p:ph type="ftr" sz="quarter" idx="11"/>
             <p:custDataLst>
+              <p:tags r:id="rId2"/>
+            </p:custDataLst>
+          </p:nvPr>
+        </p:nvSpPr>
+        <p:spPr/>
+        <p:txBody>
+          <a:bodyPr/>
+          <a:lstStyle/>
+          <a:p>
+            <a:endParaRPr lang="zh-CN" altLang="en-US"/>
+          </a:p>
+        </p:txBody>
+      </p:sp>
+      <p:sp>
+        <p:nvSpPr>
+          <p:cNvPr id="5" name="灯片编号占位符 4"/>
+          <p:cNvSpPr>
+            <a:spLocks noGrp="1"/>
+          </p:cNvSpPr>
+          <p:nvPr>
+            <p:ph type="sldNum" sz="quarter" idx="12"/>
+            <p:custDataLst>
               <p:tags r:id="rId3"/>
-            </p:custDataLst>
-          </p:nvPr>
-        </p:nvSpPr>
-        <p:spPr/>
-        <p:txBody>
-          <a:bodyPr/>
-          <a:lstStyle/>
-          <a:p>
-            <a:endParaRPr lang="zh-CN" altLang="en-US"/>
-          </a:p>
-        </p:txBody>
-      </p:sp>
-      <p:sp>
-        <p:nvSpPr>
-          <p:cNvPr id="5" name="灯片编号占位符 4"/>
-          <p:cNvSpPr>
-            <a:spLocks noGrp="1"/>
-          </p:cNvSpPr>
-          <p:nvPr>
-            <p:ph type="sldNum" sz="quarter" idx="12"/>
-            <p:custDataLst>
-              <p:tags r:id="rId4"/>
             </p:custDataLst>
           </p:nvPr>
         </p:nvSpPr>
@@ -580,6 +581,7 @@
           <a:p>
             <a:fld id="{49AE70B2-8BF9-45C0-BB95-33D1B9D3A854}" type="slidenum">
               <a:rPr lang="zh-CN" altLang="en-US" smtClean="0"/>
+              <a:t>‹#›</a:t>
             </a:fld>
             <a:endParaRPr lang="zh-CN" altLang="en-US"/>
           </a:p>
@@ -594,7 +596,7 @@
           <p:nvPr>
             <p:ph type="title" hasCustomPrompt="1"/>
             <p:custDataLst>
-              <p:tags r:id="rId5"/>
+              <p:tags r:id="rId4"/>
             </p:custDataLst>
           </p:nvPr>
         </p:nvSpPr>
@@ -616,10 +618,9 @@
           <a:p>
             <a:pPr lvl="0"/>
             <a:r>
-              <a:rPr lang="zh-CN" altLang="en-US" smtClean="0"/>
+              <a:rPr lang="zh-CN" altLang="en-US"/>
               <a:t>单击此处编辑标题</a:t>
             </a:r>
-            <a:endParaRPr lang="zh-CN" altLang="en-US"/>
           </a:p>
         </p:txBody>
       </p:sp>
@@ -632,7 +633,7 @@
           <p:nvPr>
             <p:ph type="body" sz="quarter" idx="13"/>
             <p:custDataLst>
-              <p:tags r:id="rId6"/>
+              <p:tags r:id="rId5"/>
             </p:custDataLst>
           </p:nvPr>
         </p:nvSpPr>
@@ -661,7 +662,6 @@
               <a:rPr lang="zh-CN" altLang="en-US" dirty="0"/>
               <a:t>单击此处编辑母版文本样式</a:t>
             </a:r>
-            <a:endParaRPr lang="zh-CN" altLang="en-US" dirty="0"/>
           </a:p>
         </p:txBody>
       </p:sp>
@@ -699,7 +699,7 @@
           <p:nvPr>
             <p:ph type="title"/>
             <p:custDataLst>
-              <p:tags r:id="rId2"/>
+              <p:tags r:id="rId1"/>
             </p:custDataLst>
           </p:nvPr>
         </p:nvSpPr>
@@ -717,10 +717,9 @@
           <a:p>
             <a:pPr lvl="0"/>
             <a:r>
-              <a:rPr lang="zh-CN" altLang="en-US" smtClean="0"/>
+              <a:rPr lang="zh-CN" altLang="en-US"/>
               <a:t>单击此处编辑母版标题样式</a:t>
             </a:r>
-            <a:endParaRPr lang="zh-CN" altLang="en-US"/>
           </a:p>
         </p:txBody>
       </p:sp>
@@ -733,7 +732,7 @@
           <p:nvPr>
             <p:ph idx="1"/>
             <p:custDataLst>
-              <p:tags r:id="rId3"/>
+              <p:tags r:id="rId2"/>
             </p:custDataLst>
           </p:nvPr>
         </p:nvSpPr>
@@ -751,42 +750,37 @@
           <a:p>
             <a:pPr lvl="0"/>
             <a:r>
-              <a:rPr lang="zh-CN" altLang="en-US" smtClean="0"/>
+              <a:rPr lang="zh-CN" altLang="en-US"/>
               <a:t>单击此处编辑母版文本样式</a:t>
             </a:r>
-            <a:endParaRPr lang="zh-CN" altLang="en-US" smtClean="0"/>
           </a:p>
           <a:p>
             <a:pPr lvl="1"/>
             <a:r>
-              <a:rPr lang="zh-CN" altLang="en-US" smtClean="0"/>
+              <a:rPr lang="zh-CN" altLang="en-US"/>
               <a:t>第二级</a:t>
             </a:r>
-            <a:endParaRPr lang="zh-CN" altLang="en-US" smtClean="0"/>
           </a:p>
           <a:p>
             <a:pPr lvl="2"/>
             <a:r>
-              <a:rPr lang="zh-CN" altLang="en-US" smtClean="0"/>
+              <a:rPr lang="zh-CN" altLang="en-US"/>
               <a:t>第三级</a:t>
             </a:r>
-            <a:endParaRPr lang="zh-CN" altLang="en-US" smtClean="0"/>
           </a:p>
           <a:p>
             <a:pPr lvl="3"/>
             <a:r>
-              <a:rPr lang="zh-CN" altLang="en-US" smtClean="0"/>
+              <a:rPr lang="zh-CN" altLang="en-US"/>
               <a:t>第四级</a:t>
             </a:r>
-            <a:endParaRPr lang="zh-CN" altLang="en-US" smtClean="0"/>
           </a:p>
           <a:p>
             <a:pPr lvl="4"/>
             <a:r>
-              <a:rPr lang="zh-CN" altLang="en-US" smtClean="0"/>
+              <a:rPr lang="zh-CN" altLang="en-US"/>
               <a:t>第五级</a:t>
             </a:r>
-            <a:endParaRPr lang="zh-CN" altLang="en-US"/>
           </a:p>
         </p:txBody>
       </p:sp>
@@ -799,7 +793,7 @@
           <p:nvPr>
             <p:ph type="dt" sz="half" idx="10"/>
             <p:custDataLst>
-              <p:tags r:id="rId4"/>
+              <p:tags r:id="rId3"/>
             </p:custDataLst>
           </p:nvPr>
         </p:nvSpPr>
@@ -810,6 +804,7 @@
           <a:p>
             <a:fld id="{760FBDFE-C587-4B4C-A407-44438C67B59E}" type="datetimeFigureOut">
               <a:rPr lang="zh-CN" altLang="en-US" smtClean="0"/>
+              <a:t>2024/3/28</a:t>
             </a:fld>
             <a:endParaRPr lang="zh-CN" altLang="en-US"/>
           </a:p>
@@ -824,29 +819,29 @@
           <p:nvPr>
             <p:ph type="ftr" sz="quarter" idx="11"/>
             <p:custDataLst>
+              <p:tags r:id="rId4"/>
+            </p:custDataLst>
+          </p:nvPr>
+        </p:nvSpPr>
+        <p:spPr/>
+        <p:txBody>
+          <a:bodyPr/>
+          <a:lstStyle/>
+          <a:p>
+            <a:endParaRPr lang="zh-CN" altLang="en-US"/>
+          </a:p>
+        </p:txBody>
+      </p:sp>
+      <p:sp>
+        <p:nvSpPr>
+          <p:cNvPr id="6" name="灯片编号占位符 5"/>
+          <p:cNvSpPr>
+            <a:spLocks noGrp="1"/>
+          </p:cNvSpPr>
+          <p:nvPr>
+            <p:ph type="sldNum" sz="quarter" idx="12"/>
+            <p:custDataLst>
               <p:tags r:id="rId5"/>
-            </p:custDataLst>
-          </p:nvPr>
-        </p:nvSpPr>
-        <p:spPr/>
-        <p:txBody>
-          <a:bodyPr/>
-          <a:lstStyle/>
-          <a:p>
-            <a:endParaRPr lang="zh-CN" altLang="en-US"/>
-          </a:p>
-        </p:txBody>
-      </p:sp>
-      <p:sp>
-        <p:nvSpPr>
-          <p:cNvPr id="6" name="灯片编号占位符 5"/>
-          <p:cNvSpPr>
-            <a:spLocks noGrp="1"/>
-          </p:cNvSpPr>
-          <p:nvPr>
-            <p:ph type="sldNum" sz="quarter" idx="12"/>
-            <p:custDataLst>
-              <p:tags r:id="rId6"/>
             </p:custDataLst>
           </p:nvPr>
         </p:nvSpPr>
@@ -857,6 +852,7 @@
           <a:p>
             <a:fld id="{49AE70B2-8BF9-45C0-BB95-33D1B9D3A854}" type="slidenum">
               <a:rPr lang="zh-CN" altLang="en-US" smtClean="0"/>
+              <a:t>‹#›</a:t>
             </a:fld>
             <a:endParaRPr lang="zh-CN" altLang="en-US"/>
           </a:p>
@@ -896,7 +892,7 @@
           <p:nvPr>
             <p:ph type="title" hasCustomPrompt="1"/>
             <p:custDataLst>
-              <p:tags r:id="rId2"/>
+              <p:tags r:id="rId1"/>
             </p:custDataLst>
           </p:nvPr>
         </p:nvSpPr>
@@ -920,7 +916,6 @@
               <a:rPr lang="zh-CN" altLang="en-US" dirty="0"/>
               <a:t>单击此处编辑标题</a:t>
             </a:r>
-            <a:endParaRPr lang="zh-CN" altLang="en-US" dirty="0"/>
           </a:p>
         </p:txBody>
       </p:sp>
@@ -933,7 +928,7 @@
           <p:nvPr>
             <p:ph type="body" idx="1" hasCustomPrompt="1"/>
             <p:custDataLst>
-              <p:tags r:id="rId3"/>
+              <p:tags r:id="rId2"/>
             </p:custDataLst>
           </p:nvPr>
         </p:nvSpPr>
@@ -1046,7 +1041,6 @@
               <a:rPr lang="zh-CN" altLang="en-US" dirty="0"/>
               <a:t>单击此处编辑文本</a:t>
             </a:r>
-            <a:endParaRPr lang="zh-CN" altLang="en-US" dirty="0"/>
           </a:p>
         </p:txBody>
       </p:sp>
@@ -1059,7 +1053,7 @@
           <p:nvPr>
             <p:ph type="dt" sz="half" idx="10"/>
             <p:custDataLst>
-              <p:tags r:id="rId4"/>
+              <p:tags r:id="rId3"/>
             </p:custDataLst>
           </p:nvPr>
         </p:nvSpPr>
@@ -1070,6 +1064,7 @@
           <a:p>
             <a:fld id="{760FBDFE-C587-4B4C-A407-44438C67B59E}" type="datetimeFigureOut">
               <a:rPr lang="zh-CN" altLang="en-US" smtClean="0"/>
+              <a:t>2024/3/28</a:t>
             </a:fld>
             <a:endParaRPr lang="zh-CN" altLang="en-US"/>
           </a:p>
@@ -1084,29 +1079,29 @@
           <p:nvPr>
             <p:ph type="ftr" sz="quarter" idx="11"/>
             <p:custDataLst>
+              <p:tags r:id="rId4"/>
+            </p:custDataLst>
+          </p:nvPr>
+        </p:nvSpPr>
+        <p:spPr/>
+        <p:txBody>
+          <a:bodyPr/>
+          <a:lstStyle/>
+          <a:p>
+            <a:endParaRPr lang="zh-CN" altLang="en-US"/>
+          </a:p>
+        </p:txBody>
+      </p:sp>
+      <p:sp>
+        <p:nvSpPr>
+          <p:cNvPr id="6" name="灯片编号占位符 5"/>
+          <p:cNvSpPr>
+            <a:spLocks noGrp="1"/>
+          </p:cNvSpPr>
+          <p:nvPr>
+            <p:ph type="sldNum" sz="quarter" idx="12"/>
+            <p:custDataLst>
               <p:tags r:id="rId5"/>
-            </p:custDataLst>
-          </p:nvPr>
-        </p:nvSpPr>
-        <p:spPr/>
-        <p:txBody>
-          <a:bodyPr/>
-          <a:lstStyle/>
-          <a:p>
-            <a:endParaRPr lang="zh-CN" altLang="en-US"/>
-          </a:p>
-        </p:txBody>
-      </p:sp>
-      <p:sp>
-        <p:nvSpPr>
-          <p:cNvPr id="6" name="灯片编号占位符 5"/>
-          <p:cNvSpPr>
-            <a:spLocks noGrp="1"/>
-          </p:cNvSpPr>
-          <p:nvPr>
-            <p:ph type="sldNum" sz="quarter" idx="12"/>
-            <p:custDataLst>
-              <p:tags r:id="rId6"/>
             </p:custDataLst>
           </p:nvPr>
         </p:nvSpPr>
@@ -1117,6 +1112,7 @@
           <a:p>
             <a:fld id="{49AE70B2-8BF9-45C0-BB95-33D1B9D3A854}" type="slidenum">
               <a:rPr lang="zh-CN" altLang="en-US" smtClean="0"/>
+              <a:t>‹#›</a:t>
             </a:fld>
             <a:endParaRPr lang="zh-CN" altLang="en-US"/>
           </a:p>
@@ -1156,7 +1152,7 @@
           <p:nvPr>
             <p:ph type="title"/>
             <p:custDataLst>
-              <p:tags r:id="rId2"/>
+              <p:tags r:id="rId1"/>
             </p:custDataLst>
           </p:nvPr>
         </p:nvSpPr>
@@ -1174,10 +1170,9 @@
           <a:p>
             <a:pPr lvl="0"/>
             <a:r>
-              <a:rPr lang="zh-CN" altLang="en-US" smtClean="0"/>
+              <a:rPr lang="zh-CN" altLang="en-US"/>
               <a:t>单击此处编辑母版标题样式</a:t>
             </a:r>
-            <a:endParaRPr lang="zh-CN" altLang="en-US"/>
           </a:p>
         </p:txBody>
       </p:sp>
@@ -1190,7 +1185,7 @@
           <p:nvPr>
             <p:ph sz="half" idx="1"/>
             <p:custDataLst>
-              <p:tags r:id="rId3"/>
+              <p:tags r:id="rId2"/>
             </p:custDataLst>
           </p:nvPr>
         </p:nvSpPr>
@@ -1208,42 +1203,37 @@
           <a:p>
             <a:pPr lvl="0"/>
             <a:r>
-              <a:rPr lang="zh-CN" altLang="en-US" smtClean="0"/>
+              <a:rPr lang="zh-CN" altLang="en-US"/>
               <a:t>单击此处编辑母版文本样式</a:t>
             </a:r>
-            <a:endParaRPr lang="zh-CN" altLang="en-US" smtClean="0"/>
           </a:p>
           <a:p>
             <a:pPr lvl="1"/>
             <a:r>
-              <a:rPr lang="zh-CN" altLang="en-US" smtClean="0"/>
+              <a:rPr lang="zh-CN" altLang="en-US"/>
               <a:t>第二级</a:t>
             </a:r>
-            <a:endParaRPr lang="zh-CN" altLang="en-US" smtClean="0"/>
           </a:p>
           <a:p>
             <a:pPr lvl="2"/>
             <a:r>
-              <a:rPr lang="zh-CN" altLang="en-US" smtClean="0"/>
+              <a:rPr lang="zh-CN" altLang="en-US"/>
               <a:t>第三级</a:t>
             </a:r>
-            <a:endParaRPr lang="zh-CN" altLang="en-US" smtClean="0"/>
           </a:p>
           <a:p>
             <a:pPr lvl="3"/>
             <a:r>
-              <a:rPr lang="zh-CN" altLang="en-US" smtClean="0"/>
+              <a:rPr lang="zh-CN" altLang="en-US"/>
               <a:t>第四级</a:t>
             </a:r>
-            <a:endParaRPr lang="zh-CN" altLang="en-US" smtClean="0"/>
           </a:p>
           <a:p>
             <a:pPr lvl="4"/>
             <a:r>
-              <a:rPr lang="zh-CN" altLang="en-US" smtClean="0"/>
+              <a:rPr lang="zh-CN" altLang="en-US"/>
               <a:t>第五级</a:t>
             </a:r>
-            <a:endParaRPr lang="zh-CN" altLang="en-US"/>
           </a:p>
         </p:txBody>
       </p:sp>
@@ -1256,7 +1246,7 @@
           <p:nvPr>
             <p:ph sz="half" idx="2"/>
             <p:custDataLst>
-              <p:tags r:id="rId4"/>
+              <p:tags r:id="rId3"/>
             </p:custDataLst>
           </p:nvPr>
         </p:nvSpPr>
@@ -1277,7 +1267,6 @@
               <a:rPr lang="zh-CN" altLang="en-US" dirty="0"/>
               <a:t>单击此处编辑母版文本样式</a:t>
             </a:r>
-            <a:endParaRPr lang="zh-CN" altLang="en-US" dirty="0"/>
           </a:p>
           <a:p>
             <a:pPr lvl="1"/>
@@ -1285,7 +1274,6 @@
               <a:rPr lang="zh-CN" altLang="en-US" dirty="0"/>
               <a:t>第二级</a:t>
             </a:r>
-            <a:endParaRPr lang="zh-CN" altLang="en-US" dirty="0"/>
           </a:p>
           <a:p>
             <a:pPr lvl="2"/>
@@ -1293,7 +1281,6 @@
               <a:rPr lang="zh-CN" altLang="en-US" dirty="0"/>
               <a:t>第三级</a:t>
             </a:r>
-            <a:endParaRPr lang="zh-CN" altLang="en-US" dirty="0"/>
           </a:p>
           <a:p>
             <a:pPr lvl="3"/>
@@ -1301,7 +1288,6 @@
               <a:rPr lang="zh-CN" altLang="en-US" dirty="0"/>
               <a:t>第四级</a:t>
             </a:r>
-            <a:endParaRPr lang="zh-CN" altLang="en-US" dirty="0"/>
           </a:p>
           <a:p>
             <a:pPr lvl="4"/>
@@ -1309,7 +1295,6 @@
               <a:rPr lang="zh-CN" altLang="en-US" dirty="0"/>
               <a:t>第五级</a:t>
             </a:r>
-            <a:endParaRPr lang="zh-CN" altLang="en-US" dirty="0"/>
           </a:p>
         </p:txBody>
       </p:sp>
@@ -1322,7 +1307,7 @@
           <p:nvPr>
             <p:ph type="dt" sz="half" idx="10"/>
             <p:custDataLst>
-              <p:tags r:id="rId5"/>
+              <p:tags r:id="rId4"/>
             </p:custDataLst>
           </p:nvPr>
         </p:nvSpPr>
@@ -1333,6 +1318,7 @@
           <a:p>
             <a:fld id="{760FBDFE-C587-4B4C-A407-44438C67B59E}" type="datetimeFigureOut">
               <a:rPr lang="zh-CN" altLang="en-US" smtClean="0"/>
+              <a:t>2024/3/28</a:t>
             </a:fld>
             <a:endParaRPr lang="zh-CN" altLang="en-US"/>
           </a:p>
@@ -1347,29 +1333,29 @@
           <p:nvPr>
             <p:ph type="ftr" sz="quarter" idx="11"/>
             <p:custDataLst>
+              <p:tags r:id="rId5"/>
+            </p:custDataLst>
+          </p:nvPr>
+        </p:nvSpPr>
+        <p:spPr/>
+        <p:txBody>
+          <a:bodyPr/>
+          <a:lstStyle/>
+          <a:p>
+            <a:endParaRPr lang="zh-CN" altLang="en-US"/>
+          </a:p>
+        </p:txBody>
+      </p:sp>
+      <p:sp>
+        <p:nvSpPr>
+          <p:cNvPr id="7" name="灯片编号占位符 6"/>
+          <p:cNvSpPr>
+            <a:spLocks noGrp="1"/>
+          </p:cNvSpPr>
+          <p:nvPr>
+            <p:ph type="sldNum" sz="quarter" idx="12"/>
+            <p:custDataLst>
               <p:tags r:id="rId6"/>
-            </p:custDataLst>
-          </p:nvPr>
-        </p:nvSpPr>
-        <p:spPr/>
-        <p:txBody>
-          <a:bodyPr/>
-          <a:lstStyle/>
-          <a:p>
-            <a:endParaRPr lang="zh-CN" altLang="en-US"/>
-          </a:p>
-        </p:txBody>
-      </p:sp>
-      <p:sp>
-        <p:nvSpPr>
-          <p:cNvPr id="7" name="灯片编号占位符 6"/>
-          <p:cNvSpPr>
-            <a:spLocks noGrp="1"/>
-          </p:cNvSpPr>
-          <p:nvPr>
-            <p:ph type="sldNum" sz="quarter" idx="12"/>
-            <p:custDataLst>
-              <p:tags r:id="rId7"/>
             </p:custDataLst>
           </p:nvPr>
         </p:nvSpPr>
@@ -1380,6 +1366,7 @@
           <a:p>
             <a:fld id="{49AE70B2-8BF9-45C0-BB95-33D1B9D3A854}" type="slidenum">
               <a:rPr lang="zh-CN" altLang="en-US" smtClean="0"/>
+              <a:t>‹#›</a:t>
             </a:fld>
             <a:endParaRPr lang="zh-CN" altLang="en-US"/>
           </a:p>
@@ -1419,7 +1406,7 @@
           <p:nvPr>
             <p:ph type="title"/>
             <p:custDataLst>
-              <p:tags r:id="rId2"/>
+              <p:tags r:id="rId1"/>
             </p:custDataLst>
           </p:nvPr>
         </p:nvSpPr>
@@ -1437,10 +1424,9 @@
           <a:p>
             <a:pPr lvl="0"/>
             <a:r>
-              <a:rPr lang="zh-CN" altLang="en-US" smtClean="0"/>
+              <a:rPr lang="zh-CN" altLang="en-US"/>
               <a:t>单击此处编辑母版标题样式</a:t>
             </a:r>
-            <a:endParaRPr lang="zh-CN" altLang="en-US"/>
           </a:p>
         </p:txBody>
       </p:sp>
@@ -1453,7 +1439,7 @@
           <p:nvPr>
             <p:ph type="body" idx="1" hasCustomPrompt="1"/>
             <p:custDataLst>
-              <p:tags r:id="rId3"/>
+              <p:tags r:id="rId2"/>
             </p:custDataLst>
           </p:nvPr>
         </p:nvSpPr>
@@ -1521,7 +1507,6 @@
               <a:rPr lang="zh-CN" altLang="en-US" dirty="0"/>
               <a:t>单击此处编辑文本</a:t>
             </a:r>
-            <a:endParaRPr lang="zh-CN" altLang="en-US" dirty="0"/>
           </a:p>
         </p:txBody>
       </p:sp>
@@ -1534,7 +1519,7 @@
           <p:nvPr>
             <p:ph sz="half" idx="2"/>
             <p:custDataLst>
-              <p:tags r:id="rId4"/>
+              <p:tags r:id="rId3"/>
             </p:custDataLst>
           </p:nvPr>
         </p:nvSpPr>
@@ -1552,42 +1537,37 @@
           <a:p>
             <a:pPr lvl="0"/>
             <a:r>
-              <a:rPr lang="zh-CN" altLang="en-US" smtClean="0"/>
+              <a:rPr lang="zh-CN" altLang="en-US"/>
               <a:t>单击此处编辑母版文本样式</a:t>
             </a:r>
-            <a:endParaRPr lang="zh-CN" altLang="en-US" smtClean="0"/>
           </a:p>
           <a:p>
             <a:pPr lvl="1"/>
             <a:r>
-              <a:rPr lang="zh-CN" altLang="en-US" smtClean="0"/>
+              <a:rPr lang="zh-CN" altLang="en-US"/>
               <a:t>第二级</a:t>
             </a:r>
-            <a:endParaRPr lang="zh-CN" altLang="en-US" smtClean="0"/>
           </a:p>
           <a:p>
             <a:pPr lvl="2"/>
             <a:r>
-              <a:rPr lang="zh-CN" altLang="en-US" smtClean="0"/>
+              <a:rPr lang="zh-CN" altLang="en-US"/>
               <a:t>第三级</a:t>
             </a:r>
-            <a:endParaRPr lang="zh-CN" altLang="en-US" smtClean="0"/>
           </a:p>
           <a:p>
             <a:pPr lvl="3"/>
             <a:r>
-              <a:rPr lang="zh-CN" altLang="en-US" smtClean="0"/>
+              <a:rPr lang="zh-CN" altLang="en-US"/>
               <a:t>第四级</a:t>
             </a:r>
-            <a:endParaRPr lang="zh-CN" altLang="en-US" smtClean="0"/>
           </a:p>
           <a:p>
             <a:pPr lvl="4"/>
             <a:r>
-              <a:rPr lang="zh-CN" altLang="en-US" smtClean="0"/>
+              <a:rPr lang="zh-CN" altLang="en-US"/>
               <a:t>第五级</a:t>
             </a:r>
-            <a:endParaRPr lang="zh-CN" altLang="en-US"/>
           </a:p>
         </p:txBody>
       </p:sp>
@@ -1600,7 +1580,7 @@
           <p:nvPr>
             <p:ph type="body" sz="quarter" idx="3" hasCustomPrompt="1"/>
             <p:custDataLst>
-              <p:tags r:id="rId5"/>
+              <p:tags r:id="rId4"/>
             </p:custDataLst>
           </p:nvPr>
         </p:nvSpPr>
@@ -1665,10 +1645,9 @@
           <a:p>
             <a:pPr lvl="0"/>
             <a:r>
-              <a:rPr lang="zh-CN" altLang="en-US" smtClean="0"/>
+              <a:rPr lang="zh-CN" altLang="en-US"/>
               <a:t>单击此处编辑文本</a:t>
             </a:r>
-            <a:endParaRPr lang="zh-CN" altLang="en-US"/>
           </a:p>
         </p:txBody>
       </p:sp>
@@ -1681,7 +1660,7 @@
           <p:nvPr>
             <p:ph sz="quarter" idx="4"/>
             <p:custDataLst>
-              <p:tags r:id="rId6"/>
+              <p:tags r:id="rId5"/>
             </p:custDataLst>
           </p:nvPr>
         </p:nvSpPr>
@@ -1699,42 +1678,37 @@
           <a:p>
             <a:pPr lvl="0"/>
             <a:r>
-              <a:rPr lang="zh-CN" altLang="en-US" smtClean="0"/>
+              <a:rPr lang="zh-CN" altLang="en-US"/>
               <a:t>单击此处编辑母版文本样式</a:t>
             </a:r>
-            <a:endParaRPr lang="zh-CN" altLang="en-US" smtClean="0"/>
           </a:p>
           <a:p>
             <a:pPr lvl="1"/>
             <a:r>
-              <a:rPr lang="zh-CN" altLang="en-US" smtClean="0"/>
+              <a:rPr lang="zh-CN" altLang="en-US"/>
               <a:t>第二级</a:t>
             </a:r>
-            <a:endParaRPr lang="zh-CN" altLang="en-US" smtClean="0"/>
           </a:p>
           <a:p>
             <a:pPr lvl="2"/>
             <a:r>
-              <a:rPr lang="zh-CN" altLang="en-US" smtClean="0"/>
+              <a:rPr lang="zh-CN" altLang="en-US"/>
               <a:t>第三级</a:t>
             </a:r>
-            <a:endParaRPr lang="zh-CN" altLang="en-US" smtClean="0"/>
           </a:p>
           <a:p>
             <a:pPr lvl="3"/>
             <a:r>
-              <a:rPr lang="zh-CN" altLang="en-US" smtClean="0"/>
+              <a:rPr lang="zh-CN" altLang="en-US"/>
               <a:t>第四级</a:t>
             </a:r>
-            <a:endParaRPr lang="zh-CN" altLang="en-US" smtClean="0"/>
           </a:p>
           <a:p>
             <a:pPr lvl="4"/>
             <a:r>
-              <a:rPr lang="zh-CN" altLang="en-US" smtClean="0"/>
+              <a:rPr lang="zh-CN" altLang="en-US"/>
               <a:t>第五级</a:t>
             </a:r>
-            <a:endParaRPr lang="zh-CN" altLang="en-US"/>
           </a:p>
         </p:txBody>
       </p:sp>
@@ -1747,7 +1721,7 @@
           <p:nvPr>
             <p:ph type="dt" sz="half" idx="10"/>
             <p:custDataLst>
-              <p:tags r:id="rId7"/>
+              <p:tags r:id="rId6"/>
             </p:custDataLst>
           </p:nvPr>
         </p:nvSpPr>
@@ -1758,6 +1732,7 @@
           <a:p>
             <a:fld id="{760FBDFE-C587-4B4C-A407-44438C67B59E}" type="datetimeFigureOut">
               <a:rPr lang="zh-CN" altLang="en-US" smtClean="0"/>
+              <a:t>2024/3/28</a:t>
             </a:fld>
             <a:endParaRPr lang="zh-CN" altLang="en-US"/>
           </a:p>
@@ -1772,29 +1747,29 @@
           <p:nvPr>
             <p:ph type="ftr" sz="quarter" idx="11"/>
             <p:custDataLst>
+              <p:tags r:id="rId7"/>
+            </p:custDataLst>
+          </p:nvPr>
+        </p:nvSpPr>
+        <p:spPr/>
+        <p:txBody>
+          <a:bodyPr/>
+          <a:lstStyle/>
+          <a:p>
+            <a:endParaRPr lang="zh-CN" altLang="en-US"/>
+          </a:p>
+        </p:txBody>
+      </p:sp>
+      <p:sp>
+        <p:nvSpPr>
+          <p:cNvPr id="9" name="灯片编号占位符 8"/>
+          <p:cNvSpPr>
+            <a:spLocks noGrp="1"/>
+          </p:cNvSpPr>
+          <p:nvPr>
+            <p:ph type="sldNum" sz="quarter" idx="12"/>
+            <p:custDataLst>
               <p:tags r:id="rId8"/>
-            </p:custDataLst>
-          </p:nvPr>
-        </p:nvSpPr>
-        <p:spPr/>
-        <p:txBody>
-          <a:bodyPr/>
-          <a:lstStyle/>
-          <a:p>
-            <a:endParaRPr lang="zh-CN" altLang="en-US"/>
-          </a:p>
-        </p:txBody>
-      </p:sp>
-      <p:sp>
-        <p:nvSpPr>
-          <p:cNvPr id="9" name="灯片编号占位符 8"/>
-          <p:cNvSpPr>
-            <a:spLocks noGrp="1"/>
-          </p:cNvSpPr>
-          <p:nvPr>
-            <p:ph type="sldNum" sz="quarter" idx="12"/>
-            <p:custDataLst>
-              <p:tags r:id="rId9"/>
             </p:custDataLst>
           </p:nvPr>
         </p:nvSpPr>
@@ -1805,6 +1780,7 @@
           <a:p>
             <a:fld id="{49AE70B2-8BF9-45C0-BB95-33D1B9D3A854}" type="slidenum">
               <a:rPr lang="zh-CN" altLang="en-US" smtClean="0"/>
+              <a:t>‹#›</a:t>
             </a:fld>
             <a:endParaRPr lang="zh-CN" altLang="en-US"/>
           </a:p>
@@ -1844,7 +1820,7 @@
           <p:nvPr>
             <p:ph type="title"/>
             <p:custDataLst>
-              <p:tags r:id="rId2"/>
+              <p:tags r:id="rId1"/>
             </p:custDataLst>
           </p:nvPr>
         </p:nvSpPr>
@@ -1862,10 +1838,9 @@
           <a:p>
             <a:pPr lvl="0"/>
             <a:r>
-              <a:rPr lang="zh-CN" altLang="en-US" smtClean="0"/>
+              <a:rPr lang="zh-CN" altLang="en-US"/>
               <a:t>单击此处编辑母版标题样式</a:t>
             </a:r>
-            <a:endParaRPr lang="zh-CN" altLang="en-US"/>
           </a:p>
         </p:txBody>
       </p:sp>
@@ -1878,7 +1853,7 @@
           <p:nvPr>
             <p:ph type="dt" sz="half" idx="10"/>
             <p:custDataLst>
-              <p:tags r:id="rId3"/>
+              <p:tags r:id="rId2"/>
             </p:custDataLst>
           </p:nvPr>
         </p:nvSpPr>
@@ -1889,6 +1864,7 @@
           <a:p>
             <a:fld id="{760FBDFE-C587-4B4C-A407-44438C67B59E}" type="datetimeFigureOut">
               <a:rPr lang="zh-CN" altLang="en-US" smtClean="0"/>
+              <a:t>2024/3/28</a:t>
             </a:fld>
             <a:endParaRPr lang="zh-CN" altLang="en-US"/>
           </a:p>
@@ -1903,29 +1879,29 @@
           <p:nvPr>
             <p:ph type="ftr" sz="quarter" idx="11"/>
             <p:custDataLst>
+              <p:tags r:id="rId3"/>
+            </p:custDataLst>
+          </p:nvPr>
+        </p:nvSpPr>
+        <p:spPr/>
+        <p:txBody>
+          <a:bodyPr/>
+          <a:lstStyle/>
+          <a:p>
+            <a:endParaRPr lang="zh-CN" altLang="en-US"/>
+          </a:p>
+        </p:txBody>
+      </p:sp>
+      <p:sp>
+        <p:nvSpPr>
+          <p:cNvPr id="5" name="灯片编号占位符 4"/>
+          <p:cNvSpPr>
+            <a:spLocks noGrp="1"/>
+          </p:cNvSpPr>
+          <p:nvPr>
+            <p:ph type="sldNum" sz="quarter" idx="12"/>
+            <p:custDataLst>
               <p:tags r:id="rId4"/>
-            </p:custDataLst>
-          </p:nvPr>
-        </p:nvSpPr>
-        <p:spPr/>
-        <p:txBody>
-          <a:bodyPr/>
-          <a:lstStyle/>
-          <a:p>
-            <a:endParaRPr lang="zh-CN" altLang="en-US"/>
-          </a:p>
-        </p:txBody>
-      </p:sp>
-      <p:sp>
-        <p:nvSpPr>
-          <p:cNvPr id="5" name="灯片编号占位符 4"/>
-          <p:cNvSpPr>
-            <a:spLocks noGrp="1"/>
-          </p:cNvSpPr>
-          <p:nvPr>
-            <p:ph type="sldNum" sz="quarter" idx="12"/>
-            <p:custDataLst>
-              <p:tags r:id="rId5"/>
             </p:custDataLst>
           </p:nvPr>
         </p:nvSpPr>
@@ -1936,6 +1912,7 @@
           <a:p>
             <a:fld id="{49AE70B2-8BF9-45C0-BB95-33D1B9D3A854}" type="slidenum">
               <a:rPr lang="zh-CN" altLang="en-US" smtClean="0"/>
+              <a:t>‹#›</a:t>
             </a:fld>
             <a:endParaRPr lang="zh-CN" altLang="en-US"/>
           </a:p>
@@ -1975,7 +1952,7 @@
           <p:nvPr>
             <p:ph type="dt" sz="half" idx="10"/>
             <p:custDataLst>
-              <p:tags r:id="rId2"/>
+              <p:tags r:id="rId1"/>
             </p:custDataLst>
           </p:nvPr>
         </p:nvSpPr>
@@ -1986,6 +1963,7 @@
           <a:p>
             <a:fld id="{760FBDFE-C587-4B4C-A407-44438C67B59E}" type="datetimeFigureOut">
               <a:rPr lang="zh-CN" altLang="en-US" smtClean="0"/>
+              <a:t>2024/3/28</a:t>
             </a:fld>
             <a:endParaRPr lang="zh-CN" altLang="en-US"/>
           </a:p>
@@ -2000,29 +1978,29 @@
           <p:nvPr>
             <p:ph type="ftr" sz="quarter" idx="11"/>
             <p:custDataLst>
+              <p:tags r:id="rId2"/>
+            </p:custDataLst>
+          </p:nvPr>
+        </p:nvSpPr>
+        <p:spPr/>
+        <p:txBody>
+          <a:bodyPr/>
+          <a:lstStyle/>
+          <a:p>
+            <a:endParaRPr lang="zh-CN" altLang="en-US"/>
+          </a:p>
+        </p:txBody>
+      </p:sp>
+      <p:sp>
+        <p:nvSpPr>
+          <p:cNvPr id="4" name="灯片编号占位符 3"/>
+          <p:cNvSpPr>
+            <a:spLocks noGrp="1"/>
+          </p:cNvSpPr>
+          <p:nvPr>
+            <p:ph type="sldNum" sz="quarter" idx="12"/>
+            <p:custDataLst>
               <p:tags r:id="rId3"/>
-            </p:custDataLst>
-          </p:nvPr>
-        </p:nvSpPr>
-        <p:spPr/>
-        <p:txBody>
-          <a:bodyPr/>
-          <a:lstStyle/>
-          <a:p>
-            <a:endParaRPr lang="zh-CN" altLang="en-US"/>
-          </a:p>
-        </p:txBody>
-      </p:sp>
-      <p:sp>
-        <p:nvSpPr>
-          <p:cNvPr id="4" name="灯片编号占位符 3"/>
-          <p:cNvSpPr>
-            <a:spLocks noGrp="1"/>
-          </p:cNvSpPr>
-          <p:nvPr>
-            <p:ph type="sldNum" sz="quarter" idx="12"/>
-            <p:custDataLst>
-              <p:tags r:id="rId4"/>
             </p:custDataLst>
           </p:nvPr>
         </p:nvSpPr>
@@ -2033,6 +2011,7 @@
           <a:p>
             <a:fld id="{49AE70B2-8BF9-45C0-BB95-33D1B9D3A854}" type="slidenum">
               <a:rPr lang="zh-CN" altLang="en-US" smtClean="0"/>
+              <a:t>‹#›</a:t>
             </a:fld>
             <a:endParaRPr lang="zh-CN" altLang="en-US"/>
           </a:p>
@@ -2072,7 +2051,7 @@
           <p:nvPr>
             <p:ph type="pic" idx="1"/>
             <p:custDataLst>
-              <p:tags r:id="rId2"/>
+              <p:tags r:id="rId1"/>
             </p:custDataLst>
           </p:nvPr>
         </p:nvSpPr>
@@ -2107,7 +2086,7 @@
           <p:nvPr>
             <p:ph type="body" sz="half" idx="2"/>
             <p:custDataLst>
-              <p:tags r:id="rId3"/>
+              <p:tags r:id="rId2"/>
             </p:custDataLst>
           </p:nvPr>
         </p:nvSpPr>
@@ -2130,10 +2109,9 @@
           <a:p>
             <a:pPr lvl="0"/>
             <a:r>
-              <a:rPr lang="zh-CN" altLang="en-US" smtClean="0"/>
+              <a:rPr lang="zh-CN" altLang="en-US"/>
               <a:t>单击此处编辑母版文本样式</a:t>
             </a:r>
-            <a:endParaRPr lang="zh-CN" altLang="en-US"/>
           </a:p>
         </p:txBody>
       </p:sp>
@@ -2146,7 +2124,7 @@
           <p:nvPr>
             <p:ph type="dt" sz="half" idx="10"/>
             <p:custDataLst>
-              <p:tags r:id="rId4"/>
+              <p:tags r:id="rId3"/>
             </p:custDataLst>
           </p:nvPr>
         </p:nvSpPr>
@@ -2157,6 +2135,7 @@
           <a:p>
             <a:fld id="{9EFD9D74-47D9-4702-A33C-335B63B48DBF}" type="datetimeFigureOut">
               <a:rPr lang="zh-CN" altLang="en-US" smtClean="0"/>
+              <a:t>2024/3/28</a:t>
             </a:fld>
             <a:endParaRPr lang="zh-CN" altLang="en-US" dirty="0"/>
           </a:p>
@@ -2171,29 +2150,29 @@
           <p:nvPr>
             <p:ph type="ftr" sz="quarter" idx="11"/>
             <p:custDataLst>
+              <p:tags r:id="rId4"/>
+            </p:custDataLst>
+          </p:nvPr>
+        </p:nvSpPr>
+        <p:spPr/>
+        <p:txBody>
+          <a:bodyPr/>
+          <a:lstStyle/>
+          <a:p>
+            <a:endParaRPr lang="zh-CN" altLang="en-US" dirty="0"/>
+          </a:p>
+        </p:txBody>
+      </p:sp>
+      <p:sp>
+        <p:nvSpPr>
+          <p:cNvPr id="7" name="灯片编号占位符 6"/>
+          <p:cNvSpPr>
+            <a:spLocks noGrp="1"/>
+          </p:cNvSpPr>
+          <p:nvPr>
+            <p:ph type="sldNum" sz="quarter" idx="12"/>
+            <p:custDataLst>
               <p:tags r:id="rId5"/>
-            </p:custDataLst>
-          </p:nvPr>
-        </p:nvSpPr>
-        <p:spPr/>
-        <p:txBody>
-          <a:bodyPr/>
-          <a:lstStyle/>
-          <a:p>
-            <a:endParaRPr lang="zh-CN" altLang="en-US" dirty="0"/>
-          </a:p>
-        </p:txBody>
-      </p:sp>
-      <p:sp>
-        <p:nvSpPr>
-          <p:cNvPr id="7" name="灯片编号占位符 6"/>
-          <p:cNvSpPr>
-            <a:spLocks noGrp="1"/>
-          </p:cNvSpPr>
-          <p:nvPr>
-            <p:ph type="sldNum" sz="quarter" idx="12"/>
-            <p:custDataLst>
-              <p:tags r:id="rId6"/>
             </p:custDataLst>
           </p:nvPr>
         </p:nvSpPr>
@@ -2204,6 +2183,7 @@
           <a:p>
             <a:fld id="{FABC47A4-756D-490B-A52F-7D9E2C9FC05F}" type="slidenum">
               <a:rPr lang="zh-CN" altLang="en-US" smtClean="0"/>
+              <a:t>‹#›</a:t>
             </a:fld>
             <a:endParaRPr lang="zh-CN" altLang="en-US"/>
           </a:p>
@@ -2218,19 +2198,19 @@
           <p:nvPr>
             <p:ph type="title"/>
             <p:custDataLst>
-              <p:tags r:id="rId7"/>
+              <p:tags r:id="rId6"/>
             </p:custDataLst>
           </p:nvPr>
         </p:nvSpPr>
         <p:spPr/>
         <p:txBody>
           <a:bodyPr/>
+          <a:lstStyle/>
           <a:p>
             <a:r>
               <a:rPr lang="zh-CN" altLang="en-US"/>
               <a:t>单击此处编辑母版标题样式</a:t>
             </a:r>
-            <a:endParaRPr lang="zh-CN" altLang="en-US"/>
           </a:p>
         </p:txBody>
       </p:sp>
@@ -2268,7 +2248,7 @@
           <p:nvPr>
             <p:ph type="title" orient="vert" hasCustomPrompt="1"/>
             <p:custDataLst>
-              <p:tags r:id="rId2"/>
+              <p:tags r:id="rId1"/>
             </p:custDataLst>
           </p:nvPr>
         </p:nvSpPr>
@@ -2291,10 +2271,9 @@
           <a:p>
             <a:pPr lvl="0"/>
             <a:r>
-              <a:rPr lang="zh-CN" altLang="en-US" smtClean="0"/>
+              <a:rPr lang="zh-CN" altLang="en-US"/>
               <a:t>单击此处编辑标题</a:t>
             </a:r>
-            <a:endParaRPr lang="zh-CN" altLang="en-US"/>
           </a:p>
         </p:txBody>
       </p:sp>
@@ -2307,7 +2286,7 @@
           <p:nvPr>
             <p:ph type="body" orient="vert" idx="1"/>
             <p:custDataLst>
-              <p:tags r:id="rId3"/>
+              <p:tags r:id="rId2"/>
             </p:custDataLst>
           </p:nvPr>
         </p:nvSpPr>
@@ -2345,7 +2324,6 @@
               <a:rPr lang="zh-CN" altLang="en-US" dirty="0"/>
               <a:t>单击此处编辑母版文本样式</a:t>
             </a:r>
-            <a:endParaRPr lang="zh-CN" altLang="en-US" dirty="0"/>
           </a:p>
           <a:p>
             <a:pPr lvl="1"/>
@@ -2353,7 +2331,6 @@
               <a:rPr lang="zh-CN" altLang="en-US" dirty="0"/>
               <a:t>第二级</a:t>
             </a:r>
-            <a:endParaRPr lang="zh-CN" altLang="en-US" dirty="0"/>
           </a:p>
           <a:p>
             <a:pPr lvl="2"/>
@@ -2361,7 +2338,6 @@
               <a:rPr lang="zh-CN" altLang="en-US" dirty="0"/>
               <a:t>第三级</a:t>
             </a:r>
-            <a:endParaRPr lang="zh-CN" altLang="en-US" dirty="0"/>
           </a:p>
           <a:p>
             <a:pPr lvl="3"/>
@@ -2369,7 +2345,6 @@
               <a:rPr lang="zh-CN" altLang="en-US" dirty="0"/>
               <a:t>第四级</a:t>
             </a:r>
-            <a:endParaRPr lang="zh-CN" altLang="en-US" dirty="0"/>
           </a:p>
           <a:p>
             <a:pPr lvl="4"/>
@@ -2377,7 +2352,6 @@
               <a:rPr lang="zh-CN" altLang="en-US" dirty="0"/>
               <a:t>第五级</a:t>
             </a:r>
-            <a:endParaRPr lang="zh-CN" altLang="en-US" dirty="0"/>
           </a:p>
         </p:txBody>
       </p:sp>
@@ -2390,7 +2364,7 @@
           <p:nvPr>
             <p:ph type="dt" sz="half" idx="10"/>
             <p:custDataLst>
-              <p:tags r:id="rId4"/>
+              <p:tags r:id="rId3"/>
             </p:custDataLst>
           </p:nvPr>
         </p:nvSpPr>
@@ -2401,6 +2375,7 @@
           <a:p>
             <a:fld id="{760FBDFE-C587-4B4C-A407-44438C67B59E}" type="datetimeFigureOut">
               <a:rPr lang="zh-CN" altLang="en-US" smtClean="0"/>
+              <a:t>2024/3/28</a:t>
             </a:fld>
             <a:endParaRPr lang="zh-CN" altLang="en-US"/>
           </a:p>
@@ -2415,29 +2390,29 @@
           <p:nvPr>
             <p:ph type="ftr" sz="quarter" idx="11"/>
             <p:custDataLst>
+              <p:tags r:id="rId4"/>
+            </p:custDataLst>
+          </p:nvPr>
+        </p:nvSpPr>
+        <p:spPr/>
+        <p:txBody>
+          <a:bodyPr/>
+          <a:lstStyle/>
+          <a:p>
+            <a:endParaRPr lang="zh-CN" altLang="en-US"/>
+          </a:p>
+        </p:txBody>
+      </p:sp>
+      <p:sp>
+        <p:nvSpPr>
+          <p:cNvPr id="6" name="灯片编号占位符 5"/>
+          <p:cNvSpPr>
+            <a:spLocks noGrp="1"/>
+          </p:cNvSpPr>
+          <p:nvPr>
+            <p:ph type="sldNum" sz="quarter" idx="12"/>
+            <p:custDataLst>
               <p:tags r:id="rId5"/>
-            </p:custDataLst>
-          </p:nvPr>
-        </p:nvSpPr>
-        <p:spPr/>
-        <p:txBody>
-          <a:bodyPr/>
-          <a:lstStyle/>
-          <a:p>
-            <a:endParaRPr lang="zh-CN" altLang="en-US"/>
-          </a:p>
-        </p:txBody>
-      </p:sp>
-      <p:sp>
-        <p:nvSpPr>
-          <p:cNvPr id="6" name="灯片编号占位符 5"/>
-          <p:cNvSpPr>
-            <a:spLocks noGrp="1"/>
-          </p:cNvSpPr>
-          <p:nvPr>
-            <p:ph type="sldNum" sz="quarter" idx="12"/>
-            <p:custDataLst>
-              <p:tags r:id="rId6"/>
             </p:custDataLst>
           </p:nvPr>
         </p:nvSpPr>
@@ -2448,6 +2423,7 @@
           <a:p>
             <a:fld id="{49AE70B2-8BF9-45C0-BB95-33D1B9D3A854}" type="slidenum">
               <a:rPr lang="zh-CN" altLang="en-US" smtClean="0"/>
+              <a:t>‹#›</a:t>
             </a:fld>
             <a:endParaRPr lang="zh-CN" altLang="en-US"/>
           </a:p>
@@ -2492,7 +2468,7 @@
           <p:nvPr>
             <p:ph type="title"/>
             <p:custDataLst>
-              <p:tags r:id="rId12"/>
+              <p:tags r:id="rId14"/>
             </p:custDataLst>
           </p:nvPr>
         </p:nvSpPr>
@@ -2515,7 +2491,6 @@
               <a:rPr lang="zh-CN" altLang="en-US" dirty="0"/>
               <a:t>单击此处编辑母版标题样式</a:t>
             </a:r>
-            <a:endParaRPr lang="zh-CN" altLang="en-US" dirty="0"/>
           </a:p>
         </p:txBody>
       </p:sp>
@@ -2528,7 +2503,7 @@
           <p:nvPr>
             <p:ph type="body" idx="1"/>
             <p:custDataLst>
-              <p:tags r:id="rId13"/>
+              <p:tags r:id="rId15"/>
             </p:custDataLst>
           </p:nvPr>
         </p:nvSpPr>
@@ -2552,7 +2527,6 @@
               <a:rPr lang="zh-CN" altLang="en-US" dirty="0"/>
               <a:t>单击此处编辑母版文本样式</a:t>
             </a:r>
-            <a:endParaRPr lang="zh-CN" altLang="en-US" dirty="0"/>
           </a:p>
           <a:p>
             <a:pPr lvl="1"/>
@@ -2560,7 +2534,6 @@
               <a:rPr lang="zh-CN" altLang="en-US" dirty="0"/>
               <a:t>第二级</a:t>
             </a:r>
-            <a:endParaRPr lang="zh-CN" altLang="en-US" dirty="0"/>
           </a:p>
           <a:p>
             <a:pPr lvl="2"/>
@@ -2568,7 +2541,6 @@
               <a:rPr lang="zh-CN" altLang="en-US" dirty="0"/>
               <a:t>第三级</a:t>
             </a:r>
-            <a:endParaRPr lang="zh-CN" altLang="en-US" dirty="0"/>
           </a:p>
           <a:p>
             <a:pPr lvl="3"/>
@@ -2576,7 +2548,6 @@
               <a:rPr lang="zh-CN" altLang="en-US" dirty="0"/>
               <a:t>第四级</a:t>
             </a:r>
-            <a:endParaRPr lang="zh-CN" altLang="en-US" dirty="0"/>
           </a:p>
           <a:p>
             <a:pPr lvl="4"/>
@@ -2584,7 +2555,6 @@
               <a:rPr lang="zh-CN" altLang="en-US" dirty="0"/>
               <a:t>第五级</a:t>
             </a:r>
-            <a:endParaRPr lang="zh-CN" altLang="en-US" dirty="0"/>
           </a:p>
         </p:txBody>
       </p:sp>
@@ -2597,7 +2567,7 @@
           <p:nvPr>
             <p:ph type="dt" sz="half" idx="2"/>
             <p:custDataLst>
-              <p:tags r:id="rId14"/>
+              <p:tags r:id="rId16"/>
             </p:custDataLst>
           </p:nvPr>
         </p:nvSpPr>
@@ -2628,6 +2598,7 @@
           <a:p>
             <a:fld id="{760FBDFE-C587-4B4C-A407-44438C67B59E}" type="datetimeFigureOut">
               <a:rPr lang="zh-CN" altLang="en-US" smtClean="0"/>
+              <a:t>2024/3/28</a:t>
             </a:fld>
             <a:endParaRPr lang="zh-CN" altLang="en-US"/>
           </a:p>
@@ -2642,7 +2613,7 @@
           <p:nvPr>
             <p:ph type="ftr" sz="quarter" idx="3"/>
             <p:custDataLst>
-              <p:tags r:id="rId15"/>
+              <p:tags r:id="rId17"/>
             </p:custDataLst>
           </p:nvPr>
         </p:nvSpPr>
@@ -2684,7 +2655,7 @@
           <p:nvPr>
             <p:ph type="sldNum" sz="quarter" idx="4"/>
             <p:custDataLst>
-              <p:tags r:id="rId16"/>
+              <p:tags r:id="rId18"/>
             </p:custDataLst>
           </p:nvPr>
         </p:nvSpPr>
@@ -2715,6 +2686,7 @@
           <a:p>
             <a:fld id="{49AE70B2-8BF9-45C0-BB95-33D1B9D3A854}" type="slidenum">
               <a:rPr lang="zh-CN" altLang="en-US" smtClean="0"/>
+              <a:t>‹#›</a:t>
             </a:fld>
             <a:endParaRPr lang="zh-CN" altLang="en-US" dirty="0"/>
           </a:p>
@@ -2722,7 +2694,7 @@
       </p:sp>
     </p:spTree>
     <p:custDataLst>
-      <p:tags r:id="rId17"/>
+      <p:tags r:id="rId13"/>
     </p:custDataLst>
   </p:cSld>
   <p:clrMap bg1="lt1" tx1="dk1" bg2="lt2" tx2="dk2" accent1="accent1" accent2="accent2" accent3="accent3" accent4="accent4" accent5="accent5" accent6="accent6" hlink="hlink" folHlink="folHlink"/>
@@ -3086,22 +3058,34 @@
       </p:grpSpPr>
       <p:pic>
         <p:nvPicPr>
-          <p:cNvPr id="4" name="图片 3" descr="Exp_plot"/>
+          <p:cNvPr id="26" name="图片 25">
+            <a:extLst>
+              <a:ext uri="{FF2B5EF4-FFF2-40B4-BE49-F238E27FC236}">
+                <a16:creationId xmlns:a16="http://schemas.microsoft.com/office/drawing/2014/main" id="{28BE8A9C-56F6-418A-97A3-9CDAAB2E48A1}"/>
+              </a:ext>
+            </a:extLst>
+          </p:cNvPr>
           <p:cNvPicPr>
             <a:picLocks noChangeAspect="1"/>
           </p:cNvPicPr>
           <p:nvPr/>
         </p:nvPicPr>
         <p:blipFill>
-          <a:blip r:embed="rId1"/>
+          <a:blip r:embed="rId6">
+            <a:extLst>
+              <a:ext uri="{28A0092B-C50C-407E-A947-70E740481C1C}">
+                <a14:useLocalDpi xmlns:a14="http://schemas.microsoft.com/office/drawing/2010/main" val="0"/>
+              </a:ext>
+            </a:extLst>
+          </a:blip>
           <a:stretch>
             <a:fillRect/>
           </a:stretch>
         </p:blipFill>
         <p:spPr>
           <a:xfrm>
-            <a:off x="-65552" y="0"/>
-            <a:ext cx="6858000" cy="6858000"/>
+            <a:off x="0" y="32543"/>
+            <a:ext cx="6792913" cy="6792913"/>
           </a:xfrm>
           <a:prstGeom prst="rect">
             <a:avLst/>
@@ -3128,6 +3112,7 @@
           <a:bodyPr wrap="square" rtlCol="0">
             <a:spAutoFit/>
           </a:bodyPr>
+          <a:lstStyle/>
           <a:p>
             <a:r>
               <a:rPr lang="en-US" altLang="zh-CN">
@@ -3136,10 +3121,6 @@
               </a:rPr>
               <a:t>Basal</a:t>
             </a:r>
-            <a:endParaRPr lang="en-US" altLang="zh-CN">
-              <a:latin typeface="微软雅黑" panose="020B0503020204020204" charset="-122"/>
-              <a:ea typeface="微软雅黑" panose="020B0503020204020204" charset="-122"/>
-            </a:endParaRPr>
           </a:p>
         </p:txBody>
       </p:sp>
@@ -3167,25 +3148,15 @@
           <a:bodyPr wrap="square" rtlCol="0">
             <a:spAutoFit/>
           </a:bodyPr>
+          <a:lstStyle/>
           <a:p>
             <a:r>
               <a:rPr lang="en-US" altLang="zh-CN">
                 <a:latin typeface="微软雅黑" panose="020B0503020204020204" charset="-122"/>
                 <a:ea typeface="微软雅黑" panose="020B0503020204020204" charset="-122"/>
               </a:rPr>
-              <a:t>Lum</a:t>
-            </a:r>
-            <a:r>
-              <a:rPr lang="en-US" altLang="zh-CN">
-                <a:latin typeface="微软雅黑" panose="020B0503020204020204" charset="-122"/>
-                <a:ea typeface="微软雅黑" panose="020B0503020204020204" charset="-122"/>
-              </a:rPr>
-              <a:t>A</a:t>
-            </a:r>
-            <a:endParaRPr lang="en-US" altLang="zh-CN">
-              <a:latin typeface="微软雅黑" panose="020B0503020204020204" charset="-122"/>
-              <a:ea typeface="微软雅黑" panose="020B0503020204020204" charset="-122"/>
-            </a:endParaRPr>
+              <a:t>LumA</a:t>
+            </a:r>
           </a:p>
         </p:txBody>
       </p:sp>
@@ -3213,25 +3184,15 @@
           <a:bodyPr wrap="square" rtlCol="0">
             <a:spAutoFit/>
           </a:bodyPr>
+          <a:lstStyle/>
           <a:p>
             <a:r>
               <a:rPr lang="en-US" altLang="zh-CN">
                 <a:latin typeface="微软雅黑" panose="020B0503020204020204" charset="-122"/>
                 <a:ea typeface="微软雅黑" panose="020B0503020204020204" charset="-122"/>
               </a:rPr>
-              <a:t>Lum</a:t>
-            </a:r>
-            <a:r>
-              <a:rPr lang="en-US" altLang="zh-CN">
-                <a:latin typeface="微软雅黑" panose="020B0503020204020204" charset="-122"/>
-                <a:ea typeface="微软雅黑" panose="020B0503020204020204" charset="-122"/>
-              </a:rPr>
-              <a:t>B</a:t>
-            </a:r>
-            <a:endParaRPr lang="en-US" altLang="zh-CN">
-              <a:latin typeface="微软雅黑" panose="020B0503020204020204" charset="-122"/>
-              <a:ea typeface="微软雅黑" panose="020B0503020204020204" charset="-122"/>
-            </a:endParaRPr>
+              <a:t>LumB</a:t>
+            </a:r>
           </a:p>
         </p:txBody>
       </p:sp>
@@ -3259,6 +3220,7 @@
           <a:bodyPr wrap="square" rtlCol="0">
             <a:spAutoFit/>
           </a:bodyPr>
+          <a:lstStyle/>
           <a:p>
             <a:r>
               <a:rPr lang="en-US" altLang="zh-CN">
@@ -3267,16 +3229,12 @@
               </a:rPr>
               <a:t>Her2</a:t>
             </a:r>
-            <a:endParaRPr lang="en-US" altLang="zh-CN">
-              <a:latin typeface="微软雅黑" panose="020B0503020204020204" charset="-122"/>
-              <a:ea typeface="微软雅黑" panose="020B0503020204020204" charset="-122"/>
-            </a:endParaRPr>
           </a:p>
         </p:txBody>
       </p:sp>
     </p:spTree>
     <p:custDataLst>
-      <p:tags r:id="rId5"/>
+      <p:tags r:id="rId1"/>
     </p:custDataLst>
   </p:cSld>
   <p:clrMapOvr>
@@ -3304,22 +3262,34 @@
       </p:grpSpPr>
       <p:pic>
         <p:nvPicPr>
-          <p:cNvPr id="2" name="图片 1" descr="Meth_plot"/>
+          <p:cNvPr id="4" name="图片 3">
+            <a:extLst>
+              <a:ext uri="{FF2B5EF4-FFF2-40B4-BE49-F238E27FC236}">
+                <a16:creationId xmlns:a16="http://schemas.microsoft.com/office/drawing/2014/main" id="{DBBC34D7-2C5F-41FC-8D85-C01313439F50}"/>
+              </a:ext>
+            </a:extLst>
+          </p:cNvPr>
           <p:cNvPicPr>
             <a:picLocks noChangeAspect="1"/>
           </p:cNvPicPr>
           <p:nvPr/>
         </p:nvPicPr>
         <p:blipFill>
-          <a:blip r:embed="rId1"/>
+          <a:blip r:embed="rId6">
+            <a:extLst>
+              <a:ext uri="{28A0092B-C50C-407E-A947-70E740481C1C}">
+                <a14:useLocalDpi xmlns:a14="http://schemas.microsoft.com/office/drawing/2010/main" val="0"/>
+              </a:ext>
+            </a:extLst>
+          </a:blip>
           <a:stretch>
             <a:fillRect/>
           </a:stretch>
         </p:blipFill>
         <p:spPr>
           <a:xfrm>
-            <a:off x="635" y="0"/>
-            <a:ext cx="6791960" cy="6791960"/>
+            <a:off x="0" y="32543"/>
+            <a:ext cx="6792913" cy="6792913"/>
           </a:xfrm>
           <a:prstGeom prst="rect">
             <a:avLst/>
@@ -3334,7 +3304,7 @@
         </p:nvSpPr>
         <p:spPr>
           <a:xfrm>
-            <a:off x="889000" y="399415"/>
+            <a:off x="641227" y="399415"/>
             <a:ext cx="855980" cy="368300"/>
           </a:xfrm>
           <a:prstGeom prst="rect">
@@ -3346,18 +3316,15 @@
           <a:bodyPr wrap="square" rtlCol="0">
             <a:spAutoFit/>
           </a:bodyPr>
-          <a:p>
-            <a:r>
-              <a:rPr lang="en-US" altLang="zh-CN">
+          <a:lstStyle/>
+          <a:p>
+            <a:r>
+              <a:rPr lang="en-US" altLang="zh-CN" dirty="0">
                 <a:latin typeface="微软雅黑" panose="020B0503020204020204" charset="-122"/>
                 <a:ea typeface="微软雅黑" panose="020B0503020204020204" charset="-122"/>
               </a:rPr>
               <a:t>Basal</a:t>
             </a:r>
-            <a:endParaRPr lang="en-US" altLang="zh-CN">
-              <a:latin typeface="微软雅黑" panose="020B0503020204020204" charset="-122"/>
-              <a:ea typeface="微软雅黑" panose="020B0503020204020204" charset="-122"/>
-            </a:endParaRPr>
           </a:p>
         </p:txBody>
       </p:sp>
@@ -3385,25 +3352,15 @@
           <a:bodyPr wrap="square" rtlCol="0">
             <a:spAutoFit/>
           </a:bodyPr>
+          <a:lstStyle/>
           <a:p>
             <a:r>
               <a:rPr lang="en-US" altLang="zh-CN">
                 <a:latin typeface="微软雅黑" panose="020B0503020204020204" charset="-122"/>
                 <a:ea typeface="微软雅黑" panose="020B0503020204020204" charset="-122"/>
               </a:rPr>
-              <a:t>Lum</a:t>
-            </a:r>
-            <a:r>
-              <a:rPr lang="en-US" altLang="zh-CN">
-                <a:latin typeface="微软雅黑" panose="020B0503020204020204" charset="-122"/>
-                <a:ea typeface="微软雅黑" panose="020B0503020204020204" charset="-122"/>
-              </a:rPr>
-              <a:t>A</a:t>
-            </a:r>
-            <a:endParaRPr lang="en-US" altLang="zh-CN">
-              <a:latin typeface="微软雅黑" panose="020B0503020204020204" charset="-122"/>
-              <a:ea typeface="微软雅黑" panose="020B0503020204020204" charset="-122"/>
-            </a:endParaRPr>
+              <a:t>LumA</a:t>
+            </a:r>
           </a:p>
         </p:txBody>
       </p:sp>
@@ -3431,25 +3388,15 @@
           <a:bodyPr wrap="square" rtlCol="0">
             <a:spAutoFit/>
           </a:bodyPr>
+          <a:lstStyle/>
           <a:p>
             <a:r>
               <a:rPr lang="en-US" altLang="zh-CN">
                 <a:latin typeface="微软雅黑" panose="020B0503020204020204" charset="-122"/>
                 <a:ea typeface="微软雅黑" panose="020B0503020204020204" charset="-122"/>
               </a:rPr>
-              <a:t>Lum</a:t>
-            </a:r>
-            <a:r>
-              <a:rPr lang="en-US" altLang="zh-CN">
-                <a:latin typeface="微软雅黑" panose="020B0503020204020204" charset="-122"/>
-                <a:ea typeface="微软雅黑" panose="020B0503020204020204" charset="-122"/>
-              </a:rPr>
-              <a:t>B</a:t>
-            </a:r>
-            <a:endParaRPr lang="en-US" altLang="zh-CN">
-              <a:latin typeface="微软雅黑" panose="020B0503020204020204" charset="-122"/>
-              <a:ea typeface="微软雅黑" panose="020B0503020204020204" charset="-122"/>
-            </a:endParaRPr>
+              <a:t>LumB</a:t>
+            </a:r>
           </a:p>
         </p:txBody>
       </p:sp>
@@ -3477,6 +3424,7 @@
           <a:bodyPr wrap="square" rtlCol="0">
             <a:spAutoFit/>
           </a:bodyPr>
+          <a:lstStyle/>
           <a:p>
             <a:r>
               <a:rPr lang="en-US" altLang="zh-CN">
@@ -3485,16 +3433,12 @@
               </a:rPr>
               <a:t>Her2</a:t>
             </a:r>
-            <a:endParaRPr lang="en-US" altLang="zh-CN">
-              <a:latin typeface="微软雅黑" panose="020B0503020204020204" charset="-122"/>
-              <a:ea typeface="微软雅黑" panose="020B0503020204020204" charset="-122"/>
-            </a:endParaRPr>
           </a:p>
         </p:txBody>
       </p:sp>
     </p:spTree>
     <p:custDataLst>
-      <p:tags r:id="rId5"/>
+      <p:tags r:id="rId1"/>
     </p:custDataLst>
   </p:cSld>
   <p:clrMapOvr>
@@ -3522,14 +3466,26 @@
       </p:grpSpPr>
       <p:pic>
         <p:nvPicPr>
-          <p:cNvPr id="2" name="图片 1" descr="miRNA_plot"/>
+          <p:cNvPr id="4" name="图片 3">
+            <a:extLst>
+              <a:ext uri="{FF2B5EF4-FFF2-40B4-BE49-F238E27FC236}">
+                <a16:creationId xmlns:a16="http://schemas.microsoft.com/office/drawing/2014/main" id="{03767041-8D83-4645-9722-E0928ABBED58}"/>
+              </a:ext>
+            </a:extLst>
+          </p:cNvPr>
           <p:cNvPicPr>
             <a:picLocks noChangeAspect="1"/>
           </p:cNvPicPr>
           <p:nvPr/>
         </p:nvPicPr>
         <p:blipFill>
-          <a:blip r:embed="rId1"/>
+          <a:blip r:embed="rId6">
+            <a:extLst>
+              <a:ext uri="{28A0092B-C50C-407E-A947-70E740481C1C}">
+                <a14:useLocalDpi xmlns:a14="http://schemas.microsoft.com/office/drawing/2010/main" val="0"/>
+              </a:ext>
+            </a:extLst>
+          </a:blip>
           <a:stretch>
             <a:fillRect/>
           </a:stretch>
@@ -3537,7 +3493,7 @@
         <p:spPr>
           <a:xfrm>
             <a:off x="0" y="0"/>
-            <a:ext cx="6791960" cy="6791960"/>
+            <a:ext cx="6792913" cy="6792913"/>
           </a:xfrm>
           <a:prstGeom prst="rect">
             <a:avLst/>
@@ -3552,7 +3508,7 @@
         </p:nvSpPr>
         <p:spPr>
           <a:xfrm>
-            <a:off x="889000" y="399415"/>
+            <a:off x="605831" y="399415"/>
             <a:ext cx="855980" cy="368300"/>
           </a:xfrm>
           <a:prstGeom prst="rect">
@@ -3564,18 +3520,15 @@
           <a:bodyPr wrap="square" rtlCol="0">
             <a:spAutoFit/>
           </a:bodyPr>
-          <a:p>
-            <a:r>
-              <a:rPr lang="en-US" altLang="zh-CN">
+          <a:lstStyle/>
+          <a:p>
+            <a:r>
+              <a:rPr lang="en-US" altLang="zh-CN" dirty="0">
                 <a:latin typeface="微软雅黑" panose="020B0503020204020204" charset="-122"/>
                 <a:ea typeface="微软雅黑" panose="020B0503020204020204" charset="-122"/>
               </a:rPr>
               <a:t>Basal</a:t>
             </a:r>
-            <a:endParaRPr lang="en-US" altLang="zh-CN">
-              <a:latin typeface="微软雅黑" panose="020B0503020204020204" charset="-122"/>
-              <a:ea typeface="微软雅黑" panose="020B0503020204020204" charset="-122"/>
-            </a:endParaRPr>
           </a:p>
         </p:txBody>
       </p:sp>
@@ -3603,25 +3556,15 @@
           <a:bodyPr wrap="square" rtlCol="0">
             <a:spAutoFit/>
           </a:bodyPr>
+          <a:lstStyle/>
           <a:p>
             <a:r>
               <a:rPr lang="en-US" altLang="zh-CN">
                 <a:latin typeface="微软雅黑" panose="020B0503020204020204" charset="-122"/>
                 <a:ea typeface="微软雅黑" panose="020B0503020204020204" charset="-122"/>
               </a:rPr>
-              <a:t>Lum</a:t>
-            </a:r>
-            <a:r>
-              <a:rPr lang="en-US" altLang="zh-CN">
-                <a:latin typeface="微软雅黑" panose="020B0503020204020204" charset="-122"/>
-                <a:ea typeface="微软雅黑" panose="020B0503020204020204" charset="-122"/>
-              </a:rPr>
-              <a:t>A</a:t>
-            </a:r>
-            <a:endParaRPr lang="en-US" altLang="zh-CN">
-              <a:latin typeface="微软雅黑" panose="020B0503020204020204" charset="-122"/>
-              <a:ea typeface="微软雅黑" panose="020B0503020204020204" charset="-122"/>
-            </a:endParaRPr>
+              <a:t>LumA</a:t>
+            </a:r>
           </a:p>
         </p:txBody>
       </p:sp>
@@ -3649,25 +3592,15 @@
           <a:bodyPr wrap="square" rtlCol="0">
             <a:spAutoFit/>
           </a:bodyPr>
+          <a:lstStyle/>
           <a:p>
             <a:r>
               <a:rPr lang="en-US" altLang="zh-CN">
                 <a:latin typeface="微软雅黑" panose="020B0503020204020204" charset="-122"/>
                 <a:ea typeface="微软雅黑" panose="020B0503020204020204" charset="-122"/>
               </a:rPr>
-              <a:t>Lum</a:t>
-            </a:r>
-            <a:r>
-              <a:rPr lang="en-US" altLang="zh-CN">
-                <a:latin typeface="微软雅黑" panose="020B0503020204020204" charset="-122"/>
-                <a:ea typeface="微软雅黑" panose="020B0503020204020204" charset="-122"/>
-              </a:rPr>
-              <a:t>B</a:t>
-            </a:r>
-            <a:endParaRPr lang="en-US" altLang="zh-CN">
-              <a:latin typeface="微软雅黑" panose="020B0503020204020204" charset="-122"/>
-              <a:ea typeface="微软雅黑" panose="020B0503020204020204" charset="-122"/>
-            </a:endParaRPr>
+              <a:t>LumB</a:t>
+            </a:r>
           </a:p>
         </p:txBody>
       </p:sp>
@@ -3695,6 +3628,7 @@
           <a:bodyPr wrap="square" rtlCol="0">
             <a:spAutoFit/>
           </a:bodyPr>
+          <a:lstStyle/>
           <a:p>
             <a:r>
               <a:rPr lang="en-US" altLang="zh-CN">
@@ -3703,16 +3637,12 @@
               </a:rPr>
               <a:t>Her2</a:t>
             </a:r>
-            <a:endParaRPr lang="en-US" altLang="zh-CN">
-              <a:latin typeface="微软雅黑" panose="020B0503020204020204" charset="-122"/>
-              <a:ea typeface="微软雅黑" panose="020B0503020204020204" charset="-122"/>
-            </a:endParaRPr>
           </a:p>
         </p:txBody>
       </p:sp>
     </p:spTree>
     <p:custDataLst>
-      <p:tags r:id="rId5"/>
+      <p:tags r:id="rId1"/>
     </p:custDataLst>
   </p:cSld>
   <p:clrMapOvr>
@@ -3722,7 +3652,13 @@
 </file>
 
 <file path=ppt/tags/tag1.xml><?xml version="1.0" encoding="utf-8"?>
-<p:tagLst xmlns:p="http://schemas.openxmlformats.org/presentationml/2006/main">
+<p:tagLst xmlns:a="http://schemas.openxmlformats.org/drawingml/2006/main" xmlns:r="http://schemas.openxmlformats.org/officeDocument/2006/relationships" xmlns:p="http://schemas.openxmlformats.org/presentationml/2006/main">
+  <p:tag name="COMMONDATA" val="eyJoZGlkIjoiYzI5ZDE5NjBiY2U5MWMyNjhmOTUxMDg4YzczNDliYTIifQ=="/>
+</p:tagLst>
+</file>
+
+<file path=ppt/tags/tag10.xml><?xml version="1.0" encoding="utf-8"?>
+<p:tagLst xmlns:a="http://schemas.openxmlformats.org/drawingml/2006/main" xmlns:r="http://schemas.openxmlformats.org/officeDocument/2006/relationships" xmlns:p="http://schemas.openxmlformats.org/presentationml/2006/main">
   <p:tag name="KSO_WM_UNIT_HIGHLIGHT" val="0"/>
   <p:tag name="KSO_WM_UNIT_COMPATIBLE" val="0"/>
   <p:tag name="KSO_WM_UNIT_DIAGRAM_ISNUMVISUAL" val="0"/>
@@ -3734,8 +3670,34 @@
 </p:tagLst>
 </file>
 
-<file path=ppt/tags/tag10.xml><?xml version="1.0" encoding="utf-8"?>
-<p:tagLst xmlns:p="http://schemas.openxmlformats.org/presentationml/2006/main">
+<file path=ppt/tags/tag11.xml><?xml version="1.0" encoding="utf-8"?>
+<p:tagLst xmlns:a="http://schemas.openxmlformats.org/drawingml/2006/main" xmlns:r="http://schemas.openxmlformats.org/officeDocument/2006/relationships" xmlns:p="http://schemas.openxmlformats.org/presentationml/2006/main">
+  <p:tag name="KSO_WM_UNIT_HIGHLIGHT" val="0"/>
+  <p:tag name="KSO_WM_UNIT_COMPATIBLE" val="0"/>
+  <p:tag name="KSO_WM_UNIT_DIAGRAM_ISNUMVISUAL" val="0"/>
+  <p:tag name="KSO_WM_UNIT_DIAGRAM_ISREFERUNIT" val="0"/>
+  <p:tag name="KSO_WM_UNIT_ID" val="_1**"/>
+  <p:tag name="KSO_WM_UNIT_LAYERLEVEL" val="1"/>
+  <p:tag name="KSO_WM_TAG_VERSION" val="1.0"/>
+  <p:tag name="KSO_WM_BEAUTIFY_FLAG" val="#wm#"/>
+</p:tagLst>
+</file>
+
+<file path=ppt/tags/tag12.xml><?xml version="1.0" encoding="utf-8"?>
+<p:tagLst xmlns:a="http://schemas.openxmlformats.org/drawingml/2006/main" xmlns:r="http://schemas.openxmlformats.org/officeDocument/2006/relationships" xmlns:p="http://schemas.openxmlformats.org/presentationml/2006/main">
+  <p:tag name="KSO_WM_UNIT_HIGHLIGHT" val="0"/>
+  <p:tag name="KSO_WM_UNIT_COMPATIBLE" val="0"/>
+  <p:tag name="KSO_WM_UNIT_DIAGRAM_ISNUMVISUAL" val="0"/>
+  <p:tag name="KSO_WM_UNIT_DIAGRAM_ISREFERUNIT" val="0"/>
+  <p:tag name="KSO_WM_UNIT_ID" val="_1**"/>
+  <p:tag name="KSO_WM_UNIT_LAYERLEVEL" val="1"/>
+  <p:tag name="KSO_WM_TAG_VERSION" val="1.0"/>
+  <p:tag name="KSO_WM_BEAUTIFY_FLAG" val="#wm#"/>
+</p:tagLst>
+</file>
+
+<file path=ppt/tags/tag13.xml><?xml version="1.0" encoding="utf-8"?>
+<p:tagLst xmlns:a="http://schemas.openxmlformats.org/drawingml/2006/main" xmlns:r="http://schemas.openxmlformats.org/officeDocument/2006/relationships" xmlns:p="http://schemas.openxmlformats.org/presentationml/2006/main">
   <p:tag name="KSO_WM_UNIT_HIGHLIGHT" val="0"/>
   <p:tag name="KSO_WM_UNIT_COMPATIBLE" val="0"/>
   <p:tag name="KSO_WM_UNIT_DIAGRAM_ISNUMVISUAL" val="0"/>
@@ -3747,8 +3709,60 @@
 </p:tagLst>
 </file>
 
-<file path=ppt/tags/tag11.xml><?xml version="1.0" encoding="utf-8"?>
-<p:tagLst xmlns:p="http://schemas.openxmlformats.org/presentationml/2006/main">
+<file path=ppt/tags/tag14.xml><?xml version="1.0" encoding="utf-8"?>
+<p:tagLst xmlns:a="http://schemas.openxmlformats.org/drawingml/2006/main" xmlns:r="http://schemas.openxmlformats.org/officeDocument/2006/relationships" xmlns:p="http://schemas.openxmlformats.org/presentationml/2006/main">
+  <p:tag name="KSO_WM_UNIT_HIGHLIGHT" val="0"/>
+  <p:tag name="KSO_WM_UNIT_COMPATIBLE" val="0"/>
+  <p:tag name="KSO_WM_UNIT_DIAGRAM_ISNUMVISUAL" val="0"/>
+  <p:tag name="KSO_WM_UNIT_DIAGRAM_ISREFERUNIT" val="0"/>
+  <p:tag name="KSO_WM_UNIT_ID" val="_2**"/>
+  <p:tag name="KSO_WM_UNIT_LAYERLEVEL" val="1"/>
+  <p:tag name="KSO_WM_TAG_VERSION" val="1.0"/>
+  <p:tag name="KSO_WM_BEAUTIFY_FLAG" val="#wm#"/>
+</p:tagLst>
+</file>
+
+<file path=ppt/tags/tag15.xml><?xml version="1.0" encoding="utf-8"?>
+<p:tagLst xmlns:a="http://schemas.openxmlformats.org/drawingml/2006/main" xmlns:r="http://schemas.openxmlformats.org/officeDocument/2006/relationships" xmlns:p="http://schemas.openxmlformats.org/presentationml/2006/main">
+  <p:tag name="KSO_WM_UNIT_HIGHLIGHT" val="0"/>
+  <p:tag name="KSO_WM_UNIT_COMPATIBLE" val="0"/>
+  <p:tag name="KSO_WM_UNIT_DIAGRAM_ISNUMVISUAL" val="0"/>
+  <p:tag name="KSO_WM_UNIT_DIAGRAM_ISREFERUNIT" val="0"/>
+  <p:tag name="KSO_WM_UNIT_ID" val="_2**"/>
+  <p:tag name="KSO_WM_UNIT_LAYERLEVEL" val="1"/>
+  <p:tag name="KSO_WM_TAG_VERSION" val="1.0"/>
+  <p:tag name="KSO_WM_BEAUTIFY_FLAG" val="#wm#"/>
+</p:tagLst>
+</file>
+
+<file path=ppt/tags/tag16.xml><?xml version="1.0" encoding="utf-8"?>
+<p:tagLst xmlns:a="http://schemas.openxmlformats.org/drawingml/2006/main" xmlns:r="http://schemas.openxmlformats.org/officeDocument/2006/relationships" xmlns:p="http://schemas.openxmlformats.org/presentationml/2006/main">
+  <p:tag name="KSO_WM_UNIT_HIGHLIGHT" val="0"/>
+  <p:tag name="KSO_WM_UNIT_COMPATIBLE" val="0"/>
+  <p:tag name="KSO_WM_UNIT_DIAGRAM_ISNUMVISUAL" val="0"/>
+  <p:tag name="KSO_WM_UNIT_DIAGRAM_ISREFERUNIT" val="0"/>
+  <p:tag name="KSO_WM_UNIT_ID" val="_2**"/>
+  <p:tag name="KSO_WM_UNIT_LAYERLEVEL" val="1"/>
+  <p:tag name="KSO_WM_TAG_VERSION" val="1.0"/>
+  <p:tag name="KSO_WM_BEAUTIFY_FLAG" val="#wm#"/>
+</p:tagLst>
+</file>
+
+<file path=ppt/tags/tag17.xml><?xml version="1.0" encoding="utf-8"?>
+<p:tagLst xmlns:a="http://schemas.openxmlformats.org/drawingml/2006/main" xmlns:r="http://schemas.openxmlformats.org/officeDocument/2006/relationships" xmlns:p="http://schemas.openxmlformats.org/presentationml/2006/main">
+  <p:tag name="KSO_WM_UNIT_HIGHLIGHT" val="0"/>
+  <p:tag name="KSO_WM_UNIT_COMPATIBLE" val="0"/>
+  <p:tag name="KSO_WM_UNIT_DIAGRAM_ISNUMVISUAL" val="0"/>
+  <p:tag name="KSO_WM_UNIT_DIAGRAM_ISREFERUNIT" val="0"/>
+  <p:tag name="KSO_WM_UNIT_ID" val="_2**"/>
+  <p:tag name="KSO_WM_UNIT_LAYERLEVEL" val="1"/>
+  <p:tag name="KSO_WM_TAG_VERSION" val="1.0"/>
+  <p:tag name="KSO_WM_BEAUTIFY_FLAG" val="#wm#"/>
+</p:tagLst>
+</file>
+
+<file path=ppt/tags/tag18.xml><?xml version="1.0" encoding="utf-8"?>
+<p:tagLst xmlns:a="http://schemas.openxmlformats.org/drawingml/2006/main" xmlns:r="http://schemas.openxmlformats.org/officeDocument/2006/relationships" xmlns:p="http://schemas.openxmlformats.org/presentationml/2006/main">
   <p:tag name="KSO_WM_UNIT_HIGHLIGHT" val="0"/>
   <p:tag name="KSO_WM_UNIT_COMPATIBLE" val="0"/>
   <p:tag name="KSO_WM_UNIT_DIAGRAM_ISNUMVISUAL" val="0"/>
@@ -3760,8 +3774,8 @@
 </p:tagLst>
 </file>
 
-<file path=ppt/tags/tag12.xml><?xml version="1.0" encoding="utf-8"?>
-<p:tagLst xmlns:p="http://schemas.openxmlformats.org/presentationml/2006/main">
+<file path=ppt/tags/tag19.xml><?xml version="1.0" encoding="utf-8"?>
+<p:tagLst xmlns:a="http://schemas.openxmlformats.org/drawingml/2006/main" xmlns:r="http://schemas.openxmlformats.org/officeDocument/2006/relationships" xmlns:p="http://schemas.openxmlformats.org/presentationml/2006/main">
   <p:tag name="KSO_WM_UNIT_HIGHLIGHT" val="0"/>
   <p:tag name="KSO_WM_UNIT_COMPATIBLE" val="0"/>
   <p:tag name="KSO_WM_UNIT_DIAGRAM_ISNUMVISUAL" val="0"/>
@@ -3773,714 +3787,8 @@
 </p:tagLst>
 </file>
 
-<file path=ppt/tags/tag13.xml><?xml version="1.0" encoding="utf-8"?>
-<p:tagLst xmlns:p="http://schemas.openxmlformats.org/presentationml/2006/main">
-  <p:tag name="KSO_WM_UNIT_HIGHLIGHT" val="0"/>
-  <p:tag name="KSO_WM_UNIT_COMPATIBLE" val="0"/>
-  <p:tag name="KSO_WM_UNIT_DIAGRAM_ISNUMVISUAL" val="0"/>
-  <p:tag name="KSO_WM_UNIT_DIAGRAM_ISREFERUNIT" val="0"/>
-  <p:tag name="KSO_WM_UNIT_ID" val="_3**"/>
-  <p:tag name="KSO_WM_UNIT_LAYERLEVEL" val="1"/>
-  <p:tag name="KSO_WM_TAG_VERSION" val="1.0"/>
-  <p:tag name="KSO_WM_BEAUTIFY_FLAG" val="#wm#"/>
-</p:tagLst>
-</file>
-
-<file path=ppt/tags/tag14.xml><?xml version="1.0" encoding="utf-8"?>
-<p:tagLst xmlns:p="http://schemas.openxmlformats.org/presentationml/2006/main">
-  <p:tag name="KSO_WM_UNIT_HIGHLIGHT" val="0"/>
-  <p:tag name="KSO_WM_UNIT_COMPATIBLE" val="0"/>
-  <p:tag name="KSO_WM_UNIT_DIAGRAM_ISNUMVISUAL" val="0"/>
-  <p:tag name="KSO_WM_UNIT_DIAGRAM_ISREFERUNIT" val="0"/>
-  <p:tag name="KSO_WM_UNIT_ID" val="_3**"/>
-  <p:tag name="KSO_WM_UNIT_LAYERLEVEL" val="1"/>
-  <p:tag name="KSO_WM_TAG_VERSION" val="1.0"/>
-  <p:tag name="KSO_WM_BEAUTIFY_FLAG" val="#wm#"/>
-</p:tagLst>
-</file>
-
-<file path=ppt/tags/tag15.xml><?xml version="1.0" encoding="utf-8"?>
-<p:tagLst xmlns:p="http://schemas.openxmlformats.org/presentationml/2006/main">
-  <p:tag name="KSO_WM_UNIT_HIGHLIGHT" val="0"/>
-  <p:tag name="KSO_WM_UNIT_COMPATIBLE" val="0"/>
-  <p:tag name="KSO_WM_UNIT_DIAGRAM_ISNUMVISUAL" val="0"/>
-  <p:tag name="KSO_WM_UNIT_DIAGRAM_ISREFERUNIT" val="0"/>
-  <p:tag name="KSO_WM_UNIT_ID" val="_3**"/>
-  <p:tag name="KSO_WM_UNIT_LAYERLEVEL" val="1"/>
-  <p:tag name="KSO_WM_TAG_VERSION" val="1.0"/>
-  <p:tag name="KSO_WM_BEAUTIFY_FLAG" val="#wm#"/>
-</p:tagLst>
-</file>
-
-<file path=ppt/tags/tag16.xml><?xml version="1.0" encoding="utf-8"?>
-<p:tagLst xmlns:p="http://schemas.openxmlformats.org/presentationml/2006/main">
-  <p:tag name="KSO_WM_UNIT_HIGHLIGHT" val="0"/>
-  <p:tag name="KSO_WM_UNIT_COMPATIBLE" val="0"/>
-  <p:tag name="KSO_WM_UNIT_DIAGRAM_ISNUMVISUAL" val="0"/>
-  <p:tag name="KSO_WM_UNIT_DIAGRAM_ISREFERUNIT" val="0"/>
-  <p:tag name="KSO_WM_UNIT_ID" val="_4**"/>
-  <p:tag name="KSO_WM_UNIT_LAYERLEVEL" val="1"/>
-  <p:tag name="KSO_WM_TAG_VERSION" val="1.0"/>
-  <p:tag name="KSO_WM_BEAUTIFY_FLAG" val="#wm#"/>
-</p:tagLst>
-</file>
-
-<file path=ppt/tags/tag17.xml><?xml version="1.0" encoding="utf-8"?>
-<p:tagLst xmlns:p="http://schemas.openxmlformats.org/presentationml/2006/main">
-  <p:tag name="KSO_WM_UNIT_HIGHLIGHT" val="0"/>
-  <p:tag name="KSO_WM_UNIT_COMPATIBLE" val="0"/>
-  <p:tag name="KSO_WM_UNIT_DIAGRAM_ISNUMVISUAL" val="0"/>
-  <p:tag name="KSO_WM_UNIT_DIAGRAM_ISREFERUNIT" val="0"/>
-  <p:tag name="KSO_WM_UNIT_ID" val="_4**"/>
-  <p:tag name="KSO_WM_UNIT_LAYERLEVEL" val="1"/>
-  <p:tag name="KSO_WM_TAG_VERSION" val="1.0"/>
-  <p:tag name="KSO_WM_BEAUTIFY_FLAG" val="#wm#"/>
-</p:tagLst>
-</file>
-
-<file path=ppt/tags/tag18.xml><?xml version="1.0" encoding="utf-8"?>
-<p:tagLst xmlns:p="http://schemas.openxmlformats.org/presentationml/2006/main">
-  <p:tag name="KSO_WM_UNIT_HIGHLIGHT" val="0"/>
-  <p:tag name="KSO_WM_UNIT_COMPATIBLE" val="0"/>
-  <p:tag name="KSO_WM_UNIT_DIAGRAM_ISNUMVISUAL" val="0"/>
-  <p:tag name="KSO_WM_UNIT_DIAGRAM_ISREFERUNIT" val="0"/>
-  <p:tag name="KSO_WM_UNIT_ID" val="_4**"/>
-  <p:tag name="KSO_WM_UNIT_LAYERLEVEL" val="1"/>
-  <p:tag name="KSO_WM_TAG_VERSION" val="1.0"/>
-  <p:tag name="KSO_WM_BEAUTIFY_FLAG" val="#wm#"/>
-</p:tagLst>
-</file>
-
-<file path=ppt/tags/tag19.xml><?xml version="1.0" encoding="utf-8"?>
-<p:tagLst xmlns:p="http://schemas.openxmlformats.org/presentationml/2006/main">
-  <p:tag name="KSO_WM_UNIT_HIGHLIGHT" val="0"/>
-  <p:tag name="KSO_WM_UNIT_COMPATIBLE" val="0"/>
-  <p:tag name="KSO_WM_UNIT_DIAGRAM_ISNUMVISUAL" val="0"/>
-  <p:tag name="KSO_WM_UNIT_DIAGRAM_ISREFERUNIT" val="0"/>
-  <p:tag name="KSO_WM_UNIT_ID" val="_4**"/>
-  <p:tag name="KSO_WM_UNIT_LAYERLEVEL" val="1"/>
-  <p:tag name="KSO_WM_TAG_VERSION" val="1.0"/>
-  <p:tag name="KSO_WM_BEAUTIFY_FLAG" val="#wm#"/>
-</p:tagLst>
-</file>
-
 <file path=ppt/tags/tag2.xml><?xml version="1.0" encoding="utf-8"?>
-<p:tagLst xmlns:p="http://schemas.openxmlformats.org/presentationml/2006/main">
-  <p:tag name="KSO_WM_UNIT_HIGHLIGHT" val="0"/>
-  <p:tag name="KSO_WM_UNIT_COMPATIBLE" val="0"/>
-  <p:tag name="KSO_WM_UNIT_DIAGRAM_ISNUMVISUAL" val="0"/>
-  <p:tag name="KSO_WM_UNIT_DIAGRAM_ISREFERUNIT" val="0"/>
-  <p:tag name="KSO_WM_UNIT_ID" val="_1**"/>
-  <p:tag name="KSO_WM_UNIT_LAYERLEVEL" val="1"/>
-  <p:tag name="KSO_WM_TAG_VERSION" val="1.0"/>
-  <p:tag name="KSO_WM_BEAUTIFY_FLAG" val="#wm#"/>
-</p:tagLst>
-</file>
-
-<file path=ppt/tags/tag20.xml><?xml version="1.0" encoding="utf-8"?>
-<p:tagLst xmlns:p="http://schemas.openxmlformats.org/presentationml/2006/main">
-  <p:tag name="KSO_WM_UNIT_HIGHLIGHT" val="0"/>
-  <p:tag name="KSO_WM_UNIT_COMPATIBLE" val="0"/>
-  <p:tag name="KSO_WM_UNIT_DIAGRAM_ISNUMVISUAL" val="0"/>
-  <p:tag name="KSO_WM_UNIT_DIAGRAM_ISREFERUNIT" val="0"/>
-  <p:tag name="KSO_WM_UNIT_ID" val="_4**"/>
-  <p:tag name="KSO_WM_UNIT_LAYERLEVEL" val="1"/>
-  <p:tag name="KSO_WM_TAG_VERSION" val="1.0"/>
-  <p:tag name="KSO_WM_BEAUTIFY_FLAG" val="#wm#"/>
-</p:tagLst>
-</file>
-
-<file path=ppt/tags/tag21.xml><?xml version="1.0" encoding="utf-8"?>
-<p:tagLst xmlns:p="http://schemas.openxmlformats.org/presentationml/2006/main">
-  <p:tag name="KSO_WM_UNIT_HIGHLIGHT" val="0"/>
-  <p:tag name="KSO_WM_UNIT_COMPATIBLE" val="0"/>
-  <p:tag name="KSO_WM_UNIT_DIAGRAM_ISNUMVISUAL" val="0"/>
-  <p:tag name="KSO_WM_UNIT_DIAGRAM_ISREFERUNIT" val="0"/>
-  <p:tag name="KSO_WM_UNIT_ID" val="_4**"/>
-  <p:tag name="KSO_WM_UNIT_LAYERLEVEL" val="1"/>
-  <p:tag name="KSO_WM_TAG_VERSION" val="1.0"/>
-  <p:tag name="KSO_WM_BEAUTIFY_FLAG" val="#wm#"/>
-</p:tagLst>
-</file>
-
-<file path=ppt/tags/tag22.xml><?xml version="1.0" encoding="utf-8"?>
-<p:tagLst xmlns:p="http://schemas.openxmlformats.org/presentationml/2006/main">
-  <p:tag name="KSO_WM_UNIT_HIGHLIGHT" val="0"/>
-  <p:tag name="KSO_WM_UNIT_COMPATIBLE" val="0"/>
-  <p:tag name="KSO_WM_UNIT_DIAGRAM_ISNUMVISUAL" val="0"/>
-  <p:tag name="KSO_WM_UNIT_DIAGRAM_ISREFERUNIT" val="0"/>
-  <p:tag name="KSO_WM_UNIT_ID" val="_5**"/>
-  <p:tag name="KSO_WM_UNIT_LAYERLEVEL" val="1"/>
-  <p:tag name="KSO_WM_TAG_VERSION" val="1.0"/>
-  <p:tag name="KSO_WM_BEAUTIFY_FLAG" val="#wm#"/>
-</p:tagLst>
-</file>
-
-<file path=ppt/tags/tag23.xml><?xml version="1.0" encoding="utf-8"?>
-<p:tagLst xmlns:p="http://schemas.openxmlformats.org/presentationml/2006/main">
-  <p:tag name="KSO_WM_UNIT_HIGHLIGHT" val="0"/>
-  <p:tag name="KSO_WM_UNIT_COMPATIBLE" val="0"/>
-  <p:tag name="KSO_WM_UNIT_DIAGRAM_ISNUMVISUAL" val="0"/>
-  <p:tag name="KSO_WM_UNIT_DIAGRAM_ISREFERUNIT" val="0"/>
-  <p:tag name="KSO_WM_UNIT_ID" val="_5**"/>
-  <p:tag name="KSO_WM_UNIT_LAYERLEVEL" val="1"/>
-  <p:tag name="KSO_WM_TAG_VERSION" val="1.0"/>
-  <p:tag name="KSO_WM_BEAUTIFY_FLAG" val="#wm#"/>
-</p:tagLst>
-</file>
-
-<file path=ppt/tags/tag24.xml><?xml version="1.0" encoding="utf-8"?>
-<p:tagLst xmlns:p="http://schemas.openxmlformats.org/presentationml/2006/main">
-  <p:tag name="KSO_WM_UNIT_HIGHLIGHT" val="0"/>
-  <p:tag name="KSO_WM_UNIT_COMPATIBLE" val="0"/>
-  <p:tag name="KSO_WM_UNIT_DIAGRAM_ISNUMVISUAL" val="0"/>
-  <p:tag name="KSO_WM_UNIT_DIAGRAM_ISREFERUNIT" val="0"/>
-  <p:tag name="KSO_WM_UNIT_ID" val="_5**"/>
-  <p:tag name="KSO_WM_UNIT_LAYERLEVEL" val="1"/>
-  <p:tag name="KSO_WM_TAG_VERSION" val="1.0"/>
-  <p:tag name="KSO_WM_BEAUTIFY_FLAG" val="#wm#"/>
-</p:tagLst>
-</file>
-
-<file path=ppt/tags/tag25.xml><?xml version="1.0" encoding="utf-8"?>
-<p:tagLst xmlns:p="http://schemas.openxmlformats.org/presentationml/2006/main">
-  <p:tag name="KSO_WM_UNIT_HIGHLIGHT" val="0"/>
-  <p:tag name="KSO_WM_UNIT_COMPATIBLE" val="0"/>
-  <p:tag name="KSO_WM_UNIT_DIAGRAM_ISNUMVISUAL" val="0"/>
-  <p:tag name="KSO_WM_UNIT_DIAGRAM_ISREFERUNIT" val="0"/>
-  <p:tag name="KSO_WM_UNIT_ID" val="_5**"/>
-  <p:tag name="KSO_WM_UNIT_LAYERLEVEL" val="1"/>
-  <p:tag name="KSO_WM_TAG_VERSION" val="1.0"/>
-  <p:tag name="KSO_WM_BEAUTIFY_FLAG" val="#wm#"/>
-</p:tagLst>
-</file>
-
-<file path=ppt/tags/tag26.xml><?xml version="1.0" encoding="utf-8"?>
-<p:tagLst xmlns:p="http://schemas.openxmlformats.org/presentationml/2006/main">
-  <p:tag name="KSO_WM_UNIT_HIGHLIGHT" val="0"/>
-  <p:tag name="KSO_WM_UNIT_COMPATIBLE" val="0"/>
-  <p:tag name="KSO_WM_UNIT_DIAGRAM_ISNUMVISUAL" val="0"/>
-  <p:tag name="KSO_WM_UNIT_DIAGRAM_ISREFERUNIT" val="0"/>
-  <p:tag name="KSO_WM_UNIT_ID" val="_5**"/>
-  <p:tag name="KSO_WM_UNIT_LAYERLEVEL" val="1"/>
-  <p:tag name="KSO_WM_TAG_VERSION" val="1.0"/>
-  <p:tag name="KSO_WM_BEAUTIFY_FLAG" val="#wm#"/>
-</p:tagLst>
-</file>
-
-<file path=ppt/tags/tag27.xml><?xml version="1.0" encoding="utf-8"?>
-<p:tagLst xmlns:p="http://schemas.openxmlformats.org/presentationml/2006/main">
-  <p:tag name="KSO_WM_UNIT_HIGHLIGHT" val="0"/>
-  <p:tag name="KSO_WM_UNIT_COMPATIBLE" val="0"/>
-  <p:tag name="KSO_WM_UNIT_DIAGRAM_ISNUMVISUAL" val="0"/>
-  <p:tag name="KSO_WM_UNIT_DIAGRAM_ISREFERUNIT" val="0"/>
-  <p:tag name="KSO_WM_UNIT_ID" val="_5**"/>
-  <p:tag name="KSO_WM_UNIT_LAYERLEVEL" val="1"/>
-  <p:tag name="KSO_WM_TAG_VERSION" val="1.0"/>
-  <p:tag name="KSO_WM_BEAUTIFY_FLAG" val="#wm#"/>
-</p:tagLst>
-</file>
-
-<file path=ppt/tags/tag28.xml><?xml version="1.0" encoding="utf-8"?>
-<p:tagLst xmlns:p="http://schemas.openxmlformats.org/presentationml/2006/main">
-  <p:tag name="KSO_WM_UNIT_HIGHLIGHT" val="0"/>
-  <p:tag name="KSO_WM_UNIT_COMPATIBLE" val="0"/>
-  <p:tag name="KSO_WM_UNIT_DIAGRAM_ISNUMVISUAL" val="0"/>
-  <p:tag name="KSO_WM_UNIT_DIAGRAM_ISREFERUNIT" val="0"/>
-  <p:tag name="KSO_WM_UNIT_ID" val="_5**"/>
-  <p:tag name="KSO_WM_UNIT_LAYERLEVEL" val="1"/>
-  <p:tag name="KSO_WM_TAG_VERSION" val="1.0"/>
-  <p:tag name="KSO_WM_BEAUTIFY_FLAG" val="#wm#"/>
-</p:tagLst>
-</file>
-
-<file path=ppt/tags/tag29.xml><?xml version="1.0" encoding="utf-8"?>
-<p:tagLst xmlns:p="http://schemas.openxmlformats.org/presentationml/2006/main">
-  <p:tag name="KSO_WM_UNIT_HIGHLIGHT" val="0"/>
-  <p:tag name="KSO_WM_UNIT_COMPATIBLE" val="0"/>
-  <p:tag name="KSO_WM_UNIT_DIAGRAM_ISNUMVISUAL" val="0"/>
-  <p:tag name="KSO_WM_UNIT_DIAGRAM_ISREFERUNIT" val="0"/>
-  <p:tag name="KSO_WM_UNIT_ID" val="_5**"/>
-  <p:tag name="KSO_WM_UNIT_LAYERLEVEL" val="1"/>
-  <p:tag name="KSO_WM_TAG_VERSION" val="1.0"/>
-  <p:tag name="KSO_WM_BEAUTIFY_FLAG" val="#wm#"/>
-</p:tagLst>
-</file>
-
-<file path=ppt/tags/tag3.xml><?xml version="1.0" encoding="utf-8"?>
-<p:tagLst xmlns:p="http://schemas.openxmlformats.org/presentationml/2006/main">
-  <p:tag name="KSO_WM_UNIT_HIGHLIGHT" val="0"/>
-  <p:tag name="KSO_WM_UNIT_COMPATIBLE" val="0"/>
-  <p:tag name="KSO_WM_UNIT_DIAGRAM_ISNUMVISUAL" val="0"/>
-  <p:tag name="KSO_WM_UNIT_DIAGRAM_ISREFERUNIT" val="0"/>
-  <p:tag name="KSO_WM_UNIT_ID" val="_1**"/>
-  <p:tag name="KSO_WM_UNIT_LAYERLEVEL" val="1"/>
-  <p:tag name="KSO_WM_TAG_VERSION" val="1.0"/>
-  <p:tag name="KSO_WM_BEAUTIFY_FLAG" val="#wm#"/>
-</p:tagLst>
-</file>
-
-<file path=ppt/tags/tag30.xml><?xml version="1.0" encoding="utf-8"?>
-<p:tagLst xmlns:p="http://schemas.openxmlformats.org/presentationml/2006/main">
-  <p:tag name="KSO_WM_UNIT_HIGHLIGHT" val="0"/>
-  <p:tag name="KSO_WM_UNIT_COMPATIBLE" val="0"/>
-  <p:tag name="KSO_WM_UNIT_DIAGRAM_ISNUMVISUAL" val="0"/>
-  <p:tag name="KSO_WM_UNIT_DIAGRAM_ISREFERUNIT" val="0"/>
-  <p:tag name="KSO_WM_UNIT_ID" val="_6**"/>
-  <p:tag name="KSO_WM_UNIT_LAYERLEVEL" val="1"/>
-  <p:tag name="KSO_WM_TAG_VERSION" val="1.0"/>
-  <p:tag name="KSO_WM_BEAUTIFY_FLAG" val="#wm#"/>
-</p:tagLst>
-</file>
-
-<file path=ppt/tags/tag31.xml><?xml version="1.0" encoding="utf-8"?>
-<p:tagLst xmlns:p="http://schemas.openxmlformats.org/presentationml/2006/main">
-  <p:tag name="KSO_WM_UNIT_HIGHLIGHT" val="0"/>
-  <p:tag name="KSO_WM_UNIT_COMPATIBLE" val="0"/>
-  <p:tag name="KSO_WM_UNIT_DIAGRAM_ISNUMVISUAL" val="0"/>
-  <p:tag name="KSO_WM_UNIT_DIAGRAM_ISREFERUNIT" val="0"/>
-  <p:tag name="KSO_WM_UNIT_ID" val="_6**"/>
-  <p:tag name="KSO_WM_UNIT_LAYERLEVEL" val="1"/>
-  <p:tag name="KSO_WM_TAG_VERSION" val="1.0"/>
-  <p:tag name="KSO_WM_BEAUTIFY_FLAG" val="#wm#"/>
-</p:tagLst>
-</file>
-
-<file path=ppt/tags/tag32.xml><?xml version="1.0" encoding="utf-8"?>
-<p:tagLst xmlns:p="http://schemas.openxmlformats.org/presentationml/2006/main">
-  <p:tag name="KSO_WM_UNIT_HIGHLIGHT" val="0"/>
-  <p:tag name="KSO_WM_UNIT_COMPATIBLE" val="0"/>
-  <p:tag name="KSO_WM_UNIT_DIAGRAM_ISNUMVISUAL" val="0"/>
-  <p:tag name="KSO_WM_UNIT_DIAGRAM_ISREFERUNIT" val="0"/>
-  <p:tag name="KSO_WM_UNIT_ID" val="_6**"/>
-  <p:tag name="KSO_WM_UNIT_LAYERLEVEL" val="1"/>
-  <p:tag name="KSO_WM_TAG_VERSION" val="1.0"/>
-  <p:tag name="KSO_WM_BEAUTIFY_FLAG" val="#wm#"/>
-</p:tagLst>
-</file>
-
-<file path=ppt/tags/tag33.xml><?xml version="1.0" encoding="utf-8"?>
-<p:tagLst xmlns:p="http://schemas.openxmlformats.org/presentationml/2006/main">
-  <p:tag name="KSO_WM_UNIT_HIGHLIGHT" val="0"/>
-  <p:tag name="KSO_WM_UNIT_COMPATIBLE" val="0"/>
-  <p:tag name="KSO_WM_UNIT_DIAGRAM_ISNUMVISUAL" val="0"/>
-  <p:tag name="KSO_WM_UNIT_DIAGRAM_ISREFERUNIT" val="0"/>
-  <p:tag name="KSO_WM_UNIT_ID" val="_6**"/>
-  <p:tag name="KSO_WM_UNIT_LAYERLEVEL" val="1"/>
-  <p:tag name="KSO_WM_TAG_VERSION" val="1.0"/>
-  <p:tag name="KSO_WM_BEAUTIFY_FLAG" val="#wm#"/>
-</p:tagLst>
-</file>
-
-<file path=ppt/tags/tag34.xml><?xml version="1.0" encoding="utf-8"?>
-<p:tagLst xmlns:p="http://schemas.openxmlformats.org/presentationml/2006/main">
-  <p:tag name="KSO_WM_UNIT_HIGHLIGHT" val="0"/>
-  <p:tag name="KSO_WM_UNIT_COMPATIBLE" val="0"/>
-  <p:tag name="KSO_WM_UNIT_DIAGRAM_ISNUMVISUAL" val="0"/>
-  <p:tag name="KSO_WM_UNIT_DIAGRAM_ISREFERUNIT" val="0"/>
-  <p:tag name="KSO_WM_UNIT_ID" val="_7**"/>
-  <p:tag name="KSO_WM_UNIT_LAYERLEVEL" val="1"/>
-  <p:tag name="KSO_WM_TAG_VERSION" val="1.0"/>
-  <p:tag name="KSO_WM_BEAUTIFY_FLAG" val="#wm#"/>
-</p:tagLst>
-</file>
-
-<file path=ppt/tags/tag35.xml><?xml version="1.0" encoding="utf-8"?>
-<p:tagLst xmlns:p="http://schemas.openxmlformats.org/presentationml/2006/main">
-  <p:tag name="KSO_WM_UNIT_HIGHLIGHT" val="0"/>
-  <p:tag name="KSO_WM_UNIT_COMPATIBLE" val="0"/>
-  <p:tag name="KSO_WM_UNIT_DIAGRAM_ISNUMVISUAL" val="0"/>
-  <p:tag name="KSO_WM_UNIT_DIAGRAM_ISREFERUNIT" val="0"/>
-  <p:tag name="KSO_WM_UNIT_ID" val="_7**"/>
-  <p:tag name="KSO_WM_UNIT_LAYERLEVEL" val="1"/>
-  <p:tag name="KSO_WM_TAG_VERSION" val="1.0"/>
-  <p:tag name="KSO_WM_BEAUTIFY_FLAG" val="#wm#"/>
-</p:tagLst>
-</file>
-
-<file path=ppt/tags/tag36.xml><?xml version="1.0" encoding="utf-8"?>
-<p:tagLst xmlns:p="http://schemas.openxmlformats.org/presentationml/2006/main">
-  <p:tag name="KSO_WM_UNIT_HIGHLIGHT" val="0"/>
-  <p:tag name="KSO_WM_UNIT_COMPATIBLE" val="0"/>
-  <p:tag name="KSO_WM_UNIT_DIAGRAM_ISNUMVISUAL" val="0"/>
-  <p:tag name="KSO_WM_UNIT_DIAGRAM_ISREFERUNIT" val="0"/>
-  <p:tag name="KSO_WM_UNIT_ID" val="_7**"/>
-  <p:tag name="KSO_WM_UNIT_LAYERLEVEL" val="1"/>
-  <p:tag name="KSO_WM_TAG_VERSION" val="1.0"/>
-  <p:tag name="KSO_WM_BEAUTIFY_FLAG" val="#wm#"/>
-</p:tagLst>
-</file>
-
-<file path=ppt/tags/tag37.xml><?xml version="1.0" encoding="utf-8"?>
-<p:tagLst xmlns:p="http://schemas.openxmlformats.org/presentationml/2006/main">
-  <p:tag name="KSO_WM_UNIT_HIGHLIGHT" val="0"/>
-  <p:tag name="KSO_WM_UNIT_COMPATIBLE" val="0"/>
-  <p:tag name="KSO_WM_UNIT_DIAGRAM_ISNUMVISUAL" val="0"/>
-  <p:tag name="KSO_WM_UNIT_DIAGRAM_ISREFERUNIT" val="0"/>
-  <p:tag name="KSO_WM_UNIT_ID" val="_8**"/>
-  <p:tag name="KSO_WM_UNIT_LAYERLEVEL" val="1"/>
-  <p:tag name="KSO_WM_TAG_VERSION" val="1.0"/>
-  <p:tag name="KSO_WM_BEAUTIFY_FLAG" val="#wm#"/>
-</p:tagLst>
-</file>
-
-<file path=ppt/tags/tag38.xml><?xml version="1.0" encoding="utf-8"?>
-<p:tagLst xmlns:p="http://schemas.openxmlformats.org/presentationml/2006/main">
-  <p:tag name="KSO_WM_UNIT_HIGHLIGHT" val="0"/>
-  <p:tag name="KSO_WM_UNIT_COMPATIBLE" val="0"/>
-  <p:tag name="KSO_WM_UNIT_DIAGRAM_ISNUMVISUAL" val="0"/>
-  <p:tag name="KSO_WM_UNIT_DIAGRAM_ISREFERUNIT" val="0"/>
-  <p:tag name="KSO_WM_UNIT_ID" val="_8**"/>
-  <p:tag name="KSO_WM_UNIT_LAYERLEVEL" val="1"/>
-  <p:tag name="KSO_WM_TAG_VERSION" val="1.0"/>
-  <p:tag name="KSO_WM_BEAUTIFY_FLAG" val="#wm#"/>
-</p:tagLst>
-</file>
-
-<file path=ppt/tags/tag39.xml><?xml version="1.0" encoding="utf-8"?>
-<p:tagLst xmlns:p="http://schemas.openxmlformats.org/presentationml/2006/main">
-  <p:tag name="KSO_WM_UNIT_HIGHLIGHT" val="0"/>
-  <p:tag name="KSO_WM_UNIT_COMPATIBLE" val="0"/>
-  <p:tag name="KSO_WM_UNIT_DIAGRAM_ISNUMVISUAL" val="0"/>
-  <p:tag name="KSO_WM_UNIT_DIAGRAM_ISREFERUNIT" val="0"/>
-  <p:tag name="KSO_WM_UNIT_ID" val="_8**"/>
-  <p:tag name="KSO_WM_UNIT_LAYERLEVEL" val="1"/>
-  <p:tag name="KSO_WM_TAG_VERSION" val="1.0"/>
-  <p:tag name="KSO_WM_BEAUTIFY_FLAG" val="#wm#"/>
-</p:tagLst>
-</file>
-
-<file path=ppt/tags/tag4.xml><?xml version="1.0" encoding="utf-8"?>
-<p:tagLst xmlns:p="http://schemas.openxmlformats.org/presentationml/2006/main">
-  <p:tag name="KSO_WM_UNIT_HIGHLIGHT" val="0"/>
-  <p:tag name="KSO_WM_UNIT_COMPATIBLE" val="0"/>
-  <p:tag name="KSO_WM_UNIT_DIAGRAM_ISNUMVISUAL" val="0"/>
-  <p:tag name="KSO_WM_UNIT_DIAGRAM_ISREFERUNIT" val="0"/>
-  <p:tag name="KSO_WM_UNIT_ID" val="_1**"/>
-  <p:tag name="KSO_WM_UNIT_LAYERLEVEL" val="1"/>
-  <p:tag name="KSO_WM_TAG_VERSION" val="1.0"/>
-  <p:tag name="KSO_WM_BEAUTIFY_FLAG" val="#wm#"/>
-</p:tagLst>
-</file>
-
-<file path=ppt/tags/tag40.xml><?xml version="1.0" encoding="utf-8"?>
-<p:tagLst xmlns:p="http://schemas.openxmlformats.org/presentationml/2006/main">
-  <p:tag name="KSO_WM_UNIT_HIGHLIGHT" val="0"/>
-  <p:tag name="KSO_WM_UNIT_COMPATIBLE" val="0"/>
-  <p:tag name="KSO_WM_UNIT_DIAGRAM_ISNUMVISUAL" val="0"/>
-  <p:tag name="KSO_WM_UNIT_DIAGRAM_ISREFERUNIT" val="0"/>
-  <p:tag name="KSO_WM_UNIT_ID" val="_8**"/>
-  <p:tag name="KSO_WM_UNIT_LAYERLEVEL" val="1"/>
-  <p:tag name="KSO_WM_TAG_VERSION" val="1.0"/>
-  <p:tag name="KSO_WM_BEAUTIFY_FLAG" val="#wm#"/>
-</p:tagLst>
-</file>
-
-<file path=ppt/tags/tag41.xml><?xml version="1.0" encoding="utf-8"?>
-<p:tagLst xmlns:p="http://schemas.openxmlformats.org/presentationml/2006/main">
-  <p:tag name="KSO_WM_UNIT_HIGHLIGHT" val="0"/>
-  <p:tag name="KSO_WM_UNIT_COMPATIBLE" val="0"/>
-  <p:tag name="KSO_WM_UNIT_DIAGRAM_ISNUMVISUAL" val="0"/>
-  <p:tag name="KSO_WM_UNIT_DIAGRAM_ISREFERUNIT" val="0"/>
-  <p:tag name="KSO_WM_UNIT_ID" val="_8**"/>
-  <p:tag name="KSO_WM_UNIT_LAYERLEVEL" val="1"/>
-  <p:tag name="KSO_WM_TAG_VERSION" val="1.0"/>
-  <p:tag name="KSO_WM_BEAUTIFY_FLAG" val="#wm#"/>
-</p:tagLst>
-</file>
-
-<file path=ppt/tags/tag42.xml><?xml version="1.0" encoding="utf-8"?>
-<p:tagLst xmlns:p="http://schemas.openxmlformats.org/presentationml/2006/main">
-  <p:tag name="KSO_WM_UNIT_HIGHLIGHT" val="0"/>
-  <p:tag name="KSO_WM_UNIT_COMPATIBLE" val="0"/>
-  <p:tag name="KSO_WM_UNIT_DIAGRAM_ISNUMVISUAL" val="0"/>
-  <p:tag name="KSO_WM_UNIT_DIAGRAM_ISREFERUNIT" val="0"/>
-  <p:tag name="KSO_WM_UNIT_ID" val="_8**"/>
-  <p:tag name="KSO_WM_UNIT_LAYERLEVEL" val="1"/>
-  <p:tag name="KSO_WM_TAG_VERSION" val="1.0"/>
-  <p:tag name="KSO_WM_BEAUTIFY_FLAG" val="#wm#"/>
-</p:tagLst>
-</file>
-
-<file path=ppt/tags/tag43.xml><?xml version="1.0" encoding="utf-8"?>
-<p:tagLst xmlns:p="http://schemas.openxmlformats.org/presentationml/2006/main">
-  <p:tag name="KSO_WM_UNIT_HIGHLIGHT" val="0"/>
-  <p:tag name="KSO_WM_UNIT_COMPATIBLE" val="0"/>
-  <p:tag name="KSO_WM_UNIT_DIAGRAM_ISNUMVISUAL" val="0"/>
-  <p:tag name="KSO_WM_UNIT_DIAGRAM_ISREFERUNIT" val="0"/>
-  <p:tag name="KSO_WM_UNIT_ID" val="_9**"/>
-  <p:tag name="KSO_WM_UNIT_LAYERLEVEL" val="1"/>
-  <p:tag name="KSO_WM_TAG_VERSION" val="1.0"/>
-  <p:tag name="KSO_WM_BEAUTIFY_FLAG" val="#wm#"/>
-</p:tagLst>
-</file>
-
-<file path=ppt/tags/tag44.xml><?xml version="1.0" encoding="utf-8"?>
-<p:tagLst xmlns:p="http://schemas.openxmlformats.org/presentationml/2006/main">
-  <p:tag name="KSO_WM_UNIT_HIGHLIGHT" val="0"/>
-  <p:tag name="KSO_WM_UNIT_COMPATIBLE" val="0"/>
-  <p:tag name="KSO_WM_UNIT_DIAGRAM_ISNUMVISUAL" val="0"/>
-  <p:tag name="KSO_WM_UNIT_DIAGRAM_ISREFERUNIT" val="0"/>
-  <p:tag name="KSO_WM_UNIT_ID" val="_9**"/>
-  <p:tag name="KSO_WM_UNIT_LAYERLEVEL" val="1"/>
-  <p:tag name="KSO_WM_TAG_VERSION" val="1.0"/>
-  <p:tag name="KSO_WM_BEAUTIFY_FLAG" val="#wm#"/>
-</p:tagLst>
-</file>
-
-<file path=ppt/tags/tag45.xml><?xml version="1.0" encoding="utf-8"?>
-<p:tagLst xmlns:p="http://schemas.openxmlformats.org/presentationml/2006/main">
-  <p:tag name="KSO_WM_UNIT_HIGHLIGHT" val="0"/>
-  <p:tag name="KSO_WM_UNIT_COMPATIBLE" val="0"/>
-  <p:tag name="KSO_WM_UNIT_DIAGRAM_ISNUMVISUAL" val="0"/>
-  <p:tag name="KSO_WM_UNIT_DIAGRAM_ISREFERUNIT" val="0"/>
-  <p:tag name="KSO_WM_UNIT_ID" val="_9**"/>
-  <p:tag name="KSO_WM_UNIT_LAYERLEVEL" val="1"/>
-  <p:tag name="KSO_WM_TAG_VERSION" val="1.0"/>
-  <p:tag name="KSO_WM_BEAUTIFY_FLAG" val="#wm#"/>
-</p:tagLst>
-</file>
-
-<file path=ppt/tags/tag46.xml><?xml version="1.0" encoding="utf-8"?>
-<p:tagLst xmlns:p="http://schemas.openxmlformats.org/presentationml/2006/main">
-  <p:tag name="KSO_WM_UNIT_HIGHLIGHT" val="0"/>
-  <p:tag name="KSO_WM_UNIT_COMPATIBLE" val="0"/>
-  <p:tag name="KSO_WM_UNIT_DIAGRAM_ISNUMVISUAL" val="0"/>
-  <p:tag name="KSO_WM_UNIT_DIAGRAM_ISREFERUNIT" val="0"/>
-  <p:tag name="KSO_WM_UNIT_ID" val="_9**"/>
-  <p:tag name="KSO_WM_UNIT_LAYERLEVEL" val="1"/>
-  <p:tag name="KSO_WM_TAG_VERSION" val="1.0"/>
-  <p:tag name="KSO_WM_BEAUTIFY_FLAG" val="#wm#"/>
-</p:tagLst>
-</file>
-
-<file path=ppt/tags/tag47.xml><?xml version="1.0" encoding="utf-8"?>
-<p:tagLst xmlns:p="http://schemas.openxmlformats.org/presentationml/2006/main">
-  <p:tag name="KSO_WM_UNIT_HIGHLIGHT" val="0"/>
-  <p:tag name="KSO_WM_UNIT_COMPATIBLE" val="0"/>
-  <p:tag name="KSO_WM_UNIT_DIAGRAM_ISNUMVISUAL" val="0"/>
-  <p:tag name="KSO_WM_UNIT_DIAGRAM_ISREFERUNIT" val="0"/>
-  <p:tag name="KSO_WM_UNIT_ID" val="_9**"/>
-  <p:tag name="KSO_WM_UNIT_LAYERLEVEL" val="1"/>
-  <p:tag name="KSO_WM_TAG_VERSION" val="1.0"/>
-  <p:tag name="KSO_WM_BEAUTIFY_FLAG" val="#wm#"/>
-</p:tagLst>
-</file>
-
-<file path=ppt/tags/tag48.xml><?xml version="1.0" encoding="utf-8"?>
-<p:tagLst xmlns:p="http://schemas.openxmlformats.org/presentationml/2006/main">
-  <p:tag name="KSO_WM_UNIT_HIGHLIGHT" val="0"/>
-  <p:tag name="KSO_WM_UNIT_COMPATIBLE" val="0"/>
-  <p:tag name="KSO_WM_UNIT_DIAGRAM_ISNUMVISUAL" val="0"/>
-  <p:tag name="KSO_WM_UNIT_DIAGRAM_ISREFERUNIT" val="0"/>
-  <p:tag name="KSO_WM_UNIT_ID" val="_10**"/>
-  <p:tag name="KSO_WM_UNIT_LAYERLEVEL" val="1"/>
-  <p:tag name="KSO_WM_TAG_VERSION" val="1.0"/>
-  <p:tag name="KSO_WM_BEAUTIFY_FLAG" val="#wm#"/>
-</p:tagLst>
-</file>
-
-<file path=ppt/tags/tag49.xml><?xml version="1.0" encoding="utf-8"?>
-<p:tagLst xmlns:p="http://schemas.openxmlformats.org/presentationml/2006/main">
-  <p:tag name="KSO_WM_UNIT_HIGHLIGHT" val="0"/>
-  <p:tag name="KSO_WM_UNIT_COMPATIBLE" val="0"/>
-  <p:tag name="KSO_WM_UNIT_DIAGRAM_ISNUMVISUAL" val="0"/>
-  <p:tag name="KSO_WM_UNIT_DIAGRAM_ISREFERUNIT" val="0"/>
-  <p:tag name="KSO_WM_UNIT_ID" val="_10**"/>
-  <p:tag name="KSO_WM_UNIT_LAYERLEVEL" val="1"/>
-  <p:tag name="KSO_WM_TAG_VERSION" val="1.0"/>
-  <p:tag name="KSO_WM_BEAUTIFY_FLAG" val="#wm#"/>
-</p:tagLst>
-</file>
-
-<file path=ppt/tags/tag5.xml><?xml version="1.0" encoding="utf-8"?>
-<p:tagLst xmlns:p="http://schemas.openxmlformats.org/presentationml/2006/main">
-  <p:tag name="KSO_WM_UNIT_HIGHLIGHT" val="0"/>
-  <p:tag name="KSO_WM_UNIT_COMPATIBLE" val="0"/>
-  <p:tag name="KSO_WM_UNIT_DIAGRAM_ISNUMVISUAL" val="0"/>
-  <p:tag name="KSO_WM_UNIT_DIAGRAM_ISREFERUNIT" val="0"/>
-  <p:tag name="KSO_WM_UNIT_ID" val="_1**"/>
-  <p:tag name="KSO_WM_UNIT_LAYERLEVEL" val="1"/>
-  <p:tag name="KSO_WM_TAG_VERSION" val="1.0"/>
-  <p:tag name="KSO_WM_BEAUTIFY_FLAG" val="#wm#"/>
-</p:tagLst>
-</file>
-
-<file path=ppt/tags/tag50.xml><?xml version="1.0" encoding="utf-8"?>
-<p:tagLst xmlns:p="http://schemas.openxmlformats.org/presentationml/2006/main">
-  <p:tag name="KSO_WM_UNIT_HIGHLIGHT" val="0"/>
-  <p:tag name="KSO_WM_UNIT_COMPATIBLE" val="0"/>
-  <p:tag name="KSO_WM_UNIT_DIAGRAM_ISNUMVISUAL" val="0"/>
-  <p:tag name="KSO_WM_UNIT_DIAGRAM_ISREFERUNIT" val="0"/>
-  <p:tag name="KSO_WM_UNIT_ID" val="_10**"/>
-  <p:tag name="KSO_WM_UNIT_LAYERLEVEL" val="1"/>
-  <p:tag name="KSO_WM_TAG_VERSION" val="1.0"/>
-  <p:tag name="KSO_WM_BEAUTIFY_FLAG" val="#wm#"/>
-</p:tagLst>
-</file>
-
-<file path=ppt/tags/tag51.xml><?xml version="1.0" encoding="utf-8"?>
-<p:tagLst xmlns:p="http://schemas.openxmlformats.org/presentationml/2006/main">
-  <p:tag name="KSO_WM_UNIT_HIGHLIGHT" val="0"/>
-  <p:tag name="KSO_WM_UNIT_COMPATIBLE" val="0"/>
-  <p:tag name="KSO_WM_UNIT_DIAGRAM_ISNUMVISUAL" val="0"/>
-  <p:tag name="KSO_WM_UNIT_DIAGRAM_ISREFERUNIT" val="0"/>
-  <p:tag name="KSO_WM_UNIT_ID" val="_10**"/>
-  <p:tag name="KSO_WM_UNIT_LAYERLEVEL" val="1"/>
-  <p:tag name="KSO_WM_TAG_VERSION" val="1.0"/>
-  <p:tag name="KSO_WM_BEAUTIFY_FLAG" val="#wm#"/>
-</p:tagLst>
-</file>
-
-<file path=ppt/tags/tag52.xml><?xml version="1.0" encoding="utf-8"?>
-<p:tagLst xmlns:p="http://schemas.openxmlformats.org/presentationml/2006/main">
-  <p:tag name="KSO_WM_UNIT_HIGHLIGHT" val="0"/>
-  <p:tag name="KSO_WM_UNIT_COMPATIBLE" val="0"/>
-  <p:tag name="KSO_WM_UNIT_DIAGRAM_ISNUMVISUAL" val="0"/>
-  <p:tag name="KSO_WM_UNIT_DIAGRAM_ISREFERUNIT" val="0"/>
-  <p:tag name="KSO_WM_UNIT_ID" val="_11**"/>
-  <p:tag name="KSO_WM_UNIT_LAYERLEVEL" val="1"/>
-  <p:tag name="KSO_WM_TAG_VERSION" val="1.0"/>
-  <p:tag name="KSO_WM_BEAUTIFY_FLAG" val="#wm#"/>
-</p:tagLst>
-</file>
-
-<file path=ppt/tags/tag53.xml><?xml version="1.0" encoding="utf-8"?>
-<p:tagLst xmlns:p="http://schemas.openxmlformats.org/presentationml/2006/main">
-  <p:tag name="KSO_WM_UNIT_HIGHLIGHT" val="0"/>
-  <p:tag name="KSO_WM_UNIT_COMPATIBLE" val="0"/>
-  <p:tag name="KSO_WM_UNIT_DIAGRAM_ISNUMVISUAL" val="0"/>
-  <p:tag name="KSO_WM_UNIT_DIAGRAM_ISREFERUNIT" val="0"/>
-  <p:tag name="KSO_WM_UNIT_ID" val="_11**"/>
-  <p:tag name="KSO_WM_UNIT_LAYERLEVEL" val="1"/>
-  <p:tag name="KSO_WM_TAG_VERSION" val="1.0"/>
-  <p:tag name="KSO_WM_BEAUTIFY_FLAG" val="#wm#"/>
-</p:tagLst>
-</file>
-
-<file path=ppt/tags/tag54.xml><?xml version="1.0" encoding="utf-8"?>
-<p:tagLst xmlns:p="http://schemas.openxmlformats.org/presentationml/2006/main">
-  <p:tag name="KSO_WM_UNIT_HIGHLIGHT" val="0"/>
-  <p:tag name="KSO_WM_UNIT_COMPATIBLE" val="0"/>
-  <p:tag name="KSO_WM_UNIT_DIAGRAM_ISNUMVISUAL" val="0"/>
-  <p:tag name="KSO_WM_UNIT_DIAGRAM_ISREFERUNIT" val="0"/>
-  <p:tag name="KSO_WM_UNIT_ID" val="_11**"/>
-  <p:tag name="KSO_WM_UNIT_LAYERLEVEL" val="1"/>
-  <p:tag name="KSO_WM_TAG_VERSION" val="1.0"/>
-  <p:tag name="KSO_WM_BEAUTIFY_FLAG" val="#wm#"/>
-</p:tagLst>
-</file>
-
-<file path=ppt/tags/tag55.xml><?xml version="1.0" encoding="utf-8"?>
-<p:tagLst xmlns:p="http://schemas.openxmlformats.org/presentationml/2006/main">
-  <p:tag name="KSO_WM_UNIT_HIGHLIGHT" val="0"/>
-  <p:tag name="KSO_WM_UNIT_COMPATIBLE" val="0"/>
-  <p:tag name="KSO_WM_UNIT_DIAGRAM_ISNUMVISUAL" val="0"/>
-  <p:tag name="KSO_WM_UNIT_DIAGRAM_ISREFERUNIT" val="0"/>
-  <p:tag name="KSO_WM_UNIT_ID" val="_11**"/>
-  <p:tag name="KSO_WM_UNIT_LAYERLEVEL" val="1"/>
-  <p:tag name="KSO_WM_TAG_VERSION" val="1.0"/>
-  <p:tag name="KSO_WM_BEAUTIFY_FLAG" val="#wm#"/>
-</p:tagLst>
-</file>
-
-<file path=ppt/tags/tag56.xml><?xml version="1.0" encoding="utf-8"?>
-<p:tagLst xmlns:p="http://schemas.openxmlformats.org/presentationml/2006/main">
-  <p:tag name="KSO_WM_UNIT_HIGHLIGHT" val="0"/>
-  <p:tag name="KSO_WM_UNIT_COMPATIBLE" val="0"/>
-  <p:tag name="KSO_WM_UNIT_DIAGRAM_ISNUMVISUAL" val="0"/>
-  <p:tag name="KSO_WM_UNIT_DIAGRAM_ISREFERUNIT" val="0"/>
-  <p:tag name="KSO_WM_UNIT_ID" val="_11**"/>
-  <p:tag name="KSO_WM_UNIT_LAYERLEVEL" val="1"/>
-  <p:tag name="KSO_WM_TAG_VERSION" val="1.0"/>
-  <p:tag name="KSO_WM_BEAUTIFY_FLAG" val="#wm#"/>
-</p:tagLst>
-</file>
-
-<file path=ppt/tags/tag57.xml><?xml version="1.0" encoding="utf-8"?>
-<p:tagLst xmlns:p="http://schemas.openxmlformats.org/presentationml/2006/main">
-  <p:tag name="KSO_WM_UNIT_HIGHLIGHT" val="0"/>
-  <p:tag name="KSO_WM_UNIT_COMPATIBLE" val="0"/>
-  <p:tag name="KSO_WM_UNIT_DIAGRAM_ISNUMVISUAL" val="0"/>
-  <p:tag name="KSO_WM_UNIT_DIAGRAM_ISREFERUNIT" val="0"/>
-  <p:tag name="KSO_WM_UNIT_ID" val="_0**"/>
-  <p:tag name="KSO_WM_UNIT_LAYERLEVEL" val="1"/>
-  <p:tag name="KSO_WM_TAG_VERSION" val="1.0"/>
-  <p:tag name="KSO_WM_BEAUTIFY_FLAG" val="#wm#"/>
-  <p:tag name="KSO_WM_TEMPLATE_CATEGORY" val="custom"/>
-  <p:tag name="KSO_WM_TEMPLATE_INDEX" val="20205081"/>
-</p:tagLst>
-</file>
-
-<file path=ppt/tags/tag58.xml><?xml version="1.0" encoding="utf-8"?>
-<p:tagLst xmlns:p="http://schemas.openxmlformats.org/presentationml/2006/main">
-  <p:tag name="KSO_WM_UNIT_HIGHLIGHT" val="0"/>
-  <p:tag name="KSO_WM_UNIT_COMPATIBLE" val="0"/>
-  <p:tag name="KSO_WM_UNIT_DIAGRAM_ISNUMVISUAL" val="0"/>
-  <p:tag name="KSO_WM_UNIT_DIAGRAM_ISREFERUNIT" val="0"/>
-  <p:tag name="KSO_WM_UNIT_ID" val="_0**"/>
-  <p:tag name="KSO_WM_UNIT_LAYERLEVEL" val="1"/>
-  <p:tag name="KSO_WM_TAG_VERSION" val="1.0"/>
-  <p:tag name="KSO_WM_BEAUTIFY_FLAG" val="#wm#"/>
-  <p:tag name="KSO_WM_TEMPLATE_CATEGORY" val="custom"/>
-  <p:tag name="KSO_WM_TEMPLATE_INDEX" val="20205081"/>
-</p:tagLst>
-</file>
-
-<file path=ppt/tags/tag59.xml><?xml version="1.0" encoding="utf-8"?>
-<p:tagLst xmlns:p="http://schemas.openxmlformats.org/presentationml/2006/main">
-  <p:tag name="KSO_WM_UNIT_HIGHLIGHT" val="0"/>
-  <p:tag name="KSO_WM_UNIT_COMPATIBLE" val="0"/>
-  <p:tag name="KSO_WM_UNIT_DIAGRAM_ISNUMVISUAL" val="0"/>
-  <p:tag name="KSO_WM_UNIT_DIAGRAM_ISREFERUNIT" val="0"/>
-  <p:tag name="KSO_WM_UNIT_ID" val="_0**"/>
-  <p:tag name="KSO_WM_UNIT_LAYERLEVEL" val="1"/>
-  <p:tag name="KSO_WM_TAG_VERSION" val="1.0"/>
-  <p:tag name="KSO_WM_BEAUTIFY_FLAG" val="#wm#"/>
-</p:tagLst>
-</file>
-
-<file path=ppt/tags/tag6.xml><?xml version="1.0" encoding="utf-8"?>
-<p:tagLst xmlns:p="http://schemas.openxmlformats.org/presentationml/2006/main">
-  <p:tag name="KSO_WM_UNIT_HIGHLIGHT" val="0"/>
-  <p:tag name="KSO_WM_UNIT_COMPATIBLE" val="0"/>
-  <p:tag name="KSO_WM_UNIT_DIAGRAM_ISNUMVISUAL" val="0"/>
-  <p:tag name="KSO_WM_UNIT_DIAGRAM_ISREFERUNIT" val="0"/>
-  <p:tag name="KSO_WM_UNIT_ID" val="_2**"/>
-  <p:tag name="KSO_WM_UNIT_LAYERLEVEL" val="1"/>
-  <p:tag name="KSO_WM_TAG_VERSION" val="1.0"/>
-  <p:tag name="KSO_WM_BEAUTIFY_FLAG" val="#wm#"/>
-</p:tagLst>
-</file>
-
-<file path=ppt/tags/tag60.xml><?xml version="1.0" encoding="utf-8"?>
-<p:tagLst xmlns:p="http://schemas.openxmlformats.org/presentationml/2006/main">
-  <p:tag name="KSO_WM_UNIT_HIGHLIGHT" val="0"/>
-  <p:tag name="KSO_WM_UNIT_COMPATIBLE" val="0"/>
-  <p:tag name="KSO_WM_UNIT_DIAGRAM_ISNUMVISUAL" val="0"/>
-  <p:tag name="KSO_WM_UNIT_DIAGRAM_ISREFERUNIT" val="0"/>
-  <p:tag name="KSO_WM_UNIT_ID" val="_0**"/>
-  <p:tag name="KSO_WM_UNIT_LAYERLEVEL" val="1"/>
-  <p:tag name="KSO_WM_TAG_VERSION" val="1.0"/>
-  <p:tag name="KSO_WM_BEAUTIFY_FLAG" val="#wm#"/>
-</p:tagLst>
-</file>
-
-<file path=ppt/tags/tag61.xml><?xml version="1.0" encoding="utf-8"?>
-<p:tagLst xmlns:p="http://schemas.openxmlformats.org/presentationml/2006/main">
-  <p:tag name="KSO_WM_UNIT_HIGHLIGHT" val="0"/>
-  <p:tag name="KSO_WM_UNIT_COMPATIBLE" val="0"/>
-  <p:tag name="KSO_WM_UNIT_DIAGRAM_ISNUMVISUAL" val="0"/>
-  <p:tag name="KSO_WM_UNIT_DIAGRAM_ISREFERUNIT" val="0"/>
-  <p:tag name="KSO_WM_UNIT_ID" val="_0**"/>
-  <p:tag name="KSO_WM_UNIT_LAYERLEVEL" val="1"/>
-  <p:tag name="KSO_WM_TAG_VERSION" val="1.0"/>
-  <p:tag name="KSO_WM_BEAUTIFY_FLAG" val="#wm#"/>
-</p:tagLst>
-</file>
-
-<file path=ppt/tags/tag62.xml><?xml version="1.0" encoding="utf-8"?>
-<p:tagLst xmlns:p="http://schemas.openxmlformats.org/presentationml/2006/main">
+<p:tagLst xmlns:a="http://schemas.openxmlformats.org/drawingml/2006/main" xmlns:r="http://schemas.openxmlformats.org/officeDocument/2006/relationships" xmlns:p="http://schemas.openxmlformats.org/presentationml/2006/main">
   <p:tag name="KSO_WM_TEMPLATE_THUMBS_INDEX" val="1、4、7、12、13、14、15、16、17、18、20、24、25、28、33、36、40、43、44"/>
   <p:tag name="KSO_WM_TEMPLATE_SUBCATEGORY" val="19"/>
   <p:tag name="KSO_WM_TAG_VERSION" val="1.0"/>
@@ -4493,26 +3801,636 @@
 </p:tagLst>
 </file>
 
+<file path=ppt/tags/tag20.xml><?xml version="1.0" encoding="utf-8"?>
+<p:tagLst xmlns:a="http://schemas.openxmlformats.org/drawingml/2006/main" xmlns:r="http://schemas.openxmlformats.org/officeDocument/2006/relationships" xmlns:p="http://schemas.openxmlformats.org/presentationml/2006/main">
+  <p:tag name="KSO_WM_UNIT_HIGHLIGHT" val="0"/>
+  <p:tag name="KSO_WM_UNIT_COMPATIBLE" val="0"/>
+  <p:tag name="KSO_WM_UNIT_DIAGRAM_ISNUMVISUAL" val="0"/>
+  <p:tag name="KSO_WM_UNIT_DIAGRAM_ISREFERUNIT" val="0"/>
+  <p:tag name="KSO_WM_UNIT_ID" val="_3**"/>
+  <p:tag name="KSO_WM_UNIT_LAYERLEVEL" val="1"/>
+  <p:tag name="KSO_WM_TAG_VERSION" val="1.0"/>
+  <p:tag name="KSO_WM_BEAUTIFY_FLAG" val="#wm#"/>
+</p:tagLst>
+</file>
+
+<file path=ppt/tags/tag21.xml><?xml version="1.0" encoding="utf-8"?>
+<p:tagLst xmlns:a="http://schemas.openxmlformats.org/drawingml/2006/main" xmlns:r="http://schemas.openxmlformats.org/officeDocument/2006/relationships" xmlns:p="http://schemas.openxmlformats.org/presentationml/2006/main">
+  <p:tag name="KSO_WM_UNIT_HIGHLIGHT" val="0"/>
+  <p:tag name="KSO_WM_UNIT_COMPATIBLE" val="0"/>
+  <p:tag name="KSO_WM_UNIT_DIAGRAM_ISNUMVISUAL" val="0"/>
+  <p:tag name="KSO_WM_UNIT_DIAGRAM_ISREFERUNIT" val="0"/>
+  <p:tag name="KSO_WM_UNIT_ID" val="_3**"/>
+  <p:tag name="KSO_WM_UNIT_LAYERLEVEL" val="1"/>
+  <p:tag name="KSO_WM_TAG_VERSION" val="1.0"/>
+  <p:tag name="KSO_WM_BEAUTIFY_FLAG" val="#wm#"/>
+</p:tagLst>
+</file>
+
+<file path=ppt/tags/tag22.xml><?xml version="1.0" encoding="utf-8"?>
+<p:tagLst xmlns:a="http://schemas.openxmlformats.org/drawingml/2006/main" xmlns:r="http://schemas.openxmlformats.org/officeDocument/2006/relationships" xmlns:p="http://schemas.openxmlformats.org/presentationml/2006/main">
+  <p:tag name="KSO_WM_UNIT_HIGHLIGHT" val="0"/>
+  <p:tag name="KSO_WM_UNIT_COMPATIBLE" val="0"/>
+  <p:tag name="KSO_WM_UNIT_DIAGRAM_ISNUMVISUAL" val="0"/>
+  <p:tag name="KSO_WM_UNIT_DIAGRAM_ISREFERUNIT" val="0"/>
+  <p:tag name="KSO_WM_UNIT_ID" val="_3**"/>
+  <p:tag name="KSO_WM_UNIT_LAYERLEVEL" val="1"/>
+  <p:tag name="KSO_WM_TAG_VERSION" val="1.0"/>
+  <p:tag name="KSO_WM_BEAUTIFY_FLAG" val="#wm#"/>
+</p:tagLst>
+</file>
+
+<file path=ppt/tags/tag23.xml><?xml version="1.0" encoding="utf-8"?>
+<p:tagLst xmlns:a="http://schemas.openxmlformats.org/drawingml/2006/main" xmlns:r="http://schemas.openxmlformats.org/officeDocument/2006/relationships" xmlns:p="http://schemas.openxmlformats.org/presentationml/2006/main">
+  <p:tag name="KSO_WM_UNIT_HIGHLIGHT" val="0"/>
+  <p:tag name="KSO_WM_UNIT_COMPATIBLE" val="0"/>
+  <p:tag name="KSO_WM_UNIT_DIAGRAM_ISNUMVISUAL" val="0"/>
+  <p:tag name="KSO_WM_UNIT_DIAGRAM_ISREFERUNIT" val="0"/>
+  <p:tag name="KSO_WM_UNIT_ID" val="_4**"/>
+  <p:tag name="KSO_WM_UNIT_LAYERLEVEL" val="1"/>
+  <p:tag name="KSO_WM_TAG_VERSION" val="1.0"/>
+  <p:tag name="KSO_WM_BEAUTIFY_FLAG" val="#wm#"/>
+</p:tagLst>
+</file>
+
+<file path=ppt/tags/tag24.xml><?xml version="1.0" encoding="utf-8"?>
+<p:tagLst xmlns:a="http://schemas.openxmlformats.org/drawingml/2006/main" xmlns:r="http://schemas.openxmlformats.org/officeDocument/2006/relationships" xmlns:p="http://schemas.openxmlformats.org/presentationml/2006/main">
+  <p:tag name="KSO_WM_UNIT_HIGHLIGHT" val="0"/>
+  <p:tag name="KSO_WM_UNIT_COMPATIBLE" val="0"/>
+  <p:tag name="KSO_WM_UNIT_DIAGRAM_ISNUMVISUAL" val="0"/>
+  <p:tag name="KSO_WM_UNIT_DIAGRAM_ISREFERUNIT" val="0"/>
+  <p:tag name="KSO_WM_UNIT_ID" val="_4**"/>
+  <p:tag name="KSO_WM_UNIT_LAYERLEVEL" val="1"/>
+  <p:tag name="KSO_WM_TAG_VERSION" val="1.0"/>
+  <p:tag name="KSO_WM_BEAUTIFY_FLAG" val="#wm#"/>
+</p:tagLst>
+</file>
+
+<file path=ppt/tags/tag25.xml><?xml version="1.0" encoding="utf-8"?>
+<p:tagLst xmlns:a="http://schemas.openxmlformats.org/drawingml/2006/main" xmlns:r="http://schemas.openxmlformats.org/officeDocument/2006/relationships" xmlns:p="http://schemas.openxmlformats.org/presentationml/2006/main">
+  <p:tag name="KSO_WM_UNIT_HIGHLIGHT" val="0"/>
+  <p:tag name="KSO_WM_UNIT_COMPATIBLE" val="0"/>
+  <p:tag name="KSO_WM_UNIT_DIAGRAM_ISNUMVISUAL" val="0"/>
+  <p:tag name="KSO_WM_UNIT_DIAGRAM_ISREFERUNIT" val="0"/>
+  <p:tag name="KSO_WM_UNIT_ID" val="_4**"/>
+  <p:tag name="KSO_WM_UNIT_LAYERLEVEL" val="1"/>
+  <p:tag name="KSO_WM_TAG_VERSION" val="1.0"/>
+  <p:tag name="KSO_WM_BEAUTIFY_FLAG" val="#wm#"/>
+</p:tagLst>
+</file>
+
+<file path=ppt/tags/tag26.xml><?xml version="1.0" encoding="utf-8"?>
+<p:tagLst xmlns:a="http://schemas.openxmlformats.org/drawingml/2006/main" xmlns:r="http://schemas.openxmlformats.org/officeDocument/2006/relationships" xmlns:p="http://schemas.openxmlformats.org/presentationml/2006/main">
+  <p:tag name="KSO_WM_UNIT_HIGHLIGHT" val="0"/>
+  <p:tag name="KSO_WM_UNIT_COMPATIBLE" val="0"/>
+  <p:tag name="KSO_WM_UNIT_DIAGRAM_ISNUMVISUAL" val="0"/>
+  <p:tag name="KSO_WM_UNIT_DIAGRAM_ISREFERUNIT" val="0"/>
+  <p:tag name="KSO_WM_UNIT_ID" val="_4**"/>
+  <p:tag name="KSO_WM_UNIT_LAYERLEVEL" val="1"/>
+  <p:tag name="KSO_WM_TAG_VERSION" val="1.0"/>
+  <p:tag name="KSO_WM_BEAUTIFY_FLAG" val="#wm#"/>
+</p:tagLst>
+</file>
+
+<file path=ppt/tags/tag27.xml><?xml version="1.0" encoding="utf-8"?>
+<p:tagLst xmlns:a="http://schemas.openxmlformats.org/drawingml/2006/main" xmlns:r="http://schemas.openxmlformats.org/officeDocument/2006/relationships" xmlns:p="http://schemas.openxmlformats.org/presentationml/2006/main">
+  <p:tag name="KSO_WM_UNIT_HIGHLIGHT" val="0"/>
+  <p:tag name="KSO_WM_UNIT_COMPATIBLE" val="0"/>
+  <p:tag name="KSO_WM_UNIT_DIAGRAM_ISNUMVISUAL" val="0"/>
+  <p:tag name="KSO_WM_UNIT_DIAGRAM_ISREFERUNIT" val="0"/>
+  <p:tag name="KSO_WM_UNIT_ID" val="_4**"/>
+  <p:tag name="KSO_WM_UNIT_LAYERLEVEL" val="1"/>
+  <p:tag name="KSO_WM_TAG_VERSION" val="1.0"/>
+  <p:tag name="KSO_WM_BEAUTIFY_FLAG" val="#wm#"/>
+</p:tagLst>
+</file>
+
+<file path=ppt/tags/tag28.xml><?xml version="1.0" encoding="utf-8"?>
+<p:tagLst xmlns:a="http://schemas.openxmlformats.org/drawingml/2006/main" xmlns:r="http://schemas.openxmlformats.org/officeDocument/2006/relationships" xmlns:p="http://schemas.openxmlformats.org/presentationml/2006/main">
+  <p:tag name="KSO_WM_UNIT_HIGHLIGHT" val="0"/>
+  <p:tag name="KSO_WM_UNIT_COMPATIBLE" val="0"/>
+  <p:tag name="KSO_WM_UNIT_DIAGRAM_ISNUMVISUAL" val="0"/>
+  <p:tag name="KSO_WM_UNIT_DIAGRAM_ISREFERUNIT" val="0"/>
+  <p:tag name="KSO_WM_UNIT_ID" val="_4**"/>
+  <p:tag name="KSO_WM_UNIT_LAYERLEVEL" val="1"/>
+  <p:tag name="KSO_WM_TAG_VERSION" val="1.0"/>
+  <p:tag name="KSO_WM_BEAUTIFY_FLAG" val="#wm#"/>
+</p:tagLst>
+</file>
+
+<file path=ppt/tags/tag29.xml><?xml version="1.0" encoding="utf-8"?>
+<p:tagLst xmlns:a="http://schemas.openxmlformats.org/drawingml/2006/main" xmlns:r="http://schemas.openxmlformats.org/officeDocument/2006/relationships" xmlns:p="http://schemas.openxmlformats.org/presentationml/2006/main">
+  <p:tag name="KSO_WM_UNIT_HIGHLIGHT" val="0"/>
+  <p:tag name="KSO_WM_UNIT_COMPATIBLE" val="0"/>
+  <p:tag name="KSO_WM_UNIT_DIAGRAM_ISNUMVISUAL" val="0"/>
+  <p:tag name="KSO_WM_UNIT_DIAGRAM_ISREFERUNIT" val="0"/>
+  <p:tag name="KSO_WM_UNIT_ID" val="_5**"/>
+  <p:tag name="KSO_WM_UNIT_LAYERLEVEL" val="1"/>
+  <p:tag name="KSO_WM_TAG_VERSION" val="1.0"/>
+  <p:tag name="KSO_WM_BEAUTIFY_FLAG" val="#wm#"/>
+</p:tagLst>
+</file>
+
+<file path=ppt/tags/tag3.xml><?xml version="1.0" encoding="utf-8"?>
+<p:tagLst xmlns:a="http://schemas.openxmlformats.org/drawingml/2006/main" xmlns:r="http://schemas.openxmlformats.org/officeDocument/2006/relationships" xmlns:p="http://schemas.openxmlformats.org/presentationml/2006/main">
+  <p:tag name="KSO_WM_UNIT_HIGHLIGHT" val="0"/>
+  <p:tag name="KSO_WM_UNIT_COMPATIBLE" val="0"/>
+  <p:tag name="KSO_WM_UNIT_DIAGRAM_ISNUMVISUAL" val="0"/>
+  <p:tag name="KSO_WM_UNIT_DIAGRAM_ISREFERUNIT" val="0"/>
+  <p:tag name="KSO_WM_UNIT_ID" val="_0**"/>
+  <p:tag name="KSO_WM_UNIT_LAYERLEVEL" val="1"/>
+  <p:tag name="KSO_WM_TAG_VERSION" val="1.0"/>
+  <p:tag name="KSO_WM_BEAUTIFY_FLAG" val="#wm#"/>
+  <p:tag name="KSO_WM_TEMPLATE_CATEGORY" val="custom"/>
+  <p:tag name="KSO_WM_TEMPLATE_INDEX" val="20205081"/>
+</p:tagLst>
+</file>
+
+<file path=ppt/tags/tag30.xml><?xml version="1.0" encoding="utf-8"?>
+<p:tagLst xmlns:a="http://schemas.openxmlformats.org/drawingml/2006/main" xmlns:r="http://schemas.openxmlformats.org/officeDocument/2006/relationships" xmlns:p="http://schemas.openxmlformats.org/presentationml/2006/main">
+  <p:tag name="KSO_WM_UNIT_HIGHLIGHT" val="0"/>
+  <p:tag name="KSO_WM_UNIT_COMPATIBLE" val="0"/>
+  <p:tag name="KSO_WM_UNIT_DIAGRAM_ISNUMVISUAL" val="0"/>
+  <p:tag name="KSO_WM_UNIT_DIAGRAM_ISREFERUNIT" val="0"/>
+  <p:tag name="KSO_WM_UNIT_ID" val="_5**"/>
+  <p:tag name="KSO_WM_UNIT_LAYERLEVEL" val="1"/>
+  <p:tag name="KSO_WM_TAG_VERSION" val="1.0"/>
+  <p:tag name="KSO_WM_BEAUTIFY_FLAG" val="#wm#"/>
+</p:tagLst>
+</file>
+
+<file path=ppt/tags/tag31.xml><?xml version="1.0" encoding="utf-8"?>
+<p:tagLst xmlns:a="http://schemas.openxmlformats.org/drawingml/2006/main" xmlns:r="http://schemas.openxmlformats.org/officeDocument/2006/relationships" xmlns:p="http://schemas.openxmlformats.org/presentationml/2006/main">
+  <p:tag name="KSO_WM_UNIT_HIGHLIGHT" val="0"/>
+  <p:tag name="KSO_WM_UNIT_COMPATIBLE" val="0"/>
+  <p:tag name="KSO_WM_UNIT_DIAGRAM_ISNUMVISUAL" val="0"/>
+  <p:tag name="KSO_WM_UNIT_DIAGRAM_ISREFERUNIT" val="0"/>
+  <p:tag name="KSO_WM_UNIT_ID" val="_5**"/>
+  <p:tag name="KSO_WM_UNIT_LAYERLEVEL" val="1"/>
+  <p:tag name="KSO_WM_TAG_VERSION" val="1.0"/>
+  <p:tag name="KSO_WM_BEAUTIFY_FLAG" val="#wm#"/>
+</p:tagLst>
+</file>
+
+<file path=ppt/tags/tag32.xml><?xml version="1.0" encoding="utf-8"?>
+<p:tagLst xmlns:a="http://schemas.openxmlformats.org/drawingml/2006/main" xmlns:r="http://schemas.openxmlformats.org/officeDocument/2006/relationships" xmlns:p="http://schemas.openxmlformats.org/presentationml/2006/main">
+  <p:tag name="KSO_WM_UNIT_HIGHLIGHT" val="0"/>
+  <p:tag name="KSO_WM_UNIT_COMPATIBLE" val="0"/>
+  <p:tag name="KSO_WM_UNIT_DIAGRAM_ISNUMVISUAL" val="0"/>
+  <p:tag name="KSO_WM_UNIT_DIAGRAM_ISREFERUNIT" val="0"/>
+  <p:tag name="KSO_WM_UNIT_ID" val="_5**"/>
+  <p:tag name="KSO_WM_UNIT_LAYERLEVEL" val="1"/>
+  <p:tag name="KSO_WM_TAG_VERSION" val="1.0"/>
+  <p:tag name="KSO_WM_BEAUTIFY_FLAG" val="#wm#"/>
+</p:tagLst>
+</file>
+
+<file path=ppt/tags/tag33.xml><?xml version="1.0" encoding="utf-8"?>
+<p:tagLst xmlns:a="http://schemas.openxmlformats.org/drawingml/2006/main" xmlns:r="http://schemas.openxmlformats.org/officeDocument/2006/relationships" xmlns:p="http://schemas.openxmlformats.org/presentationml/2006/main">
+  <p:tag name="KSO_WM_UNIT_HIGHLIGHT" val="0"/>
+  <p:tag name="KSO_WM_UNIT_COMPATIBLE" val="0"/>
+  <p:tag name="KSO_WM_UNIT_DIAGRAM_ISNUMVISUAL" val="0"/>
+  <p:tag name="KSO_WM_UNIT_DIAGRAM_ISREFERUNIT" val="0"/>
+  <p:tag name="KSO_WM_UNIT_ID" val="_5**"/>
+  <p:tag name="KSO_WM_UNIT_LAYERLEVEL" val="1"/>
+  <p:tag name="KSO_WM_TAG_VERSION" val="1.0"/>
+  <p:tag name="KSO_WM_BEAUTIFY_FLAG" val="#wm#"/>
+</p:tagLst>
+</file>
+
+<file path=ppt/tags/tag34.xml><?xml version="1.0" encoding="utf-8"?>
+<p:tagLst xmlns:a="http://schemas.openxmlformats.org/drawingml/2006/main" xmlns:r="http://schemas.openxmlformats.org/officeDocument/2006/relationships" xmlns:p="http://schemas.openxmlformats.org/presentationml/2006/main">
+  <p:tag name="KSO_WM_UNIT_HIGHLIGHT" val="0"/>
+  <p:tag name="KSO_WM_UNIT_COMPATIBLE" val="0"/>
+  <p:tag name="KSO_WM_UNIT_DIAGRAM_ISNUMVISUAL" val="0"/>
+  <p:tag name="KSO_WM_UNIT_DIAGRAM_ISREFERUNIT" val="0"/>
+  <p:tag name="KSO_WM_UNIT_ID" val="_5**"/>
+  <p:tag name="KSO_WM_UNIT_LAYERLEVEL" val="1"/>
+  <p:tag name="KSO_WM_TAG_VERSION" val="1.0"/>
+  <p:tag name="KSO_WM_BEAUTIFY_FLAG" val="#wm#"/>
+</p:tagLst>
+</file>
+
+<file path=ppt/tags/tag35.xml><?xml version="1.0" encoding="utf-8"?>
+<p:tagLst xmlns:a="http://schemas.openxmlformats.org/drawingml/2006/main" xmlns:r="http://schemas.openxmlformats.org/officeDocument/2006/relationships" xmlns:p="http://schemas.openxmlformats.org/presentationml/2006/main">
+  <p:tag name="KSO_WM_UNIT_HIGHLIGHT" val="0"/>
+  <p:tag name="KSO_WM_UNIT_COMPATIBLE" val="0"/>
+  <p:tag name="KSO_WM_UNIT_DIAGRAM_ISNUMVISUAL" val="0"/>
+  <p:tag name="KSO_WM_UNIT_DIAGRAM_ISREFERUNIT" val="0"/>
+  <p:tag name="KSO_WM_UNIT_ID" val="_5**"/>
+  <p:tag name="KSO_WM_UNIT_LAYERLEVEL" val="1"/>
+  <p:tag name="KSO_WM_TAG_VERSION" val="1.0"/>
+  <p:tag name="KSO_WM_BEAUTIFY_FLAG" val="#wm#"/>
+</p:tagLst>
+</file>
+
+<file path=ppt/tags/tag36.xml><?xml version="1.0" encoding="utf-8"?>
+<p:tagLst xmlns:a="http://schemas.openxmlformats.org/drawingml/2006/main" xmlns:r="http://schemas.openxmlformats.org/officeDocument/2006/relationships" xmlns:p="http://schemas.openxmlformats.org/presentationml/2006/main">
+  <p:tag name="KSO_WM_UNIT_HIGHLIGHT" val="0"/>
+  <p:tag name="KSO_WM_UNIT_COMPATIBLE" val="0"/>
+  <p:tag name="KSO_WM_UNIT_DIAGRAM_ISNUMVISUAL" val="0"/>
+  <p:tag name="KSO_WM_UNIT_DIAGRAM_ISREFERUNIT" val="0"/>
+  <p:tag name="KSO_WM_UNIT_ID" val="_5**"/>
+  <p:tag name="KSO_WM_UNIT_LAYERLEVEL" val="1"/>
+  <p:tag name="KSO_WM_TAG_VERSION" val="1.0"/>
+  <p:tag name="KSO_WM_BEAUTIFY_FLAG" val="#wm#"/>
+</p:tagLst>
+</file>
+
+<file path=ppt/tags/tag37.xml><?xml version="1.0" encoding="utf-8"?>
+<p:tagLst xmlns:a="http://schemas.openxmlformats.org/drawingml/2006/main" xmlns:r="http://schemas.openxmlformats.org/officeDocument/2006/relationships" xmlns:p="http://schemas.openxmlformats.org/presentationml/2006/main">
+  <p:tag name="KSO_WM_UNIT_HIGHLIGHT" val="0"/>
+  <p:tag name="KSO_WM_UNIT_COMPATIBLE" val="0"/>
+  <p:tag name="KSO_WM_UNIT_DIAGRAM_ISNUMVISUAL" val="0"/>
+  <p:tag name="KSO_WM_UNIT_DIAGRAM_ISREFERUNIT" val="0"/>
+  <p:tag name="KSO_WM_UNIT_ID" val="_6**"/>
+  <p:tag name="KSO_WM_UNIT_LAYERLEVEL" val="1"/>
+  <p:tag name="KSO_WM_TAG_VERSION" val="1.0"/>
+  <p:tag name="KSO_WM_BEAUTIFY_FLAG" val="#wm#"/>
+</p:tagLst>
+</file>
+
+<file path=ppt/tags/tag38.xml><?xml version="1.0" encoding="utf-8"?>
+<p:tagLst xmlns:a="http://schemas.openxmlformats.org/drawingml/2006/main" xmlns:r="http://schemas.openxmlformats.org/officeDocument/2006/relationships" xmlns:p="http://schemas.openxmlformats.org/presentationml/2006/main">
+  <p:tag name="KSO_WM_UNIT_HIGHLIGHT" val="0"/>
+  <p:tag name="KSO_WM_UNIT_COMPATIBLE" val="0"/>
+  <p:tag name="KSO_WM_UNIT_DIAGRAM_ISNUMVISUAL" val="0"/>
+  <p:tag name="KSO_WM_UNIT_DIAGRAM_ISREFERUNIT" val="0"/>
+  <p:tag name="KSO_WM_UNIT_ID" val="_6**"/>
+  <p:tag name="KSO_WM_UNIT_LAYERLEVEL" val="1"/>
+  <p:tag name="KSO_WM_TAG_VERSION" val="1.0"/>
+  <p:tag name="KSO_WM_BEAUTIFY_FLAG" val="#wm#"/>
+</p:tagLst>
+</file>
+
+<file path=ppt/tags/tag39.xml><?xml version="1.0" encoding="utf-8"?>
+<p:tagLst xmlns:a="http://schemas.openxmlformats.org/drawingml/2006/main" xmlns:r="http://schemas.openxmlformats.org/officeDocument/2006/relationships" xmlns:p="http://schemas.openxmlformats.org/presentationml/2006/main">
+  <p:tag name="KSO_WM_UNIT_HIGHLIGHT" val="0"/>
+  <p:tag name="KSO_WM_UNIT_COMPATIBLE" val="0"/>
+  <p:tag name="KSO_WM_UNIT_DIAGRAM_ISNUMVISUAL" val="0"/>
+  <p:tag name="KSO_WM_UNIT_DIAGRAM_ISREFERUNIT" val="0"/>
+  <p:tag name="KSO_WM_UNIT_ID" val="_6**"/>
+  <p:tag name="KSO_WM_UNIT_LAYERLEVEL" val="1"/>
+  <p:tag name="KSO_WM_TAG_VERSION" val="1.0"/>
+  <p:tag name="KSO_WM_BEAUTIFY_FLAG" val="#wm#"/>
+</p:tagLst>
+</file>
+
+<file path=ppt/tags/tag4.xml><?xml version="1.0" encoding="utf-8"?>
+<p:tagLst xmlns:a="http://schemas.openxmlformats.org/drawingml/2006/main" xmlns:r="http://schemas.openxmlformats.org/officeDocument/2006/relationships" xmlns:p="http://schemas.openxmlformats.org/presentationml/2006/main">
+  <p:tag name="KSO_WM_UNIT_HIGHLIGHT" val="0"/>
+  <p:tag name="KSO_WM_UNIT_COMPATIBLE" val="0"/>
+  <p:tag name="KSO_WM_UNIT_DIAGRAM_ISNUMVISUAL" val="0"/>
+  <p:tag name="KSO_WM_UNIT_DIAGRAM_ISREFERUNIT" val="0"/>
+  <p:tag name="KSO_WM_UNIT_ID" val="_0**"/>
+  <p:tag name="KSO_WM_UNIT_LAYERLEVEL" val="1"/>
+  <p:tag name="KSO_WM_TAG_VERSION" val="1.0"/>
+  <p:tag name="KSO_WM_BEAUTIFY_FLAG" val="#wm#"/>
+  <p:tag name="KSO_WM_TEMPLATE_CATEGORY" val="custom"/>
+  <p:tag name="KSO_WM_TEMPLATE_INDEX" val="20205081"/>
+</p:tagLst>
+</file>
+
+<file path=ppt/tags/tag40.xml><?xml version="1.0" encoding="utf-8"?>
+<p:tagLst xmlns:a="http://schemas.openxmlformats.org/drawingml/2006/main" xmlns:r="http://schemas.openxmlformats.org/officeDocument/2006/relationships" xmlns:p="http://schemas.openxmlformats.org/presentationml/2006/main">
+  <p:tag name="KSO_WM_UNIT_HIGHLIGHT" val="0"/>
+  <p:tag name="KSO_WM_UNIT_COMPATIBLE" val="0"/>
+  <p:tag name="KSO_WM_UNIT_DIAGRAM_ISNUMVISUAL" val="0"/>
+  <p:tag name="KSO_WM_UNIT_DIAGRAM_ISREFERUNIT" val="0"/>
+  <p:tag name="KSO_WM_UNIT_ID" val="_6**"/>
+  <p:tag name="KSO_WM_UNIT_LAYERLEVEL" val="1"/>
+  <p:tag name="KSO_WM_TAG_VERSION" val="1.0"/>
+  <p:tag name="KSO_WM_BEAUTIFY_FLAG" val="#wm#"/>
+</p:tagLst>
+</file>
+
+<file path=ppt/tags/tag41.xml><?xml version="1.0" encoding="utf-8"?>
+<p:tagLst xmlns:a="http://schemas.openxmlformats.org/drawingml/2006/main" xmlns:r="http://schemas.openxmlformats.org/officeDocument/2006/relationships" xmlns:p="http://schemas.openxmlformats.org/presentationml/2006/main">
+  <p:tag name="KSO_WM_UNIT_HIGHLIGHT" val="0"/>
+  <p:tag name="KSO_WM_UNIT_COMPATIBLE" val="0"/>
+  <p:tag name="KSO_WM_UNIT_DIAGRAM_ISNUMVISUAL" val="0"/>
+  <p:tag name="KSO_WM_UNIT_DIAGRAM_ISREFERUNIT" val="0"/>
+  <p:tag name="KSO_WM_UNIT_ID" val="_7**"/>
+  <p:tag name="KSO_WM_UNIT_LAYERLEVEL" val="1"/>
+  <p:tag name="KSO_WM_TAG_VERSION" val="1.0"/>
+  <p:tag name="KSO_WM_BEAUTIFY_FLAG" val="#wm#"/>
+</p:tagLst>
+</file>
+
+<file path=ppt/tags/tag42.xml><?xml version="1.0" encoding="utf-8"?>
+<p:tagLst xmlns:a="http://schemas.openxmlformats.org/drawingml/2006/main" xmlns:r="http://schemas.openxmlformats.org/officeDocument/2006/relationships" xmlns:p="http://schemas.openxmlformats.org/presentationml/2006/main">
+  <p:tag name="KSO_WM_UNIT_HIGHLIGHT" val="0"/>
+  <p:tag name="KSO_WM_UNIT_COMPATIBLE" val="0"/>
+  <p:tag name="KSO_WM_UNIT_DIAGRAM_ISNUMVISUAL" val="0"/>
+  <p:tag name="KSO_WM_UNIT_DIAGRAM_ISREFERUNIT" val="0"/>
+  <p:tag name="KSO_WM_UNIT_ID" val="_7**"/>
+  <p:tag name="KSO_WM_UNIT_LAYERLEVEL" val="1"/>
+  <p:tag name="KSO_WM_TAG_VERSION" val="1.0"/>
+  <p:tag name="KSO_WM_BEAUTIFY_FLAG" val="#wm#"/>
+</p:tagLst>
+</file>
+
+<file path=ppt/tags/tag43.xml><?xml version="1.0" encoding="utf-8"?>
+<p:tagLst xmlns:a="http://schemas.openxmlformats.org/drawingml/2006/main" xmlns:r="http://schemas.openxmlformats.org/officeDocument/2006/relationships" xmlns:p="http://schemas.openxmlformats.org/presentationml/2006/main">
+  <p:tag name="KSO_WM_UNIT_HIGHLIGHT" val="0"/>
+  <p:tag name="KSO_WM_UNIT_COMPATIBLE" val="0"/>
+  <p:tag name="KSO_WM_UNIT_DIAGRAM_ISNUMVISUAL" val="0"/>
+  <p:tag name="KSO_WM_UNIT_DIAGRAM_ISREFERUNIT" val="0"/>
+  <p:tag name="KSO_WM_UNIT_ID" val="_7**"/>
+  <p:tag name="KSO_WM_UNIT_LAYERLEVEL" val="1"/>
+  <p:tag name="KSO_WM_TAG_VERSION" val="1.0"/>
+  <p:tag name="KSO_WM_BEAUTIFY_FLAG" val="#wm#"/>
+</p:tagLst>
+</file>
+
+<file path=ppt/tags/tag44.xml><?xml version="1.0" encoding="utf-8"?>
+<p:tagLst xmlns:a="http://schemas.openxmlformats.org/drawingml/2006/main" xmlns:r="http://schemas.openxmlformats.org/officeDocument/2006/relationships" xmlns:p="http://schemas.openxmlformats.org/presentationml/2006/main">
+  <p:tag name="KSO_WM_UNIT_HIGHLIGHT" val="0"/>
+  <p:tag name="KSO_WM_UNIT_COMPATIBLE" val="0"/>
+  <p:tag name="KSO_WM_UNIT_DIAGRAM_ISNUMVISUAL" val="0"/>
+  <p:tag name="KSO_WM_UNIT_DIAGRAM_ISREFERUNIT" val="0"/>
+  <p:tag name="KSO_WM_UNIT_ID" val="_8**"/>
+  <p:tag name="KSO_WM_UNIT_LAYERLEVEL" val="1"/>
+  <p:tag name="KSO_WM_TAG_VERSION" val="1.0"/>
+  <p:tag name="KSO_WM_BEAUTIFY_FLAG" val="#wm#"/>
+</p:tagLst>
+</file>
+
+<file path=ppt/tags/tag45.xml><?xml version="1.0" encoding="utf-8"?>
+<p:tagLst xmlns:a="http://schemas.openxmlformats.org/drawingml/2006/main" xmlns:r="http://schemas.openxmlformats.org/officeDocument/2006/relationships" xmlns:p="http://schemas.openxmlformats.org/presentationml/2006/main">
+  <p:tag name="KSO_WM_UNIT_HIGHLIGHT" val="0"/>
+  <p:tag name="KSO_WM_UNIT_COMPATIBLE" val="0"/>
+  <p:tag name="KSO_WM_UNIT_DIAGRAM_ISNUMVISUAL" val="0"/>
+  <p:tag name="KSO_WM_UNIT_DIAGRAM_ISREFERUNIT" val="0"/>
+  <p:tag name="KSO_WM_UNIT_ID" val="_8**"/>
+  <p:tag name="KSO_WM_UNIT_LAYERLEVEL" val="1"/>
+  <p:tag name="KSO_WM_TAG_VERSION" val="1.0"/>
+  <p:tag name="KSO_WM_BEAUTIFY_FLAG" val="#wm#"/>
+</p:tagLst>
+</file>
+
+<file path=ppt/tags/tag46.xml><?xml version="1.0" encoding="utf-8"?>
+<p:tagLst xmlns:a="http://schemas.openxmlformats.org/drawingml/2006/main" xmlns:r="http://schemas.openxmlformats.org/officeDocument/2006/relationships" xmlns:p="http://schemas.openxmlformats.org/presentationml/2006/main">
+  <p:tag name="KSO_WM_UNIT_HIGHLIGHT" val="0"/>
+  <p:tag name="KSO_WM_UNIT_COMPATIBLE" val="0"/>
+  <p:tag name="KSO_WM_UNIT_DIAGRAM_ISNUMVISUAL" val="0"/>
+  <p:tag name="KSO_WM_UNIT_DIAGRAM_ISREFERUNIT" val="0"/>
+  <p:tag name="KSO_WM_UNIT_ID" val="_8**"/>
+  <p:tag name="KSO_WM_UNIT_LAYERLEVEL" val="1"/>
+  <p:tag name="KSO_WM_TAG_VERSION" val="1.0"/>
+  <p:tag name="KSO_WM_BEAUTIFY_FLAG" val="#wm#"/>
+</p:tagLst>
+</file>
+
+<file path=ppt/tags/tag47.xml><?xml version="1.0" encoding="utf-8"?>
+<p:tagLst xmlns:a="http://schemas.openxmlformats.org/drawingml/2006/main" xmlns:r="http://schemas.openxmlformats.org/officeDocument/2006/relationships" xmlns:p="http://schemas.openxmlformats.org/presentationml/2006/main">
+  <p:tag name="KSO_WM_UNIT_HIGHLIGHT" val="0"/>
+  <p:tag name="KSO_WM_UNIT_COMPATIBLE" val="0"/>
+  <p:tag name="KSO_WM_UNIT_DIAGRAM_ISNUMVISUAL" val="0"/>
+  <p:tag name="KSO_WM_UNIT_DIAGRAM_ISREFERUNIT" val="0"/>
+  <p:tag name="KSO_WM_UNIT_ID" val="_8**"/>
+  <p:tag name="KSO_WM_UNIT_LAYERLEVEL" val="1"/>
+  <p:tag name="KSO_WM_TAG_VERSION" val="1.0"/>
+  <p:tag name="KSO_WM_BEAUTIFY_FLAG" val="#wm#"/>
+</p:tagLst>
+</file>
+
+<file path=ppt/tags/tag48.xml><?xml version="1.0" encoding="utf-8"?>
+<p:tagLst xmlns:a="http://schemas.openxmlformats.org/drawingml/2006/main" xmlns:r="http://schemas.openxmlformats.org/officeDocument/2006/relationships" xmlns:p="http://schemas.openxmlformats.org/presentationml/2006/main">
+  <p:tag name="KSO_WM_UNIT_HIGHLIGHT" val="0"/>
+  <p:tag name="KSO_WM_UNIT_COMPATIBLE" val="0"/>
+  <p:tag name="KSO_WM_UNIT_DIAGRAM_ISNUMVISUAL" val="0"/>
+  <p:tag name="KSO_WM_UNIT_DIAGRAM_ISREFERUNIT" val="0"/>
+  <p:tag name="KSO_WM_UNIT_ID" val="_8**"/>
+  <p:tag name="KSO_WM_UNIT_LAYERLEVEL" val="1"/>
+  <p:tag name="KSO_WM_TAG_VERSION" val="1.0"/>
+  <p:tag name="KSO_WM_BEAUTIFY_FLAG" val="#wm#"/>
+</p:tagLst>
+</file>
+
+<file path=ppt/tags/tag49.xml><?xml version="1.0" encoding="utf-8"?>
+<p:tagLst xmlns:a="http://schemas.openxmlformats.org/drawingml/2006/main" xmlns:r="http://schemas.openxmlformats.org/officeDocument/2006/relationships" xmlns:p="http://schemas.openxmlformats.org/presentationml/2006/main">
+  <p:tag name="KSO_WM_UNIT_HIGHLIGHT" val="0"/>
+  <p:tag name="KSO_WM_UNIT_COMPATIBLE" val="0"/>
+  <p:tag name="KSO_WM_UNIT_DIAGRAM_ISNUMVISUAL" val="0"/>
+  <p:tag name="KSO_WM_UNIT_DIAGRAM_ISREFERUNIT" val="0"/>
+  <p:tag name="KSO_WM_UNIT_ID" val="_8**"/>
+  <p:tag name="KSO_WM_UNIT_LAYERLEVEL" val="1"/>
+  <p:tag name="KSO_WM_TAG_VERSION" val="1.0"/>
+  <p:tag name="KSO_WM_BEAUTIFY_FLAG" val="#wm#"/>
+</p:tagLst>
+</file>
+
+<file path=ppt/tags/tag5.xml><?xml version="1.0" encoding="utf-8"?>
+<p:tagLst xmlns:a="http://schemas.openxmlformats.org/drawingml/2006/main" xmlns:r="http://schemas.openxmlformats.org/officeDocument/2006/relationships" xmlns:p="http://schemas.openxmlformats.org/presentationml/2006/main">
+  <p:tag name="KSO_WM_UNIT_HIGHLIGHT" val="0"/>
+  <p:tag name="KSO_WM_UNIT_COMPATIBLE" val="0"/>
+  <p:tag name="KSO_WM_UNIT_DIAGRAM_ISNUMVISUAL" val="0"/>
+  <p:tag name="KSO_WM_UNIT_DIAGRAM_ISREFERUNIT" val="0"/>
+  <p:tag name="KSO_WM_UNIT_ID" val="_0**"/>
+  <p:tag name="KSO_WM_UNIT_LAYERLEVEL" val="1"/>
+  <p:tag name="KSO_WM_TAG_VERSION" val="1.0"/>
+  <p:tag name="KSO_WM_BEAUTIFY_FLAG" val="#wm#"/>
+</p:tagLst>
+</file>
+
+<file path=ppt/tags/tag50.xml><?xml version="1.0" encoding="utf-8"?>
+<p:tagLst xmlns:a="http://schemas.openxmlformats.org/drawingml/2006/main" xmlns:r="http://schemas.openxmlformats.org/officeDocument/2006/relationships" xmlns:p="http://schemas.openxmlformats.org/presentationml/2006/main">
+  <p:tag name="KSO_WM_UNIT_HIGHLIGHT" val="0"/>
+  <p:tag name="KSO_WM_UNIT_COMPATIBLE" val="0"/>
+  <p:tag name="KSO_WM_UNIT_DIAGRAM_ISNUMVISUAL" val="0"/>
+  <p:tag name="KSO_WM_UNIT_DIAGRAM_ISREFERUNIT" val="0"/>
+  <p:tag name="KSO_WM_UNIT_ID" val="_9**"/>
+  <p:tag name="KSO_WM_UNIT_LAYERLEVEL" val="1"/>
+  <p:tag name="KSO_WM_TAG_VERSION" val="1.0"/>
+  <p:tag name="KSO_WM_BEAUTIFY_FLAG" val="#wm#"/>
+</p:tagLst>
+</file>
+
+<file path=ppt/tags/tag51.xml><?xml version="1.0" encoding="utf-8"?>
+<p:tagLst xmlns:a="http://schemas.openxmlformats.org/drawingml/2006/main" xmlns:r="http://schemas.openxmlformats.org/officeDocument/2006/relationships" xmlns:p="http://schemas.openxmlformats.org/presentationml/2006/main">
+  <p:tag name="KSO_WM_UNIT_HIGHLIGHT" val="0"/>
+  <p:tag name="KSO_WM_UNIT_COMPATIBLE" val="0"/>
+  <p:tag name="KSO_WM_UNIT_DIAGRAM_ISNUMVISUAL" val="0"/>
+  <p:tag name="KSO_WM_UNIT_DIAGRAM_ISREFERUNIT" val="0"/>
+  <p:tag name="KSO_WM_UNIT_ID" val="_9**"/>
+  <p:tag name="KSO_WM_UNIT_LAYERLEVEL" val="1"/>
+  <p:tag name="KSO_WM_TAG_VERSION" val="1.0"/>
+  <p:tag name="KSO_WM_BEAUTIFY_FLAG" val="#wm#"/>
+</p:tagLst>
+</file>
+
+<file path=ppt/tags/tag52.xml><?xml version="1.0" encoding="utf-8"?>
+<p:tagLst xmlns:a="http://schemas.openxmlformats.org/drawingml/2006/main" xmlns:r="http://schemas.openxmlformats.org/officeDocument/2006/relationships" xmlns:p="http://schemas.openxmlformats.org/presentationml/2006/main">
+  <p:tag name="KSO_WM_UNIT_HIGHLIGHT" val="0"/>
+  <p:tag name="KSO_WM_UNIT_COMPATIBLE" val="0"/>
+  <p:tag name="KSO_WM_UNIT_DIAGRAM_ISNUMVISUAL" val="0"/>
+  <p:tag name="KSO_WM_UNIT_DIAGRAM_ISREFERUNIT" val="0"/>
+  <p:tag name="KSO_WM_UNIT_ID" val="_9**"/>
+  <p:tag name="KSO_WM_UNIT_LAYERLEVEL" val="1"/>
+  <p:tag name="KSO_WM_TAG_VERSION" val="1.0"/>
+  <p:tag name="KSO_WM_BEAUTIFY_FLAG" val="#wm#"/>
+</p:tagLst>
+</file>
+
+<file path=ppt/tags/tag53.xml><?xml version="1.0" encoding="utf-8"?>
+<p:tagLst xmlns:a="http://schemas.openxmlformats.org/drawingml/2006/main" xmlns:r="http://schemas.openxmlformats.org/officeDocument/2006/relationships" xmlns:p="http://schemas.openxmlformats.org/presentationml/2006/main">
+  <p:tag name="KSO_WM_UNIT_HIGHLIGHT" val="0"/>
+  <p:tag name="KSO_WM_UNIT_COMPATIBLE" val="0"/>
+  <p:tag name="KSO_WM_UNIT_DIAGRAM_ISNUMVISUAL" val="0"/>
+  <p:tag name="KSO_WM_UNIT_DIAGRAM_ISREFERUNIT" val="0"/>
+  <p:tag name="KSO_WM_UNIT_ID" val="_9**"/>
+  <p:tag name="KSO_WM_UNIT_LAYERLEVEL" val="1"/>
+  <p:tag name="KSO_WM_TAG_VERSION" val="1.0"/>
+  <p:tag name="KSO_WM_BEAUTIFY_FLAG" val="#wm#"/>
+</p:tagLst>
+</file>
+
+<file path=ppt/tags/tag54.xml><?xml version="1.0" encoding="utf-8"?>
+<p:tagLst xmlns:a="http://schemas.openxmlformats.org/drawingml/2006/main" xmlns:r="http://schemas.openxmlformats.org/officeDocument/2006/relationships" xmlns:p="http://schemas.openxmlformats.org/presentationml/2006/main">
+  <p:tag name="KSO_WM_UNIT_HIGHLIGHT" val="0"/>
+  <p:tag name="KSO_WM_UNIT_COMPATIBLE" val="0"/>
+  <p:tag name="KSO_WM_UNIT_DIAGRAM_ISNUMVISUAL" val="0"/>
+  <p:tag name="KSO_WM_UNIT_DIAGRAM_ISREFERUNIT" val="0"/>
+  <p:tag name="KSO_WM_UNIT_ID" val="_9**"/>
+  <p:tag name="KSO_WM_UNIT_LAYERLEVEL" val="1"/>
+  <p:tag name="KSO_WM_TAG_VERSION" val="1.0"/>
+  <p:tag name="KSO_WM_BEAUTIFY_FLAG" val="#wm#"/>
+</p:tagLst>
+</file>
+
+<file path=ppt/tags/tag55.xml><?xml version="1.0" encoding="utf-8"?>
+<p:tagLst xmlns:a="http://schemas.openxmlformats.org/drawingml/2006/main" xmlns:r="http://schemas.openxmlformats.org/officeDocument/2006/relationships" xmlns:p="http://schemas.openxmlformats.org/presentationml/2006/main">
+  <p:tag name="KSO_WM_UNIT_HIGHLIGHT" val="0"/>
+  <p:tag name="KSO_WM_UNIT_COMPATIBLE" val="0"/>
+  <p:tag name="KSO_WM_UNIT_DIAGRAM_ISNUMVISUAL" val="0"/>
+  <p:tag name="KSO_WM_UNIT_DIAGRAM_ISREFERUNIT" val="0"/>
+  <p:tag name="KSO_WM_UNIT_ID" val="_10**"/>
+  <p:tag name="KSO_WM_UNIT_LAYERLEVEL" val="1"/>
+  <p:tag name="KSO_WM_TAG_VERSION" val="1.0"/>
+  <p:tag name="KSO_WM_BEAUTIFY_FLAG" val="#wm#"/>
+</p:tagLst>
+</file>
+
+<file path=ppt/tags/tag56.xml><?xml version="1.0" encoding="utf-8"?>
+<p:tagLst xmlns:a="http://schemas.openxmlformats.org/drawingml/2006/main" xmlns:r="http://schemas.openxmlformats.org/officeDocument/2006/relationships" xmlns:p="http://schemas.openxmlformats.org/presentationml/2006/main">
+  <p:tag name="KSO_WM_UNIT_HIGHLIGHT" val="0"/>
+  <p:tag name="KSO_WM_UNIT_COMPATIBLE" val="0"/>
+  <p:tag name="KSO_WM_UNIT_DIAGRAM_ISNUMVISUAL" val="0"/>
+  <p:tag name="KSO_WM_UNIT_DIAGRAM_ISREFERUNIT" val="0"/>
+  <p:tag name="KSO_WM_UNIT_ID" val="_10**"/>
+  <p:tag name="KSO_WM_UNIT_LAYERLEVEL" val="1"/>
+  <p:tag name="KSO_WM_TAG_VERSION" val="1.0"/>
+  <p:tag name="KSO_WM_BEAUTIFY_FLAG" val="#wm#"/>
+</p:tagLst>
+</file>
+
+<file path=ppt/tags/tag57.xml><?xml version="1.0" encoding="utf-8"?>
+<p:tagLst xmlns:a="http://schemas.openxmlformats.org/drawingml/2006/main" xmlns:r="http://schemas.openxmlformats.org/officeDocument/2006/relationships" xmlns:p="http://schemas.openxmlformats.org/presentationml/2006/main">
+  <p:tag name="KSO_WM_UNIT_HIGHLIGHT" val="0"/>
+  <p:tag name="KSO_WM_UNIT_COMPATIBLE" val="0"/>
+  <p:tag name="KSO_WM_UNIT_DIAGRAM_ISNUMVISUAL" val="0"/>
+  <p:tag name="KSO_WM_UNIT_DIAGRAM_ISREFERUNIT" val="0"/>
+  <p:tag name="KSO_WM_UNIT_ID" val="_10**"/>
+  <p:tag name="KSO_WM_UNIT_LAYERLEVEL" val="1"/>
+  <p:tag name="KSO_WM_TAG_VERSION" val="1.0"/>
+  <p:tag name="KSO_WM_BEAUTIFY_FLAG" val="#wm#"/>
+</p:tagLst>
+</file>
+
+<file path=ppt/tags/tag58.xml><?xml version="1.0" encoding="utf-8"?>
+<p:tagLst xmlns:a="http://schemas.openxmlformats.org/drawingml/2006/main" xmlns:r="http://schemas.openxmlformats.org/officeDocument/2006/relationships" xmlns:p="http://schemas.openxmlformats.org/presentationml/2006/main">
+  <p:tag name="KSO_WM_UNIT_HIGHLIGHT" val="0"/>
+  <p:tag name="KSO_WM_UNIT_COMPATIBLE" val="0"/>
+  <p:tag name="KSO_WM_UNIT_DIAGRAM_ISNUMVISUAL" val="0"/>
+  <p:tag name="KSO_WM_UNIT_DIAGRAM_ISREFERUNIT" val="0"/>
+  <p:tag name="KSO_WM_UNIT_ID" val="_10**"/>
+  <p:tag name="KSO_WM_UNIT_LAYERLEVEL" val="1"/>
+  <p:tag name="KSO_WM_TAG_VERSION" val="1.0"/>
+  <p:tag name="KSO_WM_BEAUTIFY_FLAG" val="#wm#"/>
+</p:tagLst>
+</file>
+
+<file path=ppt/tags/tag59.xml><?xml version="1.0" encoding="utf-8"?>
+<p:tagLst xmlns:a="http://schemas.openxmlformats.org/drawingml/2006/main" xmlns:r="http://schemas.openxmlformats.org/officeDocument/2006/relationships" xmlns:p="http://schemas.openxmlformats.org/presentationml/2006/main">
+  <p:tag name="KSO_WM_UNIT_HIGHLIGHT" val="0"/>
+  <p:tag name="KSO_WM_UNIT_COMPATIBLE" val="0"/>
+  <p:tag name="KSO_WM_UNIT_DIAGRAM_ISNUMVISUAL" val="0"/>
+  <p:tag name="KSO_WM_UNIT_DIAGRAM_ISREFERUNIT" val="0"/>
+  <p:tag name="KSO_WM_UNIT_ID" val="_11**"/>
+  <p:tag name="KSO_WM_UNIT_LAYERLEVEL" val="1"/>
+  <p:tag name="KSO_WM_TAG_VERSION" val="1.0"/>
+  <p:tag name="KSO_WM_BEAUTIFY_FLAG" val="#wm#"/>
+</p:tagLst>
+</file>
+
+<file path=ppt/tags/tag6.xml><?xml version="1.0" encoding="utf-8"?>
+<p:tagLst xmlns:a="http://schemas.openxmlformats.org/drawingml/2006/main" xmlns:r="http://schemas.openxmlformats.org/officeDocument/2006/relationships" xmlns:p="http://schemas.openxmlformats.org/presentationml/2006/main">
+  <p:tag name="KSO_WM_UNIT_HIGHLIGHT" val="0"/>
+  <p:tag name="KSO_WM_UNIT_COMPATIBLE" val="0"/>
+  <p:tag name="KSO_WM_UNIT_DIAGRAM_ISNUMVISUAL" val="0"/>
+  <p:tag name="KSO_WM_UNIT_DIAGRAM_ISREFERUNIT" val="0"/>
+  <p:tag name="KSO_WM_UNIT_ID" val="_0**"/>
+  <p:tag name="KSO_WM_UNIT_LAYERLEVEL" val="1"/>
+  <p:tag name="KSO_WM_TAG_VERSION" val="1.0"/>
+  <p:tag name="KSO_WM_BEAUTIFY_FLAG" val="#wm#"/>
+</p:tagLst>
+</file>
+
+<file path=ppt/tags/tag60.xml><?xml version="1.0" encoding="utf-8"?>
+<p:tagLst xmlns:a="http://schemas.openxmlformats.org/drawingml/2006/main" xmlns:r="http://schemas.openxmlformats.org/officeDocument/2006/relationships" xmlns:p="http://schemas.openxmlformats.org/presentationml/2006/main">
+  <p:tag name="KSO_WM_UNIT_HIGHLIGHT" val="0"/>
+  <p:tag name="KSO_WM_UNIT_COMPATIBLE" val="0"/>
+  <p:tag name="KSO_WM_UNIT_DIAGRAM_ISNUMVISUAL" val="0"/>
+  <p:tag name="KSO_WM_UNIT_DIAGRAM_ISREFERUNIT" val="0"/>
+  <p:tag name="KSO_WM_UNIT_ID" val="_11**"/>
+  <p:tag name="KSO_WM_UNIT_LAYERLEVEL" val="1"/>
+  <p:tag name="KSO_WM_TAG_VERSION" val="1.0"/>
+  <p:tag name="KSO_WM_BEAUTIFY_FLAG" val="#wm#"/>
+</p:tagLst>
+</file>
+
+<file path=ppt/tags/tag61.xml><?xml version="1.0" encoding="utf-8"?>
+<p:tagLst xmlns:a="http://schemas.openxmlformats.org/drawingml/2006/main" xmlns:r="http://schemas.openxmlformats.org/officeDocument/2006/relationships" xmlns:p="http://schemas.openxmlformats.org/presentationml/2006/main">
+  <p:tag name="KSO_WM_UNIT_HIGHLIGHT" val="0"/>
+  <p:tag name="KSO_WM_UNIT_COMPATIBLE" val="0"/>
+  <p:tag name="KSO_WM_UNIT_DIAGRAM_ISNUMVISUAL" val="0"/>
+  <p:tag name="KSO_WM_UNIT_DIAGRAM_ISREFERUNIT" val="0"/>
+  <p:tag name="KSO_WM_UNIT_ID" val="_11**"/>
+  <p:tag name="KSO_WM_UNIT_LAYERLEVEL" val="1"/>
+  <p:tag name="KSO_WM_TAG_VERSION" val="1.0"/>
+  <p:tag name="KSO_WM_BEAUTIFY_FLAG" val="#wm#"/>
+</p:tagLst>
+</file>
+
+<file path=ppt/tags/tag62.xml><?xml version="1.0" encoding="utf-8"?>
+<p:tagLst xmlns:a="http://schemas.openxmlformats.org/drawingml/2006/main" xmlns:r="http://schemas.openxmlformats.org/officeDocument/2006/relationships" xmlns:p="http://schemas.openxmlformats.org/presentationml/2006/main">
+  <p:tag name="KSO_WM_UNIT_HIGHLIGHT" val="0"/>
+  <p:tag name="KSO_WM_UNIT_COMPATIBLE" val="0"/>
+  <p:tag name="KSO_WM_UNIT_DIAGRAM_ISNUMVISUAL" val="0"/>
+  <p:tag name="KSO_WM_UNIT_DIAGRAM_ISREFERUNIT" val="0"/>
+  <p:tag name="KSO_WM_UNIT_ID" val="_11**"/>
+  <p:tag name="KSO_WM_UNIT_LAYERLEVEL" val="1"/>
+  <p:tag name="KSO_WM_TAG_VERSION" val="1.0"/>
+  <p:tag name="KSO_WM_BEAUTIFY_FLAG" val="#wm#"/>
+</p:tagLst>
+</file>
+
 <file path=ppt/tags/tag63.xml><?xml version="1.0" encoding="utf-8"?>
-<p:tagLst xmlns:p="http://schemas.openxmlformats.org/presentationml/2006/main">
-  <p:tag name="KSO_WM_BEAUTIFY_FLAG" val=""/>
+<p:tagLst xmlns:a="http://schemas.openxmlformats.org/drawingml/2006/main" xmlns:r="http://schemas.openxmlformats.org/officeDocument/2006/relationships" xmlns:p="http://schemas.openxmlformats.org/presentationml/2006/main">
+  <p:tag name="KSO_WM_UNIT_HIGHLIGHT" val="0"/>
+  <p:tag name="KSO_WM_UNIT_COMPATIBLE" val="0"/>
+  <p:tag name="KSO_WM_UNIT_DIAGRAM_ISNUMVISUAL" val="0"/>
+  <p:tag name="KSO_WM_UNIT_DIAGRAM_ISREFERUNIT" val="0"/>
+  <p:tag name="KSO_WM_UNIT_ID" val="_11**"/>
+  <p:tag name="KSO_WM_UNIT_LAYERLEVEL" val="1"/>
+  <p:tag name="KSO_WM_TAG_VERSION" val="1.0"/>
+  <p:tag name="KSO_WM_BEAUTIFY_FLAG" val="#wm#"/>
 </p:tagLst>
 </file>
 
 <file path=ppt/tags/tag64.xml><?xml version="1.0" encoding="utf-8"?>
-<p:tagLst xmlns:p="http://schemas.openxmlformats.org/presentationml/2006/main">
-  <p:tag name="KSO_WM_BEAUTIFY_FLAG" val=""/>
-</p:tagLst>
-</file>
-
-<file path=ppt/tags/tag65.xml><?xml version="1.0" encoding="utf-8"?>
-<p:tagLst xmlns:p="http://schemas.openxmlformats.org/presentationml/2006/main">
-  <p:tag name="KSO_WM_BEAUTIFY_FLAG" val=""/>
-</p:tagLst>
-</file>
-
-<file path=ppt/tags/tag66.xml><?xml version="1.0" encoding="utf-8"?>
-<p:tagLst xmlns:p="http://schemas.openxmlformats.org/presentationml/2006/main">
+<p:tagLst xmlns:a="http://schemas.openxmlformats.org/drawingml/2006/main" xmlns:r="http://schemas.openxmlformats.org/officeDocument/2006/relationships" xmlns:p="http://schemas.openxmlformats.org/presentationml/2006/main">
   <p:tag name="KSO_WM_SLIDE_ID" val="custom20205081_1"/>
   <p:tag name="KSO_WM_TEMPLATE_SUBCATEGORY" val="19"/>
   <p:tag name="KSO_WM_TEMPLATE_MASTER_TYPE" val="0"/>
@@ -4532,39 +4450,26 @@
 </p:tagLst>
 </file>
 
+<file path=ppt/tags/tag65.xml><?xml version="1.0" encoding="utf-8"?>
+<p:tagLst xmlns:a="http://schemas.openxmlformats.org/drawingml/2006/main" xmlns:r="http://schemas.openxmlformats.org/officeDocument/2006/relationships" xmlns:p="http://schemas.openxmlformats.org/presentationml/2006/main">
+  <p:tag name="KSO_WM_BEAUTIFY_FLAG" val=""/>
+</p:tagLst>
+</file>
+
+<file path=ppt/tags/tag66.xml><?xml version="1.0" encoding="utf-8"?>
+<p:tagLst xmlns:a="http://schemas.openxmlformats.org/drawingml/2006/main" xmlns:r="http://schemas.openxmlformats.org/officeDocument/2006/relationships" xmlns:p="http://schemas.openxmlformats.org/presentationml/2006/main">
+  <p:tag name="KSO_WM_BEAUTIFY_FLAG" val=""/>
+</p:tagLst>
+</file>
+
 <file path=ppt/tags/tag67.xml><?xml version="1.0" encoding="utf-8"?>
-<p:tagLst xmlns:p="http://schemas.openxmlformats.org/presentationml/2006/main">
+<p:tagLst xmlns:a="http://schemas.openxmlformats.org/drawingml/2006/main" xmlns:r="http://schemas.openxmlformats.org/officeDocument/2006/relationships" xmlns:p="http://schemas.openxmlformats.org/presentationml/2006/main">
   <p:tag name="KSO_WM_BEAUTIFY_FLAG" val=""/>
 </p:tagLst>
 </file>
 
 <file path=ppt/tags/tag68.xml><?xml version="1.0" encoding="utf-8"?>
-<p:tagLst xmlns:p="http://schemas.openxmlformats.org/presentationml/2006/main">
-  <p:tag name="KSO_WM_BEAUTIFY_FLAG" val=""/>
-</p:tagLst>
-</file>
-
-<file path=ppt/tags/tag69.xml><?xml version="1.0" encoding="utf-8"?>
-<p:tagLst xmlns:p="http://schemas.openxmlformats.org/presentationml/2006/main">
-  <p:tag name="KSO_WM_BEAUTIFY_FLAG" val=""/>
-</p:tagLst>
-</file>
-
-<file path=ppt/tags/tag7.xml><?xml version="1.0" encoding="utf-8"?>
-<p:tagLst xmlns:p="http://schemas.openxmlformats.org/presentationml/2006/main">
-  <p:tag name="KSO_WM_UNIT_HIGHLIGHT" val="0"/>
-  <p:tag name="KSO_WM_UNIT_COMPATIBLE" val="0"/>
-  <p:tag name="KSO_WM_UNIT_DIAGRAM_ISNUMVISUAL" val="0"/>
-  <p:tag name="KSO_WM_UNIT_DIAGRAM_ISREFERUNIT" val="0"/>
-  <p:tag name="KSO_WM_UNIT_ID" val="_2**"/>
-  <p:tag name="KSO_WM_UNIT_LAYERLEVEL" val="1"/>
-  <p:tag name="KSO_WM_TAG_VERSION" val="1.0"/>
-  <p:tag name="KSO_WM_BEAUTIFY_FLAG" val="#wm#"/>
-</p:tagLst>
-</file>
-
-<file path=ppt/tags/tag70.xml><?xml version="1.0" encoding="utf-8"?>
-<p:tagLst xmlns:p="http://schemas.openxmlformats.org/presentationml/2006/main">
+<p:tagLst xmlns:a="http://schemas.openxmlformats.org/drawingml/2006/main" xmlns:r="http://schemas.openxmlformats.org/officeDocument/2006/relationships" xmlns:p="http://schemas.openxmlformats.org/presentationml/2006/main">
   <p:tag name="KSO_WM_SLIDE_ID" val="custom20205081_1"/>
   <p:tag name="KSO_WM_TEMPLATE_SUBCATEGORY" val="19"/>
   <p:tag name="KSO_WM_TEMPLATE_MASTER_TYPE" val="0"/>
@@ -4584,26 +4489,39 @@
 </p:tagLst>
 </file>
 
+<file path=ppt/tags/tag69.xml><?xml version="1.0" encoding="utf-8"?>
+<p:tagLst xmlns:a="http://schemas.openxmlformats.org/drawingml/2006/main" xmlns:r="http://schemas.openxmlformats.org/officeDocument/2006/relationships" xmlns:p="http://schemas.openxmlformats.org/presentationml/2006/main">
+  <p:tag name="KSO_WM_BEAUTIFY_FLAG" val=""/>
+</p:tagLst>
+</file>
+
+<file path=ppt/tags/tag7.xml><?xml version="1.0" encoding="utf-8"?>
+<p:tagLst xmlns:a="http://schemas.openxmlformats.org/drawingml/2006/main" xmlns:r="http://schemas.openxmlformats.org/officeDocument/2006/relationships" xmlns:p="http://schemas.openxmlformats.org/presentationml/2006/main">
+  <p:tag name="KSO_WM_UNIT_HIGHLIGHT" val="0"/>
+  <p:tag name="KSO_WM_UNIT_COMPATIBLE" val="0"/>
+  <p:tag name="KSO_WM_UNIT_DIAGRAM_ISNUMVISUAL" val="0"/>
+  <p:tag name="KSO_WM_UNIT_DIAGRAM_ISREFERUNIT" val="0"/>
+  <p:tag name="KSO_WM_UNIT_ID" val="_0**"/>
+  <p:tag name="KSO_WM_UNIT_LAYERLEVEL" val="1"/>
+  <p:tag name="KSO_WM_TAG_VERSION" val="1.0"/>
+  <p:tag name="KSO_WM_BEAUTIFY_FLAG" val="#wm#"/>
+</p:tagLst>
+</file>
+
+<file path=ppt/tags/tag70.xml><?xml version="1.0" encoding="utf-8"?>
+<p:tagLst xmlns:a="http://schemas.openxmlformats.org/drawingml/2006/main" xmlns:r="http://schemas.openxmlformats.org/officeDocument/2006/relationships" xmlns:p="http://schemas.openxmlformats.org/presentationml/2006/main">
+  <p:tag name="KSO_WM_BEAUTIFY_FLAG" val=""/>
+</p:tagLst>
+</file>
+
 <file path=ppt/tags/tag71.xml><?xml version="1.0" encoding="utf-8"?>
-<p:tagLst xmlns:p="http://schemas.openxmlformats.org/presentationml/2006/main">
+<p:tagLst xmlns:a="http://schemas.openxmlformats.org/drawingml/2006/main" xmlns:r="http://schemas.openxmlformats.org/officeDocument/2006/relationships" xmlns:p="http://schemas.openxmlformats.org/presentationml/2006/main">
   <p:tag name="KSO_WM_BEAUTIFY_FLAG" val=""/>
 </p:tagLst>
 </file>
 
 <file path=ppt/tags/tag72.xml><?xml version="1.0" encoding="utf-8"?>
-<p:tagLst xmlns:p="http://schemas.openxmlformats.org/presentationml/2006/main">
-  <p:tag name="KSO_WM_BEAUTIFY_FLAG" val=""/>
-</p:tagLst>
-</file>
-
-<file path=ppt/tags/tag73.xml><?xml version="1.0" encoding="utf-8"?>
-<p:tagLst xmlns:p="http://schemas.openxmlformats.org/presentationml/2006/main">
-  <p:tag name="KSO_WM_BEAUTIFY_FLAG" val=""/>
-</p:tagLst>
-</file>
-
-<file path=ppt/tags/tag74.xml><?xml version="1.0" encoding="utf-8"?>
-<p:tagLst xmlns:p="http://schemas.openxmlformats.org/presentationml/2006/main">
+<p:tagLst xmlns:a="http://schemas.openxmlformats.org/drawingml/2006/main" xmlns:r="http://schemas.openxmlformats.org/officeDocument/2006/relationships" xmlns:p="http://schemas.openxmlformats.org/presentationml/2006/main">
   <p:tag name="KSO_WM_SLIDE_ID" val="custom20205081_1"/>
   <p:tag name="KSO_WM_TEMPLATE_SUBCATEGORY" val="19"/>
   <p:tag name="KSO_WM_TEMPLATE_MASTER_TYPE" val="0"/>
@@ -4623,19 +4541,31 @@
 </p:tagLst>
 </file>
 
+<file path=ppt/tags/tag73.xml><?xml version="1.0" encoding="utf-8"?>
+<p:tagLst xmlns:a="http://schemas.openxmlformats.org/drawingml/2006/main" xmlns:r="http://schemas.openxmlformats.org/officeDocument/2006/relationships" xmlns:p="http://schemas.openxmlformats.org/presentationml/2006/main">
+  <p:tag name="KSO_WM_BEAUTIFY_FLAG" val=""/>
+</p:tagLst>
+</file>
+
+<file path=ppt/tags/tag74.xml><?xml version="1.0" encoding="utf-8"?>
+<p:tagLst xmlns:a="http://schemas.openxmlformats.org/drawingml/2006/main" xmlns:r="http://schemas.openxmlformats.org/officeDocument/2006/relationships" xmlns:p="http://schemas.openxmlformats.org/presentationml/2006/main">
+  <p:tag name="KSO_WM_BEAUTIFY_FLAG" val=""/>
+</p:tagLst>
+</file>
+
 <file path=ppt/tags/tag75.xml><?xml version="1.0" encoding="utf-8"?>
-<p:tagLst xmlns:p="http://schemas.openxmlformats.org/presentationml/2006/main">
-  <p:tag name="commondata" val="eyJoZGlkIjoiYzI5ZDE5NjBiY2U5MWMyNjhmOTUxMDg4YzczNDliYTIifQ=="/>
+<p:tagLst xmlns:a="http://schemas.openxmlformats.org/drawingml/2006/main" xmlns:r="http://schemas.openxmlformats.org/officeDocument/2006/relationships" xmlns:p="http://schemas.openxmlformats.org/presentationml/2006/main">
+  <p:tag name="KSO_WM_BEAUTIFY_FLAG" val=""/>
 </p:tagLst>
 </file>
 
 <file path=ppt/tags/tag8.xml><?xml version="1.0" encoding="utf-8"?>
-<p:tagLst xmlns:p="http://schemas.openxmlformats.org/presentationml/2006/main">
-  <p:tag name="KSO_WM_UNIT_HIGHLIGHT" val="0"/>
-  <p:tag name="KSO_WM_UNIT_COMPATIBLE" val="0"/>
-  <p:tag name="KSO_WM_UNIT_DIAGRAM_ISNUMVISUAL" val="0"/>
-  <p:tag name="KSO_WM_UNIT_DIAGRAM_ISREFERUNIT" val="0"/>
-  <p:tag name="KSO_WM_UNIT_ID" val="_2**"/>
+<p:tagLst xmlns:a="http://schemas.openxmlformats.org/drawingml/2006/main" xmlns:r="http://schemas.openxmlformats.org/officeDocument/2006/relationships" xmlns:p="http://schemas.openxmlformats.org/presentationml/2006/main">
+  <p:tag name="KSO_WM_UNIT_HIGHLIGHT" val="0"/>
+  <p:tag name="KSO_WM_UNIT_COMPATIBLE" val="0"/>
+  <p:tag name="KSO_WM_UNIT_DIAGRAM_ISNUMVISUAL" val="0"/>
+  <p:tag name="KSO_WM_UNIT_DIAGRAM_ISREFERUNIT" val="0"/>
+  <p:tag name="KSO_WM_UNIT_ID" val="_1**"/>
   <p:tag name="KSO_WM_UNIT_LAYERLEVEL" val="1"/>
   <p:tag name="KSO_WM_TAG_VERSION" val="1.0"/>
   <p:tag name="KSO_WM_BEAUTIFY_FLAG" val="#wm#"/>
@@ -4643,12 +4573,12 @@
 </file>
 
 <file path=ppt/tags/tag9.xml><?xml version="1.0" encoding="utf-8"?>
-<p:tagLst xmlns:p="http://schemas.openxmlformats.org/presentationml/2006/main">
-  <p:tag name="KSO_WM_UNIT_HIGHLIGHT" val="0"/>
-  <p:tag name="KSO_WM_UNIT_COMPATIBLE" val="0"/>
-  <p:tag name="KSO_WM_UNIT_DIAGRAM_ISNUMVISUAL" val="0"/>
-  <p:tag name="KSO_WM_UNIT_DIAGRAM_ISREFERUNIT" val="0"/>
-  <p:tag name="KSO_WM_UNIT_ID" val="_2**"/>
+<p:tagLst xmlns:a="http://schemas.openxmlformats.org/drawingml/2006/main" xmlns:r="http://schemas.openxmlformats.org/officeDocument/2006/relationships" xmlns:p="http://schemas.openxmlformats.org/presentationml/2006/main">
+  <p:tag name="KSO_WM_UNIT_HIGHLIGHT" val="0"/>
+  <p:tag name="KSO_WM_UNIT_COMPATIBLE" val="0"/>
+  <p:tag name="KSO_WM_UNIT_DIAGRAM_ISNUMVISUAL" val="0"/>
+  <p:tag name="KSO_WM_UNIT_DIAGRAM_ISREFERUNIT" val="0"/>
+  <p:tag name="KSO_WM_UNIT_ID" val="_1**"/>
   <p:tag name="KSO_WM_UNIT_LAYERLEVEL" val="1"/>
   <p:tag name="KSO_WM_TAG_VERSION" val="1.0"/>
   <p:tag name="KSO_WM_BEAUTIFY_FLAG" val="#wm#"/>
@@ -4838,6 +4768,8 @@
       </a:bgFillStyleLst>
     </a:fmtScheme>
   </a:themeElements>
+  <a:objectDefaults/>
+  <a:extraClrSchemeLst/>
   <a:extLst>
     <a:ext uri="{05A4C25C-085E-4340-85A3-A5531E510DB2}">
       <thm15:themeFamily xmlns:thm15="http://schemas.microsoft.com/office/thememl/2012/main" name="Office Theme" id="{62F939B6-93AF-4DB8-9C6B-D6C7DFDC589F}" vid="{4A3C46E8-61CC-4603-A589-7422A47A8E4A}"/>

</xml_diff>